<commit_message>
update ppt for topic 4, add ppt 5
</commit_message>
<xml_diff>
--- a/4.pptx
+++ b/4.pptx
@@ -5,7 +5,7 @@
     <p:sldMasterId id="2147483648" r:id="rId1"/>
   </p:sldMasterIdLst>
   <p:notesMasterIdLst>
-    <p:notesMasterId r:id="rId26"/>
+    <p:notesMasterId r:id="rId29"/>
   </p:notesMasterIdLst>
   <p:sldIdLst>
     <p:sldId id="291" r:id="rId2"/>
@@ -22,16 +22,19 @@
     <p:sldId id="304" r:id="rId13"/>
     <p:sldId id="305" r:id="rId14"/>
     <p:sldId id="307" r:id="rId15"/>
-    <p:sldId id="306" r:id="rId16"/>
-    <p:sldId id="310" r:id="rId17"/>
-    <p:sldId id="311" r:id="rId18"/>
-    <p:sldId id="312" r:id="rId19"/>
-    <p:sldId id="317" r:id="rId20"/>
-    <p:sldId id="318" r:id="rId21"/>
-    <p:sldId id="319" r:id="rId22"/>
-    <p:sldId id="320" r:id="rId23"/>
-    <p:sldId id="321" r:id="rId24"/>
-    <p:sldId id="322" r:id="rId25"/>
+    <p:sldId id="323" r:id="rId16"/>
+    <p:sldId id="324" r:id="rId17"/>
+    <p:sldId id="325" r:id="rId18"/>
+    <p:sldId id="306" r:id="rId19"/>
+    <p:sldId id="310" r:id="rId20"/>
+    <p:sldId id="311" r:id="rId21"/>
+    <p:sldId id="312" r:id="rId22"/>
+    <p:sldId id="317" r:id="rId23"/>
+    <p:sldId id="318" r:id="rId24"/>
+    <p:sldId id="319" r:id="rId25"/>
+    <p:sldId id="320" r:id="rId26"/>
+    <p:sldId id="321" r:id="rId27"/>
+    <p:sldId id="322" r:id="rId28"/>
   </p:sldIdLst>
   <p:sldSz cx="9144000" cy="6858000" type="screen4x3"/>
   <p:notesSz cx="6858000" cy="9144000"/>
@@ -215,7 +218,7 @@
           <a:p>
             <a:fld id="{D2F8D08A-0320-428D-8F0D-AF67C5CF67FF}" type="datetimeFigureOut">
               <a:rPr lang="en-GB" smtClean="0"/>
-              <a:t>16/10/2025</a:t>
+              <a:t>30/10/2025</a:t>
             </a:fld>
             <a:endParaRPr lang="en-GB"/>
           </a:p>
@@ -632,7 +635,7 @@
           <a:p>
             <a:fld id="{AB7A67D8-81A2-4C40-907D-EC4BC1D9B23E}" type="slidenum">
               <a:rPr lang="en-GB" smtClean="0"/>
-              <a:t>15</a:t>
+              <a:t>18</a:t>
             </a:fld>
             <a:endParaRPr lang="en-GB"/>
           </a:p>
@@ -832,7 +835,7 @@
           <a:p>
             <a:fld id="{96DE2DC6-35D3-402D-B58D-EF0A5A3588AA}" type="datetimeFigureOut">
               <a:rPr lang="en-GB" smtClean="0"/>
-              <a:t>16/10/2025</a:t>
+              <a:t>30/10/2025</a:t>
             </a:fld>
             <a:endParaRPr lang="en-GB"/>
           </a:p>
@@ -1002,7 +1005,7 @@
           <a:p>
             <a:fld id="{96DE2DC6-35D3-402D-B58D-EF0A5A3588AA}" type="datetimeFigureOut">
               <a:rPr lang="en-GB" smtClean="0"/>
-              <a:t>16/10/2025</a:t>
+              <a:t>30/10/2025</a:t>
             </a:fld>
             <a:endParaRPr lang="en-GB"/>
           </a:p>
@@ -1182,7 +1185,7 @@
           <a:p>
             <a:fld id="{96DE2DC6-35D3-402D-B58D-EF0A5A3588AA}" type="datetimeFigureOut">
               <a:rPr lang="en-GB" smtClean="0"/>
-              <a:t>16/10/2025</a:t>
+              <a:t>30/10/2025</a:t>
             </a:fld>
             <a:endParaRPr lang="en-GB"/>
           </a:p>
@@ -1352,7 +1355,7 @@
           <a:p>
             <a:fld id="{96DE2DC6-35D3-402D-B58D-EF0A5A3588AA}" type="datetimeFigureOut">
               <a:rPr lang="en-GB" smtClean="0"/>
-              <a:t>16/10/2025</a:t>
+              <a:t>30/10/2025</a:t>
             </a:fld>
             <a:endParaRPr lang="en-GB"/>
           </a:p>
@@ -1598,7 +1601,7 @@
           <a:p>
             <a:fld id="{96DE2DC6-35D3-402D-B58D-EF0A5A3588AA}" type="datetimeFigureOut">
               <a:rPr lang="en-GB" smtClean="0"/>
-              <a:t>16/10/2025</a:t>
+              <a:t>30/10/2025</a:t>
             </a:fld>
             <a:endParaRPr lang="en-GB"/>
           </a:p>
@@ -1886,7 +1889,7 @@
           <a:p>
             <a:fld id="{96DE2DC6-35D3-402D-B58D-EF0A5A3588AA}" type="datetimeFigureOut">
               <a:rPr lang="en-GB" smtClean="0"/>
-              <a:t>16/10/2025</a:t>
+              <a:t>30/10/2025</a:t>
             </a:fld>
             <a:endParaRPr lang="en-GB"/>
           </a:p>
@@ -2308,7 +2311,7 @@
           <a:p>
             <a:fld id="{96DE2DC6-35D3-402D-B58D-EF0A5A3588AA}" type="datetimeFigureOut">
               <a:rPr lang="en-GB" smtClean="0"/>
-              <a:t>16/10/2025</a:t>
+              <a:t>30/10/2025</a:t>
             </a:fld>
             <a:endParaRPr lang="en-GB"/>
           </a:p>
@@ -2426,7 +2429,7 @@
           <a:p>
             <a:fld id="{96DE2DC6-35D3-402D-B58D-EF0A5A3588AA}" type="datetimeFigureOut">
               <a:rPr lang="en-GB" smtClean="0"/>
-              <a:t>16/10/2025</a:t>
+              <a:t>30/10/2025</a:t>
             </a:fld>
             <a:endParaRPr lang="en-GB"/>
           </a:p>
@@ -2521,7 +2524,7 @@
           <a:p>
             <a:fld id="{96DE2DC6-35D3-402D-B58D-EF0A5A3588AA}" type="datetimeFigureOut">
               <a:rPr lang="en-GB" smtClean="0"/>
-              <a:t>16/10/2025</a:t>
+              <a:t>30/10/2025</a:t>
             </a:fld>
             <a:endParaRPr lang="en-GB"/>
           </a:p>
@@ -2798,7 +2801,7 @@
           <a:p>
             <a:fld id="{96DE2DC6-35D3-402D-B58D-EF0A5A3588AA}" type="datetimeFigureOut">
               <a:rPr lang="en-GB" smtClean="0"/>
-              <a:t>16/10/2025</a:t>
+              <a:t>30/10/2025</a:t>
             </a:fld>
             <a:endParaRPr lang="en-GB"/>
           </a:p>
@@ -3051,7 +3054,7 @@
           <a:p>
             <a:fld id="{96DE2DC6-35D3-402D-B58D-EF0A5A3588AA}" type="datetimeFigureOut">
               <a:rPr lang="en-GB" smtClean="0"/>
-              <a:t>16/10/2025</a:t>
+              <a:t>30/10/2025</a:t>
             </a:fld>
             <a:endParaRPr lang="en-GB"/>
           </a:p>
@@ -3264,7 +3267,7 @@
           <a:p>
             <a:fld id="{96DE2DC6-35D3-402D-B58D-EF0A5A3588AA}" type="datetimeFigureOut">
               <a:rPr lang="en-GB" smtClean="0"/>
-              <a:t>16/10/2025</a:t>
+              <a:t>30/10/2025</a:t>
             </a:fld>
             <a:endParaRPr lang="en-GB"/>
           </a:p>
@@ -5957,301 +5960,151 @@
         </p:nvSpPr>
         <p:spPr/>
         <p:txBody>
+          <a:bodyPr/>
+          <a:lstStyle/>
+          <a:p>
+            <a:r>
+              <a:rPr lang="hu-HU" dirty="0" smtClean="0"/>
+              <a:t>Transzfertanulás</a:t>
+            </a:r>
+            <a:endParaRPr lang="en-GB" dirty="0"/>
+          </a:p>
+        </p:txBody>
+      </p:sp>
+      <p:sp>
+        <p:nvSpPr>
+          <p:cNvPr id="3" name="Tartalom helye 2"/>
+          <p:cNvSpPr>
+            <a:spLocks noGrp="1"/>
+          </p:cNvSpPr>
+          <p:nvPr>
+            <p:ph idx="1"/>
+          </p:nvPr>
+        </p:nvSpPr>
+        <p:spPr/>
+        <p:txBody>
           <a:bodyPr>
-            <a:normAutofit/>
+            <a:normAutofit fontScale="62500" lnSpcReduction="20000"/>
           </a:bodyPr>
           <a:lstStyle/>
           <a:p>
             <a:r>
-              <a:rPr lang="hu-HU" sz="4000" dirty="0" smtClean="0"/>
-              <a:t>A generatív modellek felemelkedése</a:t>
-            </a:r>
-            <a:endParaRPr lang="en-GB" sz="4000" dirty="0"/>
-          </a:p>
-        </p:txBody>
-      </p:sp>
-      <p:sp>
-        <p:nvSpPr>
-          <p:cNvPr id="3" name="Tartalom helye 2"/>
-          <p:cNvSpPr>
-            <a:spLocks noGrp="1"/>
-          </p:cNvSpPr>
-          <p:nvPr>
-            <p:ph idx="1"/>
-          </p:nvPr>
-        </p:nvSpPr>
-        <p:spPr/>
-        <p:txBody>
-          <a:bodyPr>
-            <a:normAutofit fontScale="70000" lnSpcReduction="20000"/>
-          </a:bodyPr>
-          <a:lstStyle/>
-          <a:p>
-            <a:r>
-              <a:rPr lang="hu-HU" dirty="0" smtClean="0"/>
-              <a:t>A </a:t>
+              <a:rPr lang="hu-HU" dirty="0" smtClean="0"/>
+              <a:t>Hagyományosan minden egyes gépi tanulási modellt </a:t>
             </a:r>
             <a:r>
               <a:rPr lang="hu-HU" b="1" dirty="0" smtClean="0"/>
-              <a:t>generatív MI </a:t>
-            </a:r>
-            <a:r>
-              <a:rPr lang="hu-HU" dirty="0" smtClean="0"/>
-              <a:t>mindig valamilyen típusú mély neurális hálón alapul.</a:t>
-            </a:r>
-          </a:p>
-          <a:p>
-            <a:r>
-              <a:rPr lang="hu-HU" dirty="0" smtClean="0"/>
-              <a:t>A legkorábbi generatív neurális háló a </a:t>
-            </a:r>
-            <a:r>
-              <a:rPr lang="hu-HU" b="1" dirty="0" err="1" smtClean="0"/>
-              <a:t>GAN</a:t>
-            </a:r>
-            <a:r>
-              <a:rPr lang="hu-HU" b="1" dirty="0"/>
-              <a:t> </a:t>
+              <a:t>külön adathalmazzal más-más feladatra </a:t>
+            </a:r>
+            <a:r>
+              <a:rPr lang="hu-HU" dirty="0" smtClean="0"/>
+              <a:t>tanítottak.</a:t>
+            </a:r>
+          </a:p>
+          <a:p>
+            <a:r>
+              <a:rPr lang="hu-HU" dirty="0" smtClean="0"/>
+              <a:t>A transzfertanulás ezzel ellentétes megközelítés:</a:t>
+            </a:r>
+          </a:p>
+          <a:p>
+            <a:pPr lvl="1"/>
+            <a:r>
+              <a:rPr lang="hu-HU" dirty="0" smtClean="0"/>
+              <a:t>egy feladatra betanítunk egy mély neurális modellt, amely az adott feladat megoldásához hasznos reprezentációkat tanul</a:t>
+            </a:r>
+          </a:p>
+          <a:p>
+            <a:pPr lvl="2"/>
+            <a:r>
+              <a:rPr lang="hu-HU" dirty="0" smtClean="0"/>
+              <a:t>pl. arcfelismerésre szolgáló képfelismerő modell: élek, motívumok, arc általános formája</a:t>
+            </a:r>
+          </a:p>
+          <a:p>
+            <a:pPr lvl="2"/>
+            <a:r>
+              <a:rPr lang="hu-HU" dirty="0" smtClean="0"/>
+              <a:t>pl. </a:t>
+            </a:r>
+            <a:r>
+              <a:rPr lang="hu-HU" dirty="0" err="1" smtClean="0"/>
+              <a:t>ImageNet</a:t>
+            </a:r>
+            <a:r>
+              <a:rPr lang="hu-HU" dirty="0" smtClean="0"/>
+              <a:t> képfelismerő modell: hasonlók, emellett különböző tárgyak, élőlények tipikus formája</a:t>
+            </a:r>
+          </a:p>
+          <a:p>
+            <a:pPr lvl="1"/>
+            <a:r>
+              <a:rPr lang="hu-HU" dirty="0" smtClean="0"/>
+              <a:t>az adott modell csak ezt a feladatot tudja megoldani, viszont </a:t>
             </a:r>
             <a:r>
               <a:rPr lang="hu-HU" b="1" dirty="0" smtClean="0"/>
-              <a:t>(</a:t>
-            </a:r>
-            <a:r>
-              <a:rPr lang="hu-HU" b="1" dirty="0" err="1" smtClean="0"/>
-              <a:t>generative</a:t>
+              <a:t>a rejtett rétegeiben tárolt reprezentációk</a:t>
+            </a:r>
+            <a:r>
+              <a:rPr lang="hu-HU" dirty="0" smtClean="0"/>
+              <a:t> nem feltétlenül csak ennek az egy feladatnak a megoldásához hasznosak</a:t>
+            </a:r>
+          </a:p>
+          <a:p>
+            <a:pPr lvl="2"/>
+            <a:r>
+              <a:rPr lang="hu-HU" dirty="0" smtClean="0"/>
+              <a:t>pl. </a:t>
+            </a:r>
+            <a:r>
+              <a:rPr lang="hu-HU" dirty="0" err="1" smtClean="0"/>
+              <a:t>ImageNet</a:t>
+            </a:r>
+            <a:r>
+              <a:rPr lang="hu-HU" dirty="0" smtClean="0"/>
+              <a:t> modell az </a:t>
+            </a:r>
+            <a:r>
+              <a:rPr lang="hu-HU" dirty="0" err="1" smtClean="0"/>
+              <a:t>ImageNetben</a:t>
+            </a:r>
+            <a:r>
+              <a:rPr lang="hu-HU" dirty="0" smtClean="0"/>
+              <a:t> szereplő pl. 10 000 osztályba tanulja meg besorolni a bemeneti képeket, de más, itt nem szereplő képmotívumoknak is nagyon hasonló a szerkezete (élei, formája stb.), így a modell reprezentációit fel lehet használni </a:t>
             </a:r>
             <a:r>
               <a:rPr lang="hu-HU" b="1" dirty="0" smtClean="0"/>
-              <a:t> </a:t>
-            </a:r>
-            <a:r>
-              <a:rPr lang="hu-HU" b="1" dirty="0" err="1" smtClean="0"/>
-              <a:t>adversarial</a:t>
+              <a:t>más osztályok </a:t>
+            </a:r>
+            <a:r>
+              <a:rPr lang="hu-HU" dirty="0" smtClean="0"/>
+              <a:t>gyors megtanulására</a:t>
+            </a:r>
+          </a:p>
+          <a:p>
+            <a:pPr lvl="2"/>
+            <a:r>
+              <a:rPr lang="hu-HU" dirty="0" smtClean="0"/>
+              <a:t>pl. arcfelismerésre tanított modell megtanulta, hogy hogy néz ki egy arc, így a reprezentációit fel lehet használni </a:t>
             </a:r>
             <a:r>
               <a:rPr lang="hu-HU" b="1" dirty="0" smtClean="0"/>
-              <a:t> </a:t>
-            </a:r>
-            <a:r>
-              <a:rPr lang="hu-HU" b="1" dirty="0" err="1" smtClean="0"/>
-              <a:t>network</a:t>
-            </a:r>
-            <a:r>
-              <a:rPr lang="hu-HU" b="1" dirty="0" smtClean="0"/>
-              <a:t>, </a:t>
-            </a:r>
-            <a:r>
-              <a:rPr lang="hu-HU" dirty="0" smtClean="0"/>
-              <a:t>kb. generatív versengő hálózat) volt, ezt 2014-ben találták fel, nagyon befolyásos lett a 2010-es évek második felében és </a:t>
-            </a:r>
-            <a:r>
-              <a:rPr lang="hu-HU" b="1" dirty="0" smtClean="0"/>
-              <a:t>képgenerálásra </a:t>
-            </a:r>
-            <a:r>
-              <a:rPr lang="hu-HU" dirty="0" smtClean="0"/>
-              <a:t>használják</a:t>
-            </a:r>
-          </a:p>
-          <a:p>
-            <a:r>
-              <a:rPr lang="hu-HU" dirty="0" smtClean="0"/>
-              <a:t>A </a:t>
-            </a:r>
-            <a:r>
-              <a:rPr lang="hu-HU" b="1" dirty="0" err="1" smtClean="0"/>
-              <a:t>transzformer</a:t>
-            </a:r>
-            <a:r>
-              <a:rPr lang="hu-HU" b="1" dirty="0" smtClean="0"/>
-              <a:t> </a:t>
-            </a:r>
-            <a:r>
-              <a:rPr lang="hu-HU" dirty="0" smtClean="0"/>
-              <a:t>neurális architektúra 2017-es feltalálása </a:t>
-            </a:r>
-            <a:r>
-              <a:rPr lang="hu-HU" b="1" dirty="0" smtClean="0"/>
-              <a:t>fordulópont volt a mélytanulás fejlődésében</a:t>
-            </a:r>
-          </a:p>
-          <a:p>
-            <a:pPr lvl="1"/>
-            <a:r>
-              <a:rPr lang="hu-HU" dirty="0" err="1" smtClean="0"/>
-              <a:t>Vaswani</a:t>
-            </a:r>
-            <a:r>
-              <a:rPr lang="hu-HU" dirty="0" smtClean="0"/>
-              <a:t> et </a:t>
-            </a:r>
-            <a:r>
-              <a:rPr lang="hu-HU" dirty="0" err="1" smtClean="0"/>
-              <a:t>al</a:t>
-            </a:r>
-            <a:r>
-              <a:rPr lang="hu-HU" dirty="0" smtClean="0"/>
-              <a:t>. (</a:t>
-            </a:r>
-            <a:r>
-              <a:rPr lang="hu-HU" dirty="0" err="1" smtClean="0"/>
-              <a:t>Google</a:t>
-            </a:r>
-            <a:r>
-              <a:rPr lang="hu-HU" dirty="0" smtClean="0"/>
-              <a:t> Research):</a:t>
-            </a:r>
-            <a:r>
-              <a:rPr lang="hu-HU" i="1" dirty="0" smtClean="0"/>
-              <a:t> </a:t>
-            </a:r>
-            <a:r>
-              <a:rPr lang="en-GB" i="1" dirty="0" smtClean="0"/>
-              <a:t>Attention </a:t>
-            </a:r>
-            <a:r>
-              <a:rPr lang="en-GB" i="1" dirty="0"/>
-              <a:t>Is All You </a:t>
-            </a:r>
-            <a:r>
-              <a:rPr lang="en-GB" i="1" dirty="0" smtClean="0"/>
-              <a:t>Need</a:t>
-            </a:r>
-            <a:r>
-              <a:rPr lang="hu-HU" i="1" dirty="0"/>
-              <a:t>, </a:t>
-            </a:r>
-            <a:r>
-              <a:rPr lang="hu-HU" dirty="0" err="1"/>
-              <a:t>https</a:t>
-            </a:r>
-            <a:r>
-              <a:rPr lang="hu-HU" dirty="0"/>
-              <a:t>://</a:t>
-            </a:r>
-            <a:r>
-              <a:rPr lang="hu-HU" dirty="0" err="1" smtClean="0"/>
-              <a:t>arxiv.org</a:t>
-            </a:r>
-            <a:r>
-              <a:rPr lang="hu-HU" dirty="0" smtClean="0"/>
-              <a:t>/</a:t>
-            </a:r>
-            <a:r>
-              <a:rPr lang="hu-HU" dirty="0" err="1" smtClean="0"/>
-              <a:t>abs</a:t>
-            </a:r>
-            <a:r>
-              <a:rPr lang="hu-HU" dirty="0" smtClean="0"/>
-              <a:t>/1706.03762, 2017 (208 000 hivatkozás)</a:t>
-            </a:r>
-          </a:p>
-          <a:p>
-            <a:r>
-              <a:rPr lang="hu-HU" dirty="0" smtClean="0"/>
-              <a:t>Első befolyásos alkalmazása a </a:t>
-            </a:r>
-            <a:r>
-              <a:rPr lang="hu-HU" dirty="0" err="1" smtClean="0"/>
-              <a:t>BERT</a:t>
-            </a:r>
-            <a:r>
-              <a:rPr lang="hu-HU" dirty="0" smtClean="0"/>
-              <a:t> kódoló nyelvmodell volt 2018-ban</a:t>
-            </a:r>
-          </a:p>
-          <a:p>
-            <a:pPr lvl="1"/>
-            <a:r>
-              <a:rPr lang="hu-HU" dirty="0" err="1" smtClean="0"/>
-              <a:t>Devlin</a:t>
-            </a:r>
-            <a:r>
-              <a:rPr lang="hu-HU" dirty="0" smtClean="0"/>
-              <a:t> et </a:t>
-            </a:r>
-            <a:r>
-              <a:rPr lang="hu-HU" dirty="0" err="1" smtClean="0"/>
-              <a:t>al</a:t>
-            </a:r>
-            <a:r>
-              <a:rPr lang="hu-HU" dirty="0" smtClean="0"/>
-              <a:t>. (</a:t>
-            </a:r>
-            <a:r>
-              <a:rPr lang="hu-HU" dirty="0" err="1" smtClean="0"/>
-              <a:t>Google</a:t>
-            </a:r>
-            <a:r>
-              <a:rPr lang="hu-HU" dirty="0" smtClean="0"/>
-              <a:t> </a:t>
-            </a:r>
-            <a:r>
-              <a:rPr lang="hu-HU" dirty="0" err="1" smtClean="0"/>
-              <a:t>AI</a:t>
-            </a:r>
-            <a:r>
-              <a:rPr lang="hu-HU" dirty="0" smtClean="0"/>
-              <a:t>): </a:t>
-            </a:r>
-            <a:r>
-              <a:rPr lang="en-GB" i="1" dirty="0"/>
-              <a:t>BERT: Pre-training of Deep Bidirectional Transformers for Language </a:t>
-            </a:r>
-            <a:r>
-              <a:rPr lang="en-GB" i="1" dirty="0" smtClean="0"/>
-              <a:t>Understanding</a:t>
-            </a:r>
-            <a:r>
-              <a:rPr lang="hu-HU" i="1" dirty="0"/>
-              <a:t>, </a:t>
-            </a:r>
-            <a:r>
-              <a:rPr lang="hu-HU" dirty="0" err="1"/>
-              <a:t>https</a:t>
-            </a:r>
-            <a:r>
-              <a:rPr lang="hu-HU" dirty="0"/>
-              <a:t>://</a:t>
-            </a:r>
-            <a:r>
-              <a:rPr lang="hu-HU" dirty="0" err="1" smtClean="0"/>
-              <a:t>arxiv.org</a:t>
-            </a:r>
-            <a:r>
-              <a:rPr lang="hu-HU" dirty="0" smtClean="0"/>
-              <a:t>/</a:t>
-            </a:r>
-            <a:r>
-              <a:rPr lang="hu-HU" dirty="0" err="1" smtClean="0"/>
-              <a:t>abs</a:t>
-            </a:r>
-            <a:r>
-              <a:rPr lang="hu-HU" dirty="0" smtClean="0"/>
-              <a:t>/1810.04805, 2018 (150 000 hivatkozás)</a:t>
-            </a:r>
-            <a:endParaRPr lang="en-GB" dirty="0"/>
+              <a:t>új arcok generálására</a:t>
+            </a:r>
           </a:p>
         </p:txBody>
       </p:sp>
     </p:spTree>
     <p:extLst>
       <p:ext uri="{BB962C8B-B14F-4D97-AF65-F5344CB8AC3E}">
-        <p14:creationId xmlns:p14="http://schemas.microsoft.com/office/powerpoint/2010/main" val="3214880838"/>
+        <p14:creationId xmlns:p14="http://schemas.microsoft.com/office/powerpoint/2010/main" val="3159307076"/>
       </p:ext>
     </p:extLst>
   </p:cSld>
   <p:clrMapOvr>
     <a:masterClrMapping/>
   </p:clrMapOvr>
-  <p:timing>
-    <p:tnLst>
-      <p:par>
-        <p:cTn id="1" dur="indefinite" restart="never" nodeType="tmRoot"/>
-      </p:par>
-    </p:tnLst>
-  </p:timing>
 </p:sld>
 </file>
 
@@ -6284,16 +6137,14 @@
         </p:nvSpPr>
         <p:spPr/>
         <p:txBody>
-          <a:bodyPr>
-            <a:normAutofit/>
-          </a:bodyPr>
+          <a:bodyPr/>
           <a:lstStyle/>
           <a:p>
             <a:r>
-              <a:rPr lang="hu-HU" sz="4000" dirty="0"/>
-              <a:t>A generatív modellek felemelkedése</a:t>
-            </a:r>
-            <a:endParaRPr lang="en-GB" sz="4000" dirty="0"/>
+              <a:rPr lang="hu-HU" dirty="0"/>
+              <a:t>Transzfertanulás</a:t>
+            </a:r>
+            <a:endParaRPr lang="en-GB" dirty="0"/>
           </a:p>
         </p:txBody>
       </p:sp>
@@ -6316,213 +6167,99 @@
           <a:p>
             <a:r>
               <a:rPr lang="hu-HU" dirty="0" smtClean="0"/>
-              <a:t>A generatív MI minden mérföldköve egy-egy úttörő tanulmányhoz köthető:</a:t>
+              <a:t>A transzfertanulás különféleképpen történhet</a:t>
             </a:r>
           </a:p>
           <a:p>
             <a:pPr lvl="1"/>
             <a:r>
-              <a:rPr lang="hu-HU" dirty="0" err="1" smtClean="0"/>
-              <a:t>Radford</a:t>
-            </a:r>
-            <a:r>
-              <a:rPr lang="hu-HU" dirty="0" smtClean="0"/>
-              <a:t> et </a:t>
-            </a:r>
-            <a:r>
-              <a:rPr lang="hu-HU" dirty="0" err="1" smtClean="0"/>
-              <a:t>al</a:t>
-            </a:r>
-            <a:r>
-              <a:rPr lang="hu-HU" dirty="0" smtClean="0"/>
-              <a:t>.: </a:t>
-            </a:r>
-            <a:r>
-              <a:rPr lang="en-GB" i="1" dirty="0" smtClean="0"/>
-              <a:t>Improving </a:t>
-            </a:r>
-            <a:r>
-              <a:rPr lang="en-GB" i="1" dirty="0"/>
-              <a:t>language understanding by generative </a:t>
-            </a:r>
-            <a:r>
-              <a:rPr lang="en-GB" i="1" dirty="0" smtClean="0"/>
-              <a:t>pre-training</a:t>
-            </a:r>
-            <a:r>
-              <a:rPr lang="hu-HU" i="1" dirty="0" smtClean="0"/>
-              <a:t> </a:t>
-            </a:r>
-            <a:r>
-              <a:rPr lang="hu-HU" dirty="0" smtClean="0"/>
-              <a:t>(</a:t>
-            </a:r>
-            <a:r>
-              <a:rPr lang="hu-HU" dirty="0" err="1" smtClean="0"/>
-              <a:t>OpenAI</a:t>
-            </a:r>
-            <a:r>
-              <a:rPr lang="hu-HU" dirty="0" smtClean="0"/>
-              <a:t>), 2018</a:t>
+              <a:rPr lang="hu-HU" dirty="0" smtClean="0"/>
+              <a:t>pl. az </a:t>
+            </a:r>
+            <a:r>
+              <a:rPr lang="hu-HU" dirty="0" err="1" smtClean="0"/>
+              <a:t>ImageNetben</a:t>
+            </a:r>
+            <a:r>
+              <a:rPr lang="hu-HU" dirty="0" smtClean="0"/>
+              <a:t> fotók szerepelnek, így a képfelismerő fotókat ismer fel, de továbbtanítható új, festményekről, rajzokról készült képekkel, így ezeket is megtanulja sokkal gyorsabban felismerni, mintha nulláról kezdenénk a tanítást</a:t>
             </a:r>
           </a:p>
           <a:p>
             <a:pPr lvl="2"/>
             <a:r>
               <a:rPr lang="hu-HU" dirty="0" smtClean="0"/>
-              <a:t>ez a cikk mutatta be a </a:t>
+              <a:t>az eredeti modell tanítását </a:t>
             </a:r>
             <a:r>
               <a:rPr lang="hu-HU" b="1" dirty="0" smtClean="0"/>
-              <a:t>GPT-1 modellt, az első csak dekódoló, </a:t>
-            </a:r>
-            <a:r>
-              <a:rPr lang="hu-HU" b="1" dirty="0" err="1" smtClean="0"/>
-              <a:t>transzformeralapú</a:t>
+              <a:t>előtanításnak</a:t>
+            </a:r>
+            <a:r>
+              <a:rPr lang="hu-HU" dirty="0" smtClean="0"/>
+              <a:t>, az új feladatra történő rátanítását </a:t>
             </a:r>
             <a:r>
               <a:rPr lang="hu-HU" b="1" dirty="0" smtClean="0"/>
-              <a:t> generatív nyelvmodellt</a:t>
+              <a:t>finomhangolásnak</a:t>
+            </a:r>
+            <a:r>
+              <a:rPr lang="hu-HU" dirty="0" smtClean="0"/>
+              <a:t> szokták nevezni</a:t>
+            </a:r>
+          </a:p>
+          <a:p>
+            <a:pPr lvl="2"/>
+            <a:r>
+              <a:rPr lang="hu-HU" dirty="0" smtClean="0"/>
+              <a:t>a finomhangolás olyan tanítás, amelynek során a modellnek az előtanítás során beállított súlyai kisebb-nagyobb mértékben módosulnak</a:t>
             </a:r>
           </a:p>
           <a:p>
             <a:pPr lvl="1"/>
             <a:r>
-              <a:rPr lang="hu-HU" dirty="0" err="1" smtClean="0"/>
-              <a:t>Radford</a:t>
-            </a:r>
-            <a:r>
-              <a:rPr lang="hu-HU" dirty="0" smtClean="0"/>
-              <a:t> et </a:t>
-            </a:r>
-            <a:r>
-              <a:rPr lang="hu-HU" dirty="0" err="1" smtClean="0"/>
-              <a:t>al</a:t>
-            </a:r>
-            <a:r>
-              <a:rPr lang="hu-HU" dirty="0" smtClean="0"/>
-              <a:t>.: </a:t>
-            </a:r>
-            <a:r>
-              <a:rPr lang="en-GB" i="1" dirty="0"/>
-              <a:t>Language Models are Unsupervised Multitask </a:t>
-            </a:r>
-            <a:r>
-              <a:rPr lang="en-GB" i="1" dirty="0" smtClean="0"/>
-              <a:t>Learners</a:t>
-            </a:r>
-            <a:r>
-              <a:rPr lang="hu-HU" i="1" dirty="0" smtClean="0"/>
-              <a:t> </a:t>
-            </a:r>
-            <a:r>
-              <a:rPr lang="hu-HU" dirty="0" smtClean="0"/>
-              <a:t>(</a:t>
-            </a:r>
-            <a:r>
-              <a:rPr lang="hu-HU" dirty="0" err="1" smtClean="0"/>
-              <a:t>OpenAI</a:t>
-            </a:r>
-            <a:r>
-              <a:rPr lang="hu-HU" dirty="0" smtClean="0"/>
-              <a:t>), 2019</a:t>
-            </a:r>
+              <a:rPr lang="hu-HU" dirty="0" smtClean="0"/>
+              <a:t>pl. egy </a:t>
+            </a:r>
+            <a:r>
+              <a:rPr lang="hu-HU" dirty="0" err="1" smtClean="0"/>
+              <a:t>BERT</a:t>
+            </a:r>
+            <a:r>
+              <a:rPr lang="hu-HU" dirty="0" smtClean="0"/>
+              <a:t> nyelvmodellt betanítunk arra, hogy </a:t>
+            </a:r>
+            <a:r>
+              <a:rPr lang="hu-HU" dirty="0" err="1" smtClean="0"/>
+              <a:t>prediktálja</a:t>
+            </a:r>
+            <a:r>
+              <a:rPr lang="hu-HU" dirty="0" smtClean="0"/>
+              <a:t>, melyik tényleges szót fedtük (</a:t>
+            </a:r>
+            <a:r>
+              <a:rPr lang="hu-HU" dirty="0" err="1" smtClean="0"/>
+              <a:t>maszkoltuk</a:t>
+            </a:r>
+            <a:r>
+              <a:rPr lang="hu-HU" dirty="0" smtClean="0"/>
+              <a:t>) el egy szövegben, így az előtanítás során a modell nagyon nagy mennyiségű szöveg (sok milliárd szövegszó) alapján megtanulja a szövegkörnyezet jelentéséből kikövetkeztetni a hiányzó szavakat</a:t>
+            </a:r>
+            <a:endParaRPr lang="hu-HU" dirty="0"/>
           </a:p>
           <a:p>
             <a:pPr lvl="2"/>
             <a:r>
               <a:rPr lang="hu-HU" dirty="0" smtClean="0"/>
-              <a:t>a GPT-2 megjelenésekor kiderült, hogy a nagyobb, milliárd paraméter nagyságrendű generatív nyelvmodellek számos </a:t>
-            </a:r>
-            <a:r>
-              <a:rPr lang="hu-HU" dirty="0" err="1" smtClean="0"/>
-              <a:t>NLP-feladatot</a:t>
-            </a:r>
-            <a:r>
-              <a:rPr lang="hu-HU" dirty="0" smtClean="0"/>
-              <a:t> (összefoglalás, fordítás, kérdésmegválaszolás) meg képesek oldani </a:t>
-            </a:r>
-            <a:r>
-              <a:rPr lang="hu-HU" b="1" dirty="0" smtClean="0"/>
-              <a:t>anélkül, hogy erre kifejezetten tanították volna</a:t>
-            </a:r>
-            <a:r>
-              <a:rPr lang="hu-HU" b="1" dirty="0"/>
-              <a:t> </a:t>
-            </a:r>
-            <a:r>
-              <a:rPr lang="hu-HU" b="1" dirty="0" smtClean="0"/>
-              <a:t>ezeket</a:t>
-            </a:r>
-          </a:p>
-          <a:p>
-            <a:pPr lvl="1"/>
-            <a:r>
-              <a:rPr lang="hu-HU" dirty="0" err="1" smtClean="0"/>
-              <a:t>Ziegler</a:t>
-            </a:r>
-            <a:r>
-              <a:rPr lang="hu-HU" dirty="0" smtClean="0"/>
-              <a:t> et </a:t>
-            </a:r>
-            <a:r>
-              <a:rPr lang="hu-HU" dirty="0" err="1" smtClean="0"/>
-              <a:t>al</a:t>
-            </a:r>
-            <a:r>
-              <a:rPr lang="hu-HU" dirty="0" smtClean="0"/>
-              <a:t>: </a:t>
-            </a:r>
-            <a:r>
-              <a:rPr lang="en-GB" i="1" dirty="0" smtClean="0"/>
-              <a:t>Fine-tuning language models from human preferences</a:t>
-            </a:r>
-            <a:r>
-              <a:rPr lang="hu-HU" i="1" dirty="0" smtClean="0"/>
-              <a:t> </a:t>
-            </a:r>
-            <a:r>
-              <a:rPr lang="hu-HU" dirty="0" smtClean="0"/>
-              <a:t>(</a:t>
-            </a:r>
-            <a:r>
-              <a:rPr lang="hu-HU" dirty="0" err="1" smtClean="0"/>
-              <a:t>OpenAI</a:t>
-            </a:r>
-            <a:r>
-              <a:rPr lang="hu-HU" dirty="0" smtClean="0"/>
-              <a:t>), 2019</a:t>
-            </a:r>
-          </a:p>
-          <a:p>
-            <a:pPr lvl="2"/>
-            <a:r>
-              <a:rPr lang="hu-HU" dirty="0" smtClean="0"/>
-              <a:t>bemutatta az </a:t>
-            </a:r>
-            <a:r>
-              <a:rPr lang="hu-HU" b="1" dirty="0" smtClean="0"/>
-              <a:t>emberi visszacsatolásból történő megerősítéses tanulás </a:t>
-            </a:r>
-            <a:r>
-              <a:rPr lang="hu-HU" dirty="0" smtClean="0"/>
-              <a:t>ötletét, amely később meghatározó eleme lett annak, hogy chatbotként tanuljon meg viselkedni egy generatív nyelvmodell; így hozták létre a </a:t>
-            </a:r>
-            <a:r>
-              <a:rPr lang="hu-HU" dirty="0" err="1" smtClean="0"/>
-              <a:t>ChatGPT-t</a:t>
-            </a:r>
-            <a:r>
-              <a:rPr lang="hu-HU" dirty="0" smtClean="0"/>
-              <a:t> </a:t>
-            </a:r>
-            <a:r>
-              <a:rPr lang="hu-HU" dirty="0" err="1" smtClean="0"/>
-              <a:t>a</a:t>
-            </a:r>
-            <a:r>
-              <a:rPr lang="hu-HU" dirty="0" smtClean="0"/>
-              <a:t> 2020-ban kiadott GPT-3 generatív nyelvmodellt továbbtanítva</a:t>
+              <a:t>egy ilyen előtanított modell aztán további rejtett rétegek és egy kimeneti réteg hozzáadásával </a:t>
+            </a:r>
+            <a:r>
+              <a:rPr lang="hu-HU" dirty="0" err="1" smtClean="0"/>
+              <a:t>finomhangolható</a:t>
+            </a:r>
+            <a:r>
+              <a:rPr lang="hu-HU" dirty="0" smtClean="0"/>
+              <a:t> arra, hogy téma szerint csoportosítson újságcikkeket vagy megkülönböztessen spamet nem spamtől</a:t>
             </a:r>
           </a:p>
         </p:txBody>
@@ -6530,7 +6267,7 @@
     </p:spTree>
     <p:extLst>
       <p:ext uri="{BB962C8B-B14F-4D97-AF65-F5344CB8AC3E}">
-        <p14:creationId xmlns:p14="http://schemas.microsoft.com/office/powerpoint/2010/main" val="4094443"/>
+        <p14:creationId xmlns:p14="http://schemas.microsoft.com/office/powerpoint/2010/main" val="825950773"/>
       </p:ext>
     </p:extLst>
   </p:cSld>
@@ -6559,6 +6296,29 @@
       </p:grpSpPr>
       <p:sp>
         <p:nvSpPr>
+          <p:cNvPr id="2" name="Cím 1"/>
+          <p:cNvSpPr>
+            <a:spLocks noGrp="1"/>
+          </p:cNvSpPr>
+          <p:nvPr>
+            <p:ph type="title"/>
+          </p:nvPr>
+        </p:nvSpPr>
+        <p:spPr/>
+        <p:txBody>
+          <a:bodyPr/>
+          <a:lstStyle/>
+          <a:p>
+            <a:r>
+              <a:rPr lang="hu-HU" dirty="0" smtClean="0"/>
+              <a:t>Transzfertanulás előnyei</a:t>
+            </a:r>
+            <a:endParaRPr lang="en-GB" dirty="0"/>
+          </a:p>
+        </p:txBody>
+      </p:sp>
+      <p:sp>
+        <p:nvSpPr>
           <p:cNvPr id="3" name="Tartalom helye 2"/>
           <p:cNvSpPr>
             <a:spLocks noGrp="1"/>
@@ -6576,616 +6336,47 @@
           <a:p>
             <a:r>
               <a:rPr lang="hu-HU" dirty="0"/>
-              <a:t>A generatív MI minden mérföldköve egy-egy úttörő tanulmányhoz köthető:</a:t>
-            </a:r>
-          </a:p>
-          <a:p>
-            <a:pPr lvl="1"/>
-            <a:r>
-              <a:rPr lang="hu-HU" dirty="0" smtClean="0"/>
-              <a:t>Brown et </a:t>
-            </a:r>
-            <a:r>
-              <a:rPr lang="hu-HU" dirty="0" err="1" smtClean="0"/>
-              <a:t>al</a:t>
-            </a:r>
-            <a:r>
-              <a:rPr lang="hu-HU" dirty="0" smtClean="0"/>
-              <a:t>.: </a:t>
-            </a:r>
-            <a:r>
-              <a:rPr lang="en-GB" i="1" dirty="0" smtClean="0"/>
-              <a:t>Language </a:t>
-            </a:r>
-            <a:r>
-              <a:rPr lang="en-GB" i="1" dirty="0"/>
-              <a:t>models are few-shot </a:t>
-            </a:r>
-            <a:r>
-              <a:rPr lang="en-GB" i="1" dirty="0" smtClean="0"/>
-              <a:t>learners</a:t>
-            </a:r>
-            <a:r>
-              <a:rPr lang="hu-HU" i="1" dirty="0" smtClean="0"/>
-              <a:t>. </a:t>
-            </a:r>
-            <a:r>
-              <a:rPr lang="hu-HU" dirty="0" smtClean="0"/>
-              <a:t>(</a:t>
-            </a:r>
-            <a:r>
-              <a:rPr lang="hu-HU" dirty="0" err="1" smtClean="0"/>
-              <a:t>OpenAI</a:t>
-            </a:r>
-            <a:r>
-              <a:rPr lang="hu-HU" dirty="0" smtClean="0"/>
-              <a:t>), </a:t>
-            </a:r>
-            <a:r>
-              <a:rPr lang="hu-HU" dirty="0" err="1" smtClean="0"/>
-              <a:t>NeurIPS</a:t>
-            </a:r>
-            <a:r>
-              <a:rPr lang="hu-HU" dirty="0" smtClean="0"/>
-              <a:t> 2020</a:t>
+              <a:t>S</a:t>
+            </a:r>
+            <a:r>
+              <a:rPr lang="hu-HU" dirty="0" smtClean="0"/>
+              <a:t>zámítási hatékonyság: sokkal kisebb számítási erőforrás szükséges egy modell finomhangolásához egy feladatra, mint teljesen új modell tanításához</a:t>
+            </a:r>
+          </a:p>
+          <a:p>
+            <a:r>
+              <a:rPr lang="hu-HU" dirty="0"/>
+              <a:t>A</a:t>
+            </a:r>
+            <a:r>
+              <a:rPr lang="hu-HU" dirty="0" smtClean="0"/>
+              <a:t>dathatékonyság: egy mély neurális háló előtanításához tipikusan sok millió, esetleg sok milliárd adatra van szükség, a finomhangoláshoz többnyire elég néhány ezer vagy tízezer</a:t>
+            </a:r>
+          </a:p>
+          <a:p>
+            <a:r>
+              <a:rPr lang="hu-HU" dirty="0"/>
+              <a:t>Á</a:t>
+            </a:r>
+            <a:r>
+              <a:rPr lang="hu-HU" dirty="0" smtClean="0"/>
+              <a:t>ltalánosítás: nagy, sokféle különböző adatot tartalmazó adathalmazon előtanított nagy mélytanulási modellek finomhangolásával kapott modellek általában sokkal sikeresebben oldanak meg specifikus feladatokat, mint kifejezetten a specifikus feladatra előtanított modellek</a:t>
             </a:r>
           </a:p>
           <a:p>
             <a:pPr lvl="2"/>
             <a:r>
               <a:rPr lang="hu-HU" dirty="0" smtClean="0"/>
-              <a:t>a GPT-3-ról, az </a:t>
-            </a:r>
-            <a:r>
-              <a:rPr lang="hu-HU" b="1" dirty="0" smtClean="0"/>
-              <a:t>első valódi nagy nyelvmodellről (175 millió paraméter) </a:t>
-            </a:r>
-            <a:r>
-              <a:rPr lang="hu-HU" dirty="0" smtClean="0"/>
-              <a:t>szóló cikk; ha generatív nyelvmodellt felskálázunk 10 és 100 milliárd paraméteres tartományba, </a:t>
-            </a:r>
-            <a:r>
-              <a:rPr lang="hu-HU" b="1" dirty="0" smtClean="0"/>
-              <a:t>jelentősen javul a teljesítménye </a:t>
-            </a:r>
-            <a:r>
-              <a:rPr lang="hu-HU" dirty="0" smtClean="0"/>
-              <a:t>olyan </a:t>
-            </a:r>
-            <a:r>
-              <a:rPr lang="hu-HU" dirty="0" err="1" smtClean="0"/>
-              <a:t>NLP-feladatokon</a:t>
-            </a:r>
-            <a:r>
-              <a:rPr lang="hu-HU" dirty="0" smtClean="0"/>
-              <a:t>, amelyekre nem lett kifejezetten tanítva</a:t>
-            </a:r>
-          </a:p>
-          <a:p>
-            <a:pPr lvl="1"/>
-            <a:r>
-              <a:rPr lang="hu-HU" dirty="0" smtClean="0"/>
-              <a:t>Kaplan et </a:t>
-            </a:r>
-            <a:r>
-              <a:rPr lang="hu-HU" dirty="0" err="1" smtClean="0"/>
-              <a:t>al</a:t>
-            </a:r>
-            <a:r>
-              <a:rPr lang="hu-HU" dirty="0" smtClean="0"/>
-              <a:t>.: </a:t>
-            </a:r>
-            <a:r>
-              <a:rPr lang="en-GB" i="1" dirty="0"/>
-              <a:t>Scaling laws for neural language </a:t>
-            </a:r>
-            <a:r>
-              <a:rPr lang="en-GB" i="1" dirty="0" smtClean="0"/>
-              <a:t>models</a:t>
-            </a:r>
-            <a:r>
-              <a:rPr lang="hu-HU" i="1" dirty="0" smtClean="0"/>
-              <a:t>. </a:t>
-            </a:r>
-            <a:r>
-              <a:rPr lang="hu-HU" dirty="0" smtClean="0"/>
-              <a:t>(</a:t>
-            </a:r>
-            <a:r>
-              <a:rPr lang="hu-HU" dirty="0" err="1" smtClean="0"/>
-              <a:t>OpenAI</a:t>
-            </a:r>
-            <a:r>
-              <a:rPr lang="hu-HU" dirty="0" smtClean="0"/>
-              <a:t>), 2020</a:t>
-            </a:r>
-          </a:p>
-          <a:p>
-            <a:pPr lvl="2"/>
-            <a:r>
-              <a:rPr lang="hu-HU" b="1" dirty="0" err="1" smtClean="0"/>
-              <a:t>exactly</a:t>
-            </a:r>
-            <a:r>
-              <a:rPr lang="hu-HU" b="1" dirty="0" smtClean="0"/>
-              <a:t> </a:t>
-            </a:r>
-            <a:r>
-              <a:rPr lang="hu-HU" b="1" dirty="0" err="1" smtClean="0"/>
-              <a:t>how</a:t>
-            </a:r>
-            <a:r>
-              <a:rPr lang="hu-HU" b="1" dirty="0"/>
-              <a:t> </a:t>
-            </a:r>
-            <a:r>
-              <a:rPr lang="hu-HU" dirty="0" err="1" smtClean="0"/>
-              <a:t>does</a:t>
-            </a:r>
-            <a:r>
-              <a:rPr lang="hu-HU" dirty="0" smtClean="0"/>
-              <a:t> </a:t>
-            </a:r>
-            <a:r>
-              <a:rPr lang="hu-HU" dirty="0" err="1" smtClean="0"/>
-              <a:t>the</a:t>
-            </a:r>
-            <a:r>
-              <a:rPr lang="hu-HU" dirty="0" smtClean="0"/>
-              <a:t> </a:t>
-            </a:r>
-            <a:r>
-              <a:rPr lang="hu-HU" b="1" dirty="0" err="1" smtClean="0"/>
-              <a:t>loss</a:t>
-            </a:r>
-            <a:r>
-              <a:rPr lang="hu-HU" b="1" dirty="0" smtClean="0"/>
-              <a:t> </a:t>
-            </a:r>
-            <a:r>
-              <a:rPr lang="hu-HU" dirty="0" smtClean="0"/>
-              <a:t>of a </a:t>
-            </a:r>
-            <a:r>
-              <a:rPr lang="hu-HU" dirty="0" err="1" smtClean="0"/>
-              <a:t>language</a:t>
-            </a:r>
-            <a:r>
-              <a:rPr lang="hu-HU" dirty="0" smtClean="0"/>
-              <a:t> </a:t>
-            </a:r>
-            <a:r>
-              <a:rPr lang="hu-HU" dirty="0" err="1" smtClean="0"/>
-              <a:t>model</a:t>
-            </a:r>
-            <a:r>
-              <a:rPr lang="hu-HU" dirty="0" smtClean="0"/>
-              <a:t> </a:t>
-            </a:r>
-            <a:r>
-              <a:rPr lang="hu-HU" dirty="0" err="1" smtClean="0"/>
-              <a:t>scale</a:t>
-            </a:r>
-            <a:r>
-              <a:rPr lang="hu-HU" dirty="0" smtClean="0"/>
-              <a:t> </a:t>
-            </a:r>
-            <a:r>
-              <a:rPr lang="hu-HU" dirty="0" err="1" smtClean="0"/>
-              <a:t>with</a:t>
-            </a:r>
-            <a:r>
-              <a:rPr lang="hu-HU" dirty="0" smtClean="0"/>
-              <a:t> </a:t>
-            </a:r>
-            <a:r>
-              <a:rPr lang="hu-HU" b="1" dirty="0" err="1" smtClean="0"/>
-              <a:t>model</a:t>
-            </a:r>
-            <a:r>
-              <a:rPr lang="hu-HU" b="1" dirty="0" smtClean="0"/>
-              <a:t> </a:t>
-            </a:r>
-            <a:r>
-              <a:rPr lang="hu-HU" b="1" dirty="0" err="1" smtClean="0"/>
-              <a:t>size</a:t>
-            </a:r>
-            <a:r>
-              <a:rPr lang="hu-HU" b="1" dirty="0" smtClean="0"/>
-              <a:t>, </a:t>
-            </a:r>
-            <a:r>
-              <a:rPr lang="hu-HU" b="1" dirty="0" err="1" smtClean="0"/>
-              <a:t>dataset</a:t>
-            </a:r>
-            <a:r>
-              <a:rPr lang="hu-HU" b="1" dirty="0" smtClean="0"/>
-              <a:t> </a:t>
-            </a:r>
-            <a:r>
-              <a:rPr lang="hu-HU" b="1" dirty="0" err="1" smtClean="0"/>
-              <a:t>size</a:t>
-            </a:r>
-            <a:r>
-              <a:rPr lang="hu-HU" b="1" dirty="0" smtClean="0"/>
-              <a:t> </a:t>
-            </a:r>
-            <a:r>
-              <a:rPr lang="hu-HU" dirty="0" smtClean="0"/>
-              <a:t>and </a:t>
-            </a:r>
-            <a:r>
-              <a:rPr lang="hu-HU" dirty="0" err="1" smtClean="0"/>
-              <a:t>the</a:t>
-            </a:r>
-            <a:r>
-              <a:rPr lang="hu-HU" dirty="0" smtClean="0"/>
-              <a:t> </a:t>
-            </a:r>
-            <a:r>
-              <a:rPr lang="hu-HU" dirty="0" err="1" smtClean="0"/>
-              <a:t>amount</a:t>
-            </a:r>
-            <a:r>
-              <a:rPr lang="hu-HU" dirty="0" smtClean="0"/>
-              <a:t> of </a:t>
-            </a:r>
-            <a:r>
-              <a:rPr lang="hu-HU" dirty="0" err="1" smtClean="0"/>
-              <a:t>compute</a:t>
-            </a:r>
-            <a:r>
-              <a:rPr lang="hu-HU" dirty="0" smtClean="0"/>
-              <a:t> </a:t>
-            </a:r>
-            <a:r>
-              <a:rPr lang="hu-HU" dirty="0" err="1" smtClean="0"/>
-              <a:t>used</a:t>
-            </a:r>
-            <a:r>
-              <a:rPr lang="hu-HU" dirty="0" smtClean="0"/>
-              <a:t> </a:t>
-            </a:r>
-            <a:r>
-              <a:rPr lang="hu-HU" dirty="0" err="1" smtClean="0"/>
-              <a:t>for</a:t>
-            </a:r>
-            <a:r>
-              <a:rPr lang="hu-HU" dirty="0" smtClean="0"/>
-              <a:t> </a:t>
-            </a:r>
-            <a:r>
-              <a:rPr lang="hu-HU" dirty="0" err="1" smtClean="0"/>
-              <a:t>training</a:t>
-            </a:r>
-            <a:r>
-              <a:rPr lang="hu-HU" dirty="0" smtClean="0"/>
-              <a:t>?</a:t>
-            </a:r>
-          </a:p>
-          <a:p>
-            <a:pPr lvl="1"/>
-            <a:r>
-              <a:rPr lang="hu-HU" dirty="0" err="1" smtClean="0"/>
-              <a:t>Radford</a:t>
-            </a:r>
-            <a:r>
-              <a:rPr lang="hu-HU" dirty="0" smtClean="0"/>
-              <a:t> et </a:t>
-            </a:r>
-            <a:r>
-              <a:rPr lang="hu-HU" dirty="0" err="1" smtClean="0"/>
-              <a:t>al</a:t>
-            </a:r>
-            <a:r>
-              <a:rPr lang="hu-HU" dirty="0" smtClean="0"/>
-              <a:t>.: </a:t>
-            </a:r>
-            <a:r>
-              <a:rPr lang="en-GB" dirty="0"/>
-              <a:t>Learning Transferable Visual Models From Natural Language </a:t>
-            </a:r>
-            <a:r>
-              <a:rPr lang="en-GB" dirty="0" smtClean="0"/>
-              <a:t>Supervision</a:t>
-            </a:r>
-            <a:r>
-              <a:rPr lang="hu-HU" dirty="0"/>
-              <a:t> </a:t>
-            </a:r>
-            <a:r>
-              <a:rPr lang="hu-HU" dirty="0" smtClean="0"/>
-              <a:t>(</a:t>
-            </a:r>
-            <a:r>
-              <a:rPr lang="hu-HU" dirty="0" err="1" smtClean="0"/>
-              <a:t>OpenAI</a:t>
-            </a:r>
-            <a:r>
-              <a:rPr lang="hu-HU" dirty="0" smtClean="0"/>
-              <a:t>), </a:t>
-            </a:r>
-            <a:r>
-              <a:rPr lang="hu-HU" dirty="0" err="1" smtClean="0"/>
-              <a:t>PMLR</a:t>
-            </a:r>
-            <a:r>
-              <a:rPr lang="hu-HU" dirty="0" smtClean="0"/>
-              <a:t> 139, 2021</a:t>
-            </a:r>
-          </a:p>
-          <a:p>
-            <a:pPr lvl="2"/>
-            <a:r>
-              <a:rPr lang="hu-HU" dirty="0" err="1" smtClean="0"/>
-              <a:t>instead</a:t>
-            </a:r>
-            <a:r>
-              <a:rPr lang="hu-HU" dirty="0" smtClean="0"/>
-              <a:t> of </a:t>
-            </a:r>
-            <a:r>
-              <a:rPr lang="hu-HU" dirty="0" err="1" smtClean="0"/>
-              <a:t>training</a:t>
-            </a:r>
-            <a:r>
-              <a:rPr lang="hu-HU" dirty="0" smtClean="0"/>
-              <a:t> </a:t>
-            </a:r>
-            <a:r>
-              <a:rPr lang="hu-HU" dirty="0" err="1" smtClean="0"/>
-              <a:t>vision</a:t>
-            </a:r>
-            <a:r>
-              <a:rPr lang="hu-HU" dirty="0" smtClean="0"/>
-              <a:t> </a:t>
-            </a:r>
-            <a:r>
-              <a:rPr lang="hu-HU" dirty="0" err="1" smtClean="0"/>
-              <a:t>models</a:t>
-            </a:r>
-            <a:r>
-              <a:rPr lang="hu-HU" dirty="0" smtClean="0"/>
-              <a:t> </a:t>
-            </a:r>
-            <a:r>
-              <a:rPr lang="hu-HU" dirty="0" err="1" smtClean="0"/>
-              <a:t>to</a:t>
-            </a:r>
-            <a:r>
-              <a:rPr lang="hu-HU" dirty="0" smtClean="0"/>
-              <a:t> </a:t>
-            </a:r>
-            <a:r>
-              <a:rPr lang="hu-HU" dirty="0" err="1" smtClean="0"/>
-              <a:t>classify</a:t>
-            </a:r>
-            <a:r>
-              <a:rPr lang="hu-HU" dirty="0" smtClean="0"/>
-              <a:t> </a:t>
-            </a:r>
-            <a:r>
-              <a:rPr lang="hu-HU" dirty="0" err="1" smtClean="0"/>
-              <a:t>images</a:t>
-            </a:r>
-            <a:r>
-              <a:rPr lang="hu-HU" dirty="0" smtClean="0"/>
-              <a:t> </a:t>
-            </a:r>
-            <a:r>
-              <a:rPr lang="hu-HU" dirty="0" err="1" smtClean="0"/>
-              <a:t>into</a:t>
-            </a:r>
-            <a:r>
-              <a:rPr lang="hu-HU" dirty="0" smtClean="0"/>
-              <a:t> </a:t>
-            </a:r>
-            <a:r>
-              <a:rPr lang="hu-HU" dirty="0" err="1" smtClean="0"/>
-              <a:t>predetermined</a:t>
-            </a:r>
-            <a:r>
-              <a:rPr lang="hu-HU" dirty="0" smtClean="0"/>
-              <a:t> </a:t>
-            </a:r>
-            <a:r>
-              <a:rPr lang="hu-HU" dirty="0" err="1" smtClean="0"/>
-              <a:t>categories</a:t>
-            </a:r>
-            <a:r>
-              <a:rPr lang="hu-HU" dirty="0" smtClean="0"/>
-              <a:t>, </a:t>
-            </a:r>
-            <a:r>
-              <a:rPr lang="hu-HU" dirty="0" err="1" smtClean="0"/>
-              <a:t>they</a:t>
-            </a:r>
-            <a:r>
-              <a:rPr lang="hu-HU" dirty="0" smtClean="0"/>
-              <a:t> </a:t>
-            </a:r>
-            <a:r>
-              <a:rPr lang="hu-HU" dirty="0" err="1" smtClean="0"/>
-              <a:t>can</a:t>
-            </a:r>
-            <a:r>
-              <a:rPr lang="hu-HU" dirty="0" smtClean="0"/>
-              <a:t> be </a:t>
-            </a:r>
-            <a:r>
-              <a:rPr lang="hu-HU" dirty="0" err="1" smtClean="0"/>
-              <a:t>trained</a:t>
-            </a:r>
-            <a:r>
-              <a:rPr lang="hu-HU" dirty="0" smtClean="0"/>
-              <a:t> </a:t>
-            </a:r>
-            <a:r>
-              <a:rPr lang="hu-HU" dirty="0" err="1" smtClean="0"/>
-              <a:t>to</a:t>
-            </a:r>
-            <a:r>
-              <a:rPr lang="hu-HU" dirty="0" smtClean="0"/>
-              <a:t> </a:t>
-            </a:r>
-            <a:r>
-              <a:rPr lang="hu-HU" b="1" dirty="0" err="1" smtClean="0"/>
-              <a:t>associate</a:t>
-            </a:r>
-            <a:r>
-              <a:rPr lang="hu-HU" b="1" dirty="0" smtClean="0"/>
-              <a:t> </a:t>
-            </a:r>
-            <a:r>
-              <a:rPr lang="hu-HU" b="1" dirty="0" err="1" smtClean="0"/>
-              <a:t>images</a:t>
-            </a:r>
-            <a:r>
-              <a:rPr lang="hu-HU" b="1" dirty="0" smtClean="0"/>
-              <a:t> </a:t>
-            </a:r>
-            <a:r>
-              <a:rPr lang="hu-HU" b="1" dirty="0" err="1" smtClean="0"/>
-              <a:t>with</a:t>
-            </a:r>
-            <a:r>
-              <a:rPr lang="hu-HU" b="1" dirty="0" smtClean="0"/>
-              <a:t> </a:t>
-            </a:r>
-            <a:r>
-              <a:rPr lang="hu-HU" b="1" dirty="0" err="1" smtClean="0"/>
-              <a:t>raw</a:t>
-            </a:r>
-            <a:r>
-              <a:rPr lang="hu-HU" b="1" dirty="0" smtClean="0"/>
-              <a:t> text </a:t>
-            </a:r>
-            <a:r>
-              <a:rPr lang="hu-HU" b="1" dirty="0" err="1" smtClean="0"/>
-              <a:t>captions</a:t>
-            </a:r>
-            <a:r>
-              <a:rPr lang="hu-HU" dirty="0" smtClean="0"/>
-              <a:t>; </a:t>
-            </a:r>
-            <a:r>
-              <a:rPr lang="hu-HU" dirty="0" err="1" smtClean="0"/>
-              <a:t>this</a:t>
-            </a:r>
-            <a:r>
-              <a:rPr lang="hu-HU" dirty="0" smtClean="0"/>
-              <a:t> </a:t>
-            </a:r>
-            <a:r>
-              <a:rPr lang="hu-HU" dirty="0" err="1" smtClean="0"/>
-              <a:t>was</a:t>
-            </a:r>
-            <a:r>
-              <a:rPr lang="hu-HU" dirty="0" smtClean="0"/>
-              <a:t> </a:t>
-            </a:r>
-            <a:r>
-              <a:rPr lang="hu-HU" dirty="0" err="1" smtClean="0"/>
-              <a:t>crucial</a:t>
-            </a:r>
-            <a:r>
-              <a:rPr lang="hu-HU" dirty="0" smtClean="0"/>
-              <a:t> </a:t>
-            </a:r>
-            <a:r>
-              <a:rPr lang="hu-HU" dirty="0" err="1" smtClean="0"/>
-              <a:t>for</a:t>
-            </a:r>
-            <a:r>
-              <a:rPr lang="hu-HU" dirty="0" smtClean="0"/>
-              <a:t> </a:t>
-            </a:r>
-            <a:r>
-              <a:rPr lang="hu-HU" dirty="0" err="1" smtClean="0"/>
-              <a:t>the</a:t>
-            </a:r>
-            <a:r>
-              <a:rPr lang="hu-HU" dirty="0" smtClean="0"/>
-              <a:t> </a:t>
-            </a:r>
-            <a:r>
-              <a:rPr lang="hu-HU" dirty="0" err="1" smtClean="0"/>
-              <a:t>development</a:t>
-            </a:r>
-            <a:r>
-              <a:rPr lang="hu-HU" dirty="0" smtClean="0"/>
-              <a:t> of </a:t>
-            </a:r>
-            <a:r>
-              <a:rPr lang="hu-HU" b="1" dirty="0" smtClean="0"/>
-              <a:t>image </a:t>
-            </a:r>
-            <a:r>
-              <a:rPr lang="hu-HU" b="1" dirty="0" err="1" smtClean="0"/>
-              <a:t>generation</a:t>
-            </a:r>
-            <a:r>
-              <a:rPr lang="hu-HU" b="1" dirty="0" smtClean="0"/>
-              <a:t> </a:t>
-            </a:r>
-            <a:r>
-              <a:rPr lang="hu-HU" b="1" dirty="0" err="1" smtClean="0"/>
-              <a:t>based</a:t>
-            </a:r>
-            <a:r>
-              <a:rPr lang="hu-HU" b="1" dirty="0" smtClean="0"/>
-              <a:t> </a:t>
-            </a:r>
-            <a:r>
-              <a:rPr lang="hu-HU" b="1" dirty="0" err="1" smtClean="0"/>
-              <a:t>on</a:t>
-            </a:r>
-            <a:r>
-              <a:rPr lang="hu-HU" b="1" dirty="0" smtClean="0"/>
-              <a:t> text </a:t>
-            </a:r>
-            <a:r>
-              <a:rPr lang="hu-HU" b="1" dirty="0" err="1" smtClean="0"/>
-              <a:t>prompts</a:t>
-            </a:r>
-            <a:endParaRPr lang="hu-HU" b="1" dirty="0" smtClean="0"/>
-          </a:p>
-        </p:txBody>
-      </p:sp>
-      <p:sp>
-        <p:nvSpPr>
-          <p:cNvPr id="7" name="Cím 1"/>
-          <p:cNvSpPr>
-            <a:spLocks noGrp="1"/>
-          </p:cNvSpPr>
-          <p:nvPr>
-            <p:ph type="title"/>
-          </p:nvPr>
-        </p:nvSpPr>
-        <p:spPr>
-          <a:xfrm>
-            <a:off x="457200" y="274638"/>
-            <a:ext cx="8229600" cy="1143000"/>
-          </a:xfrm>
-        </p:spPr>
-        <p:txBody>
-          <a:bodyPr>
-            <a:normAutofit/>
-          </a:bodyPr>
-          <a:lstStyle/>
-          <a:p>
-            <a:r>
-              <a:rPr lang="hu-HU" sz="4000" dirty="0"/>
-              <a:t>A generatív modellek felemelkedése</a:t>
-            </a:r>
-            <a:endParaRPr lang="en-GB" sz="4000" dirty="0"/>
+              <a:t>pl.: ha egy többnyelvű, nagyon nagy mennyiségű (több százmilliárd szövegszó), sok nyelvből származó adatokon előtanított nyelvmodell tanítóadatai egy adott nyelvből (pl. lengyel) csak viszonylag kevés adatot tartalmaznak (pl. 100 millió szó), az a modell jó eséllyel még így is sikeresebben generál lengyel szöveget, mintha sokkal több (pl. 10 milliárd szó), de csak lengyel anyagon tanítottunk volna egy hasonló modellt</a:t>
+            </a:r>
+            <a:endParaRPr lang="en-GB" dirty="0"/>
           </a:p>
         </p:txBody>
       </p:sp>
     </p:spTree>
     <p:extLst>
       <p:ext uri="{BB962C8B-B14F-4D97-AF65-F5344CB8AC3E}">
-        <p14:creationId xmlns:p14="http://schemas.microsoft.com/office/powerpoint/2010/main" val="412625451"/>
+        <p14:creationId xmlns:p14="http://schemas.microsoft.com/office/powerpoint/2010/main" val="3720043098"/>
       </p:ext>
     </p:extLst>
   </p:cSld>
@@ -7224,71 +6415,101 @@
         </p:nvSpPr>
         <p:spPr/>
         <p:txBody>
-          <a:bodyPr/>
-          <a:lstStyle/>
-          <a:p>
-            <a:r>
-              <a:rPr lang="hu-HU" dirty="0" smtClean="0"/>
-              <a:t>Az MI helyzete napjainkban</a:t>
-            </a:r>
-            <a:endParaRPr lang="en-GB" dirty="0"/>
-          </a:p>
-        </p:txBody>
-      </p:sp>
-      <p:sp>
-        <p:nvSpPr>
-          <p:cNvPr id="3" name="Tartalom helye 2"/>
-          <p:cNvSpPr>
-            <a:spLocks noGrp="1"/>
-          </p:cNvSpPr>
-          <p:nvPr>
-            <p:ph idx="1"/>
-          </p:nvPr>
-        </p:nvSpPr>
-        <p:spPr/>
-        <p:txBody>
           <a:bodyPr>
-            <a:normAutofit fontScale="77500" lnSpcReduction="20000"/>
+            <a:normAutofit/>
           </a:bodyPr>
           <a:lstStyle/>
           <a:p>
             <a:r>
+              <a:rPr lang="hu-HU" sz="4000" dirty="0" smtClean="0"/>
+              <a:t>A generatív modellek felemelkedése</a:t>
+            </a:r>
+            <a:endParaRPr lang="en-GB" sz="4000" dirty="0"/>
+          </a:p>
+        </p:txBody>
+      </p:sp>
+      <p:sp>
+        <p:nvSpPr>
+          <p:cNvPr id="3" name="Tartalom helye 2"/>
+          <p:cNvSpPr>
+            <a:spLocks noGrp="1"/>
+          </p:cNvSpPr>
+          <p:nvPr>
+            <p:ph idx="1"/>
+          </p:nvPr>
+        </p:nvSpPr>
+        <p:spPr/>
+        <p:txBody>
+          <a:bodyPr>
+            <a:normAutofit fontScale="70000" lnSpcReduction="20000"/>
+          </a:bodyPr>
+          <a:lstStyle/>
+          <a:p>
+            <a:r>
+              <a:rPr lang="hu-HU" dirty="0" smtClean="0"/>
+              <a:t>A </a:t>
+            </a:r>
+            <a:r>
               <a:rPr lang="hu-HU" b="1" dirty="0" smtClean="0"/>
-              <a:t>Szimbolikus </a:t>
+              <a:t>generatív MI </a:t>
+            </a:r>
+            <a:r>
+              <a:rPr lang="hu-HU" dirty="0" smtClean="0"/>
+              <a:t>mindig valamilyen típusú mély neurális hálón alapul.</a:t>
+            </a:r>
+          </a:p>
+          <a:p>
+            <a:r>
+              <a:rPr lang="hu-HU" dirty="0" smtClean="0"/>
+              <a:t>A legkorábbi generatív neurális háló a </a:t>
             </a:r>
             <a:r>
               <a:rPr lang="hu-HU" b="1" dirty="0" err="1" smtClean="0"/>
-              <a:t>MI-n</a:t>
+              <a:t>GAN</a:t>
+            </a:r>
+            <a:r>
+              <a:rPr lang="hu-HU" b="1" dirty="0"/>
+              <a:t> </a:t>
+            </a:r>
+            <a:r>
+              <a:rPr lang="hu-HU" b="1" dirty="0" smtClean="0"/>
+              <a:t>(</a:t>
+            </a:r>
+            <a:r>
+              <a:rPr lang="hu-HU" b="1" dirty="0" err="1" smtClean="0"/>
+              <a:t>generative</a:t>
             </a:r>
             <a:r>
               <a:rPr lang="hu-HU" b="1" dirty="0" smtClean="0"/>
               <a:t> </a:t>
             </a:r>
             <a:r>
-              <a:rPr lang="hu-HU" dirty="0" smtClean="0"/>
-              <a:t>alapuló eszközöket (</a:t>
-            </a:r>
-            <a:r>
-              <a:rPr lang="hu-HU" dirty="0" err="1" smtClean="0"/>
-              <a:t>nemklasszikus</a:t>
-            </a:r>
-            <a:r>
-              <a:rPr lang="hu-HU" dirty="0" smtClean="0"/>
-              <a:t> logikák, tudásreprezentáció, logikai következtető rendszerek, kereső algoritmusok) továbbra is kutatják az informatikában, sok területen alkalmazzák</a:t>
-            </a:r>
-          </a:p>
-          <a:p>
-            <a:r>
               <a:rPr lang="hu-HU" b="1" dirty="0" err="1" smtClean="0"/>
-              <a:t>Feladatspecifikus</a:t>
+              <a:t>adversarial</a:t>
             </a:r>
             <a:r>
               <a:rPr lang="hu-HU" b="1" dirty="0" smtClean="0"/>
-              <a:t> gépi tanulási modellek, </a:t>
-            </a:r>
-            <a:r>
-              <a:rPr lang="hu-HU" dirty="0" smtClean="0"/>
-              <a:t>többek között mély neurális hálók kulcsfontosságúak számos alkalmazási területen</a:t>
+              <a:t> </a:t>
+            </a:r>
+            <a:r>
+              <a:rPr lang="hu-HU" b="1" dirty="0" err="1" smtClean="0"/>
+              <a:t>network</a:t>
+            </a:r>
+            <a:r>
+              <a:rPr lang="hu-HU" b="1" dirty="0" smtClean="0"/>
+              <a:t>, </a:t>
+            </a:r>
+            <a:r>
+              <a:rPr lang="hu-HU" dirty="0" smtClean="0"/>
+              <a:t>kb. generatív versengő hálózat) volt, ezt 2014-ben találták fel, nagyon befolyásos lett a 2010-es évek második felében és </a:t>
+            </a:r>
+            <a:r>
+              <a:rPr lang="hu-HU" b="1" dirty="0" smtClean="0"/>
+              <a:t>képgenerálásra </a:t>
+            </a:r>
+            <a:r>
+              <a:rPr lang="hu-HU" dirty="0" smtClean="0"/>
+              <a:t>használják</a:t>
             </a:r>
           </a:p>
           <a:p>
@@ -7297,48 +6518,198 @@
               <a:t>A </a:t>
             </a:r>
             <a:r>
-              <a:rPr lang="hu-HU" b="1" dirty="0"/>
-              <a:t>g</a:t>
+              <a:rPr lang="hu-HU" b="1" dirty="0" err="1" smtClean="0"/>
+              <a:t>transzformer</a:t>
             </a:r>
             <a:r>
               <a:rPr lang="hu-HU" b="1" dirty="0" smtClean="0"/>
-              <a:t>eneratív nyelvmodelleket természetesnyelv-feldolgozási </a:t>
-            </a:r>
-            <a:r>
-              <a:rPr lang="hu-HU" dirty="0" smtClean="0"/>
-              <a:t>(</a:t>
-            </a:r>
-            <a:r>
-              <a:rPr lang="hu-HU" dirty="0" err="1" smtClean="0"/>
-              <a:t>NLP</a:t>
-            </a:r>
-            <a:r>
-              <a:rPr lang="hu-HU" dirty="0" smtClean="0"/>
-              <a:t>) feladatokra használják, pl. gépi fordítás, chat, programozók támogatása programozási asszisztensként – sok egyébre nem jók</a:t>
-            </a:r>
-          </a:p>
-          <a:p>
+              <a:t> </a:t>
+            </a:r>
+            <a:r>
+              <a:rPr lang="hu-HU" dirty="0" smtClean="0"/>
+              <a:t>neurális architektúra 2017-es feltalálása </a:t>
+            </a:r>
             <a:r>
               <a:rPr lang="hu-HU" b="1" dirty="0" smtClean="0"/>
-              <a:t>Generatív képfeldolgozó modellek </a:t>
-            </a:r>
-            <a:r>
-              <a:rPr lang="hu-HU" dirty="0" smtClean="0"/>
-              <a:t>népszerűek álló- és mozgóképek generálására</a:t>
-            </a:r>
+              <a:t>fordulópont volt a mélytanulás fejlődésében</a:t>
+            </a:r>
+          </a:p>
+          <a:p>
+            <a:pPr lvl="1"/>
+            <a:r>
+              <a:rPr lang="hu-HU" dirty="0" err="1" smtClean="0"/>
+              <a:t>Vaswani</a:t>
+            </a:r>
+            <a:r>
+              <a:rPr lang="hu-HU" dirty="0" smtClean="0"/>
+              <a:t> et </a:t>
+            </a:r>
+            <a:r>
+              <a:rPr lang="hu-HU" dirty="0" err="1" smtClean="0"/>
+              <a:t>al</a:t>
+            </a:r>
+            <a:r>
+              <a:rPr lang="hu-HU" dirty="0" smtClean="0"/>
+              <a:t>. (</a:t>
+            </a:r>
+            <a:r>
+              <a:rPr lang="hu-HU" dirty="0" err="1" smtClean="0"/>
+              <a:t>Google</a:t>
+            </a:r>
+            <a:r>
+              <a:rPr lang="hu-HU" dirty="0" smtClean="0"/>
+              <a:t> Research):</a:t>
+            </a:r>
+            <a:r>
+              <a:rPr lang="hu-HU" i="1" dirty="0" smtClean="0"/>
+              <a:t> </a:t>
+            </a:r>
+            <a:r>
+              <a:rPr lang="en-GB" i="1" dirty="0" smtClean="0"/>
+              <a:t>Attention </a:t>
+            </a:r>
+            <a:r>
+              <a:rPr lang="en-GB" i="1" dirty="0"/>
+              <a:t>Is All You </a:t>
+            </a:r>
+            <a:r>
+              <a:rPr lang="en-GB" i="1" dirty="0" smtClean="0"/>
+              <a:t>Need</a:t>
+            </a:r>
+            <a:r>
+              <a:rPr lang="hu-HU" i="1" dirty="0"/>
+              <a:t>, </a:t>
+            </a:r>
+            <a:r>
+              <a:rPr lang="hu-HU" dirty="0" err="1"/>
+              <a:t>https</a:t>
+            </a:r>
+            <a:r>
+              <a:rPr lang="hu-HU" dirty="0"/>
+              <a:t>://</a:t>
+            </a:r>
+            <a:r>
+              <a:rPr lang="hu-HU" dirty="0" err="1" smtClean="0"/>
+              <a:t>arxiv.org</a:t>
+            </a:r>
+            <a:r>
+              <a:rPr lang="hu-HU" dirty="0" smtClean="0"/>
+              <a:t>/</a:t>
+            </a:r>
+            <a:r>
+              <a:rPr lang="hu-HU" dirty="0" err="1" smtClean="0"/>
+              <a:t>abs</a:t>
+            </a:r>
+            <a:r>
+              <a:rPr lang="hu-HU" dirty="0" smtClean="0"/>
+              <a:t>/1706.03762, 2017 (208 000 hivatkozás)</a:t>
+            </a:r>
+          </a:p>
+          <a:p>
+            <a:r>
+              <a:rPr lang="hu-HU" dirty="0" smtClean="0"/>
+              <a:t>Első befolyásos alkalmazása a </a:t>
+            </a:r>
+            <a:r>
+              <a:rPr lang="hu-HU" dirty="0" err="1" smtClean="0"/>
+              <a:t>BERT</a:t>
+            </a:r>
+            <a:r>
+              <a:rPr lang="hu-HU" dirty="0" smtClean="0"/>
+              <a:t> kódoló nyelvmodell volt 2018-ban</a:t>
+            </a:r>
+          </a:p>
+          <a:p>
+            <a:pPr lvl="1"/>
+            <a:r>
+              <a:rPr lang="hu-HU" dirty="0" err="1" smtClean="0"/>
+              <a:t>Devlin</a:t>
+            </a:r>
+            <a:r>
+              <a:rPr lang="hu-HU" dirty="0" smtClean="0"/>
+              <a:t> et </a:t>
+            </a:r>
+            <a:r>
+              <a:rPr lang="hu-HU" dirty="0" err="1" smtClean="0"/>
+              <a:t>al</a:t>
+            </a:r>
+            <a:r>
+              <a:rPr lang="hu-HU" dirty="0" smtClean="0"/>
+              <a:t>. (</a:t>
+            </a:r>
+            <a:r>
+              <a:rPr lang="hu-HU" dirty="0" err="1" smtClean="0"/>
+              <a:t>Google</a:t>
+            </a:r>
+            <a:r>
+              <a:rPr lang="hu-HU" dirty="0" smtClean="0"/>
+              <a:t> </a:t>
+            </a:r>
+            <a:r>
+              <a:rPr lang="hu-HU" dirty="0" err="1" smtClean="0"/>
+              <a:t>AI</a:t>
+            </a:r>
+            <a:r>
+              <a:rPr lang="hu-HU" dirty="0" smtClean="0"/>
+              <a:t>): </a:t>
+            </a:r>
+            <a:r>
+              <a:rPr lang="en-GB" i="1" dirty="0"/>
+              <a:t>BERT: Pre-training of Deep Bidirectional Transformers for Language </a:t>
+            </a:r>
+            <a:r>
+              <a:rPr lang="en-GB" i="1" dirty="0" smtClean="0"/>
+              <a:t>Understanding</a:t>
+            </a:r>
+            <a:r>
+              <a:rPr lang="hu-HU" i="1" dirty="0"/>
+              <a:t>, </a:t>
+            </a:r>
+            <a:r>
+              <a:rPr lang="hu-HU" dirty="0" err="1"/>
+              <a:t>https</a:t>
+            </a:r>
+            <a:r>
+              <a:rPr lang="hu-HU" dirty="0"/>
+              <a:t>://</a:t>
+            </a:r>
+            <a:r>
+              <a:rPr lang="hu-HU" dirty="0" err="1" smtClean="0"/>
+              <a:t>arxiv.org</a:t>
+            </a:r>
+            <a:r>
+              <a:rPr lang="hu-HU" dirty="0" smtClean="0"/>
+              <a:t>/</a:t>
+            </a:r>
+            <a:r>
+              <a:rPr lang="hu-HU" dirty="0" err="1" smtClean="0"/>
+              <a:t>abs</a:t>
+            </a:r>
+            <a:r>
+              <a:rPr lang="hu-HU" dirty="0" smtClean="0"/>
+              <a:t>/1810.04805, 2018 (150 000 hivatkozás)</a:t>
+            </a:r>
+            <a:endParaRPr lang="en-GB" dirty="0"/>
           </a:p>
         </p:txBody>
       </p:sp>
     </p:spTree>
     <p:extLst>
       <p:ext uri="{BB962C8B-B14F-4D97-AF65-F5344CB8AC3E}">
-        <p14:creationId xmlns:p14="http://schemas.microsoft.com/office/powerpoint/2010/main" val="4261464058"/>
+        <p14:creationId xmlns:p14="http://schemas.microsoft.com/office/powerpoint/2010/main" val="3214880838"/>
       </p:ext>
     </p:extLst>
   </p:cSld>
   <p:clrMapOvr>
     <a:masterClrMapping/>
   </p:clrMapOvr>
+  <p:timing>
+    <p:tnLst>
+      <p:par>
+        <p:cTn id="1" dur="indefinite" restart="never" nodeType="tmRoot"/>
+      </p:par>
+    </p:tnLst>
+  </p:timing>
 </p:sld>
 </file>
 
@@ -7371,191 +6742,245 @@
         </p:nvSpPr>
         <p:spPr/>
         <p:txBody>
-          <a:bodyPr/>
-          <a:lstStyle/>
-          <a:p>
-            <a:r>
-              <a:rPr lang="hu-HU" dirty="0"/>
-              <a:t>Az MI helyzete napjainkban</a:t>
-            </a:r>
-            <a:endParaRPr lang="en-GB" dirty="0"/>
-          </a:p>
-        </p:txBody>
-      </p:sp>
-      <p:sp>
-        <p:nvSpPr>
-          <p:cNvPr id="3" name="Tartalom helye 2"/>
-          <p:cNvSpPr>
-            <a:spLocks noGrp="1"/>
-          </p:cNvSpPr>
-          <p:nvPr>
-            <p:ph idx="1"/>
-          </p:nvPr>
-        </p:nvSpPr>
-        <p:spPr/>
-        <p:txBody>
           <a:bodyPr>
-            <a:normAutofit fontScale="62500" lnSpcReduction="20000"/>
+            <a:normAutofit/>
           </a:bodyPr>
           <a:lstStyle/>
           <a:p>
             <a:r>
+              <a:rPr lang="hu-HU" sz="4000" dirty="0"/>
+              <a:t>A generatív modellek felemelkedése</a:t>
+            </a:r>
+            <a:endParaRPr lang="en-GB" sz="4000" dirty="0"/>
+          </a:p>
+        </p:txBody>
+      </p:sp>
+      <p:sp>
+        <p:nvSpPr>
+          <p:cNvPr id="3" name="Tartalom helye 2"/>
+          <p:cNvSpPr>
+            <a:spLocks noGrp="1"/>
+          </p:cNvSpPr>
+          <p:nvPr>
+            <p:ph idx="1"/>
+          </p:nvPr>
+        </p:nvSpPr>
+        <p:spPr/>
+        <p:txBody>
+          <a:bodyPr>
+            <a:normAutofit fontScale="70000" lnSpcReduction="20000"/>
+          </a:bodyPr>
+          <a:lstStyle/>
+          <a:p>
+            <a:r>
+              <a:rPr lang="hu-HU" dirty="0" smtClean="0"/>
+              <a:t>A generatív MI minden mérföldköve egy-egy úttörő tanulmányhoz köthető:</a:t>
+            </a:r>
+          </a:p>
+          <a:p>
+            <a:pPr lvl="1"/>
+            <a:r>
+              <a:rPr lang="hu-HU" dirty="0" err="1" smtClean="0"/>
+              <a:t>Radford</a:t>
+            </a:r>
+            <a:r>
+              <a:rPr lang="hu-HU" dirty="0" smtClean="0"/>
+              <a:t> et </a:t>
+            </a:r>
+            <a:r>
+              <a:rPr lang="hu-HU" dirty="0" err="1" smtClean="0"/>
+              <a:t>al</a:t>
+            </a:r>
+            <a:r>
+              <a:rPr lang="hu-HU" dirty="0" smtClean="0"/>
+              <a:t>.: </a:t>
+            </a:r>
+            <a:r>
+              <a:rPr lang="en-GB" i="1" dirty="0" smtClean="0"/>
+              <a:t>Improving </a:t>
+            </a:r>
+            <a:r>
+              <a:rPr lang="en-GB" i="1" dirty="0"/>
+              <a:t>language understanding by generative </a:t>
+            </a:r>
+            <a:r>
+              <a:rPr lang="en-GB" i="1" dirty="0" smtClean="0"/>
+              <a:t>pre-training</a:t>
+            </a:r>
+            <a:r>
+              <a:rPr lang="hu-HU" i="1" dirty="0" smtClean="0"/>
+              <a:t> </a:t>
+            </a:r>
+            <a:r>
+              <a:rPr lang="hu-HU" dirty="0" smtClean="0"/>
+              <a:t>(</a:t>
+            </a:r>
+            <a:r>
+              <a:rPr lang="hu-HU" dirty="0" err="1" smtClean="0"/>
+              <a:t>OpenAI</a:t>
+            </a:r>
+            <a:r>
+              <a:rPr lang="hu-HU" dirty="0" smtClean="0"/>
+              <a:t>), 2018</a:t>
+            </a:r>
+          </a:p>
+          <a:p>
+            <a:pPr lvl="2"/>
+            <a:r>
+              <a:rPr lang="hu-HU" dirty="0" smtClean="0"/>
+              <a:t>ez a cikk mutatta be a </a:t>
+            </a:r>
+            <a:r>
               <a:rPr lang="hu-HU" b="1" dirty="0" smtClean="0"/>
-              <a:t>Mélytanulási modelleket számos területen </a:t>
-            </a:r>
-            <a:r>
-              <a:rPr lang="hu-HU" dirty="0" smtClean="0"/>
-              <a:t>használnak, ezeknek csak kis hányada generatív. Általános célkitűzések:</a:t>
+              <a:t>GPT-1 modellt, az első csak dekódoló, </a:t>
+            </a:r>
+            <a:r>
+              <a:rPr lang="hu-HU" b="1" dirty="0" err="1" smtClean="0"/>
+              <a:t>transzformeralapú</a:t>
+            </a:r>
+            <a:r>
+              <a:rPr lang="hu-HU" b="1" dirty="0" smtClean="0"/>
+              <a:t> generatív nyelvmodellt</a:t>
             </a:r>
           </a:p>
           <a:p>
             <a:pPr lvl="1"/>
             <a:r>
-              <a:rPr lang="hu-HU" dirty="0" smtClean="0"/>
-              <a:t>1. Gépi látás (~ képfeldolgozás)</a:t>
+              <a:rPr lang="hu-HU" dirty="0" err="1" smtClean="0"/>
+              <a:t>Radford</a:t>
+            </a:r>
+            <a:r>
+              <a:rPr lang="hu-HU" dirty="0" smtClean="0"/>
+              <a:t> et </a:t>
+            </a:r>
+            <a:r>
+              <a:rPr lang="hu-HU" dirty="0" err="1" smtClean="0"/>
+              <a:t>al</a:t>
+            </a:r>
+            <a:r>
+              <a:rPr lang="hu-HU" dirty="0" smtClean="0"/>
+              <a:t>.: </a:t>
+            </a:r>
+            <a:r>
+              <a:rPr lang="en-GB" i="1" dirty="0"/>
+              <a:t>Language Models are Unsupervised Multitask </a:t>
+            </a:r>
+            <a:r>
+              <a:rPr lang="en-GB" i="1" dirty="0" smtClean="0"/>
+              <a:t>Learners</a:t>
+            </a:r>
+            <a:r>
+              <a:rPr lang="hu-HU" i="1" dirty="0" smtClean="0"/>
+              <a:t> </a:t>
+            </a:r>
+            <a:r>
+              <a:rPr lang="hu-HU" dirty="0" smtClean="0"/>
+              <a:t>(</a:t>
+            </a:r>
+            <a:r>
+              <a:rPr lang="hu-HU" dirty="0" err="1" smtClean="0"/>
+              <a:t>OpenAI</a:t>
+            </a:r>
+            <a:r>
+              <a:rPr lang="hu-HU" dirty="0" smtClean="0"/>
+              <a:t>), 2019</a:t>
             </a:r>
           </a:p>
           <a:p>
             <a:pPr lvl="2"/>
             <a:r>
               <a:rPr lang="hu-HU" dirty="0" smtClean="0"/>
-              <a:t>képosztályozás: tárgyak felismerése, képfelirat generálása</a:t>
+              <a:t>a GPT-2 megjelenésekor kiderült, hogy a nagyobb, milliárd paraméter nagyságrendű generatív nyelvmodellek számos </a:t>
+            </a:r>
+            <a:r>
+              <a:rPr lang="hu-HU" dirty="0" err="1" smtClean="0"/>
+              <a:t>NLP-feladatot</a:t>
+            </a:r>
+            <a:r>
+              <a:rPr lang="hu-HU" dirty="0" smtClean="0"/>
+              <a:t> (összefoglalás, fordítás, kérdésmegválaszolás) meg képesek oldani </a:t>
+            </a:r>
+            <a:r>
+              <a:rPr lang="hu-HU" b="1" dirty="0" smtClean="0"/>
+              <a:t>anélkül, hogy erre kifejezetten tanították volna</a:t>
+            </a:r>
+            <a:r>
+              <a:rPr lang="hu-HU" b="1" dirty="0"/>
+              <a:t> </a:t>
+            </a:r>
+            <a:r>
+              <a:rPr lang="hu-HU" b="1" dirty="0" smtClean="0"/>
+              <a:t>ezeket</a:t>
+            </a:r>
+          </a:p>
+          <a:p>
+            <a:pPr lvl="1"/>
+            <a:r>
+              <a:rPr lang="hu-HU" dirty="0" err="1" smtClean="0"/>
+              <a:t>Ziegler</a:t>
+            </a:r>
+            <a:r>
+              <a:rPr lang="hu-HU" dirty="0" smtClean="0"/>
+              <a:t> et </a:t>
+            </a:r>
+            <a:r>
+              <a:rPr lang="hu-HU" dirty="0" err="1" smtClean="0"/>
+              <a:t>al</a:t>
+            </a:r>
+            <a:r>
+              <a:rPr lang="hu-HU" dirty="0" smtClean="0"/>
+              <a:t>: </a:t>
+            </a:r>
+            <a:r>
+              <a:rPr lang="en-GB" i="1" dirty="0" smtClean="0"/>
+              <a:t>Fine-tuning language models from human preferences</a:t>
+            </a:r>
+            <a:r>
+              <a:rPr lang="hu-HU" i="1" dirty="0" smtClean="0"/>
+              <a:t> </a:t>
+            </a:r>
+            <a:r>
+              <a:rPr lang="hu-HU" dirty="0" smtClean="0"/>
+              <a:t>(</a:t>
+            </a:r>
+            <a:r>
+              <a:rPr lang="hu-HU" dirty="0" err="1" smtClean="0"/>
+              <a:t>OpenAI</a:t>
+            </a:r>
+            <a:r>
+              <a:rPr lang="hu-HU" dirty="0" smtClean="0"/>
+              <a:t>), 2019</a:t>
             </a:r>
           </a:p>
           <a:p>
             <a:pPr lvl="2"/>
             <a:r>
               <a:rPr lang="hu-HU" dirty="0" smtClean="0"/>
-              <a:t>tárgyészlelés: hol vannak tárgyak a képen, hányan vannak, pl. </a:t>
-            </a:r>
-            <a:r>
-              <a:rPr lang="hu-HU" dirty="0" err="1" smtClean="0"/>
-              <a:t>okostelefonok</a:t>
-            </a:r>
-            <a:r>
-              <a:rPr lang="hu-HU" dirty="0" smtClean="0"/>
-              <a:t> kameráját működtető szoftver, biztonsági rendszerek</a:t>
-            </a:r>
-          </a:p>
-          <a:p>
-            <a:pPr lvl="2"/>
-            <a:r>
-              <a:rPr lang="hu-HU" dirty="0" smtClean="0"/>
-              <a:t>képszegmentálás: az előbbihez hasonló, hol vannak érdekes területek a képen, pl. orvosi képalkotás (daganatok felismerése)</a:t>
-            </a:r>
-          </a:p>
-          <a:p>
-            <a:pPr lvl="2"/>
-            <a:r>
-              <a:rPr lang="hu-HU" dirty="0" smtClean="0"/>
-              <a:t>arcfelismerés: azonosítás, beléptetés, érzelmek észlelése</a:t>
-            </a:r>
-          </a:p>
-          <a:p>
-            <a:pPr lvl="2"/>
-            <a:r>
-              <a:rPr lang="hu-HU" dirty="0" smtClean="0"/>
-              <a:t>OCR: szöveg kinyerése képekből vagy </a:t>
-            </a:r>
-            <a:r>
-              <a:rPr lang="hu-HU" dirty="0" err="1" smtClean="0"/>
-              <a:t>szkennelt</a:t>
-            </a:r>
-            <a:r>
-              <a:rPr lang="hu-HU" dirty="0" smtClean="0"/>
-              <a:t> dokumentumokból</a:t>
-            </a:r>
-          </a:p>
-          <a:p>
-            <a:pPr lvl="2"/>
+              <a:t>bemutatta az </a:t>
+            </a:r>
             <a:r>
               <a:rPr lang="hu-HU" b="1" dirty="0" smtClean="0"/>
-              <a:t>képgenerálás: </a:t>
-            </a:r>
-            <a:r>
-              <a:rPr lang="hu-HU" dirty="0" smtClean="0"/>
-              <a:t>szöveges </a:t>
-            </a:r>
-            <a:r>
-              <a:rPr lang="hu-HU" dirty="0" err="1" smtClean="0"/>
-              <a:t>promtból</a:t>
-            </a:r>
-            <a:r>
-              <a:rPr lang="hu-HU" dirty="0" smtClean="0"/>
-              <a:t> vagy anélkül, stílusátvitel, </a:t>
-            </a:r>
-            <a:r>
-              <a:rPr lang="hu-HU" dirty="0" err="1" smtClean="0"/>
-              <a:t>deepfake</a:t>
-            </a:r>
-            <a:r>
-              <a:rPr lang="hu-HU" dirty="0" smtClean="0"/>
-              <a:t>, </a:t>
-            </a:r>
-            <a:r>
-              <a:rPr lang="hu-HU" dirty="0" err="1" smtClean="0"/>
-              <a:t>MI-művészet</a:t>
-            </a:r>
-            <a:endParaRPr lang="hu-HU" dirty="0" smtClean="0"/>
-          </a:p>
-          <a:p>
-            <a:pPr lvl="1"/>
-            <a:r>
-              <a:rPr lang="hu-HU" dirty="0" smtClean="0"/>
-              <a:t>2. Természetes nyelveken írt szövegek feldolgozása (</a:t>
-            </a:r>
-            <a:r>
-              <a:rPr lang="hu-HU" dirty="0" err="1" smtClean="0"/>
-              <a:t>NLP</a:t>
-            </a:r>
-            <a:r>
-              <a:rPr lang="hu-HU" dirty="0" smtClean="0"/>
-              <a:t>)</a:t>
-            </a:r>
-          </a:p>
-          <a:p>
-            <a:pPr lvl="2"/>
-            <a:r>
-              <a:rPr lang="hu-HU" dirty="0" smtClean="0"/>
-              <a:t>információ-visszakeresés: egy kérdéshez kapcsolódó dokumentumok megtalálása egy szöveges adatbázisban</a:t>
-            </a:r>
-            <a:endParaRPr lang="hu-HU" b="1" dirty="0" smtClean="0"/>
-          </a:p>
-          <a:p>
-            <a:pPr lvl="2"/>
-            <a:r>
-              <a:rPr lang="hu-HU" b="1" dirty="0" smtClean="0"/>
-              <a:t>összefoglalás: </a:t>
-            </a:r>
-            <a:r>
-              <a:rPr lang="hu-HU" dirty="0" smtClean="0"/>
-              <a:t>dokumentum tartalmának rövid összegzése</a:t>
-            </a:r>
-          </a:p>
-          <a:p>
-            <a:pPr lvl="2"/>
-            <a:r>
-              <a:rPr lang="hu-HU" b="1" dirty="0" smtClean="0"/>
-              <a:t>szöveggenerálás</a:t>
-            </a:r>
-            <a:r>
-              <a:rPr lang="hu-HU" dirty="0" smtClean="0"/>
-              <a:t>: chatbotok (pl. </a:t>
-            </a:r>
-            <a:r>
-              <a:rPr lang="hu-HU" dirty="0" err="1" smtClean="0"/>
-              <a:t>ChatGPT</a:t>
-            </a:r>
-            <a:r>
-              <a:rPr lang="hu-HU" dirty="0" smtClean="0"/>
-              <a:t>), tartalmak generálása</a:t>
-            </a:r>
-          </a:p>
-          <a:p>
-            <a:pPr lvl="2"/>
-            <a:r>
-              <a:rPr lang="hu-HU" b="1" dirty="0" smtClean="0"/>
-              <a:t>gépi fordítás</a:t>
+              <a:t>emberi visszacsatolásból történő megerősítéses tanulás </a:t>
+            </a:r>
+            <a:r>
+              <a:rPr lang="hu-HU" dirty="0" smtClean="0"/>
+              <a:t>ötletét, amely később meghatározó eleme lett annak, hogy chatbotként tanuljon meg viselkedni egy generatív nyelvmodell; így hozták létre a </a:t>
+            </a:r>
+            <a:r>
+              <a:rPr lang="hu-HU" dirty="0" err="1" smtClean="0"/>
+              <a:t>ChatGPT-t</a:t>
+            </a:r>
+            <a:r>
+              <a:rPr lang="hu-HU" dirty="0" smtClean="0"/>
+              <a:t> </a:t>
+            </a:r>
+            <a:r>
+              <a:rPr lang="hu-HU" dirty="0" err="1" smtClean="0"/>
+              <a:t>a</a:t>
+            </a:r>
+            <a:r>
+              <a:rPr lang="hu-HU" dirty="0" smtClean="0"/>
+              <a:t> 2020-ban kiadott GPT-3 generatív nyelvmodellt továbbtanítva</a:t>
             </a:r>
           </a:p>
         </p:txBody>
@@ -7563,7 +6988,7 @@
     </p:spTree>
     <p:extLst>
       <p:ext uri="{BB962C8B-B14F-4D97-AF65-F5344CB8AC3E}">
-        <p14:creationId xmlns:p14="http://schemas.microsoft.com/office/powerpoint/2010/main" val="486831476"/>
+        <p14:creationId xmlns:p14="http://schemas.microsoft.com/office/powerpoint/2010/main" val="4094443"/>
       </p:ext>
     </p:extLst>
   </p:cSld>
@@ -7735,93 +7160,59 @@
       </p:grpSpPr>
       <p:sp>
         <p:nvSpPr>
-          <p:cNvPr id="2" name="Cím 1"/>
-          <p:cNvSpPr>
-            <a:spLocks noGrp="1"/>
-          </p:cNvSpPr>
-          <p:nvPr>
-            <p:ph type="title"/>
+          <p:cNvPr id="3" name="Tartalom helye 2"/>
+          <p:cNvSpPr>
+            <a:spLocks noGrp="1"/>
+          </p:cNvSpPr>
+          <p:nvPr>
+            <p:ph idx="1"/>
           </p:nvPr>
         </p:nvSpPr>
         <p:spPr/>
         <p:txBody>
-          <a:bodyPr/>
-          <a:lstStyle/>
-          <a:p>
-            <a:r>
-              <a:rPr lang="hu-HU" dirty="0"/>
-              <a:t>Az MI helyzete napjainkban</a:t>
-            </a:r>
-            <a:endParaRPr lang="en-GB" dirty="0"/>
-          </a:p>
-        </p:txBody>
-      </p:sp>
-      <p:sp>
-        <p:nvSpPr>
-          <p:cNvPr id="3" name="Tartalom helye 2"/>
-          <p:cNvSpPr>
-            <a:spLocks noGrp="1"/>
-          </p:cNvSpPr>
-          <p:nvPr>
-            <p:ph idx="1"/>
-          </p:nvPr>
-        </p:nvSpPr>
-        <p:spPr/>
-        <p:txBody>
           <a:bodyPr>
-            <a:normAutofit fontScale="77500" lnSpcReduction="20000"/>
+            <a:normAutofit fontScale="70000" lnSpcReduction="20000"/>
           </a:bodyPr>
           <a:lstStyle/>
           <a:p>
             <a:r>
-              <a:rPr lang="hu-HU" sz="2400" b="1" dirty="0"/>
-              <a:t>Mélytanulási modelleket számos területen </a:t>
-            </a:r>
-            <a:r>
-              <a:rPr lang="hu-HU" sz="2400" dirty="0"/>
-              <a:t>használnak, ezeknek csak kis hányada </a:t>
-            </a:r>
-            <a:r>
-              <a:rPr lang="hu-HU" sz="2400" dirty="0" smtClean="0"/>
-              <a:t>generatív. </a:t>
-            </a:r>
-            <a:r>
-              <a:rPr lang="hu-HU" sz="2000" dirty="0"/>
-              <a:t>Általános célkitűzések</a:t>
-            </a:r>
-            <a:r>
-              <a:rPr lang="hu-HU" sz="2000" dirty="0" smtClean="0"/>
-              <a:t>:</a:t>
-            </a:r>
-            <a:endParaRPr lang="hu-HU" sz="2400" dirty="0"/>
-          </a:p>
-          <a:p>
-            <a:pPr marL="800100" lvl="3" indent="-342900"/>
-            <a:r>
-              <a:rPr lang="hu-HU" dirty="0" smtClean="0"/>
-              <a:t>3. Beszéd- és hangfeldolgozás</a:t>
-            </a:r>
-          </a:p>
-          <a:p>
-            <a:pPr marL="1257300" lvl="4" indent="-342900">
-              <a:buFont typeface="Arial" panose="020B0604020202020204" pitchFamily="34" charset="0"/>
-              <a:buChar char="•"/>
-            </a:pPr>
-            <a:r>
               <a:rPr lang="hu-HU" dirty="0"/>
-              <a:t>b</a:t>
-            </a:r>
-            <a:r>
-              <a:rPr lang="hu-HU" dirty="0" smtClean="0"/>
-              <a:t>eszédfelismerés (</a:t>
-            </a:r>
-            <a:r>
-              <a:rPr lang="hu-HU" dirty="0" err="1" smtClean="0"/>
-              <a:t>ASR</a:t>
-            </a:r>
-            <a:r>
-              <a:rPr lang="hu-HU" dirty="0" smtClean="0"/>
-              <a:t>): digitális asszisztensek vagy leirat készítése hangfelvételről, pl. az </a:t>
+              <a:t>A generatív MI minden mérföldköve egy-egy úttörő tanulmányhoz köthető:</a:t>
+            </a:r>
+          </a:p>
+          <a:p>
+            <a:pPr lvl="1"/>
+            <a:r>
+              <a:rPr lang="hu-HU" dirty="0" smtClean="0"/>
+              <a:t>Brown et </a:t>
+            </a:r>
+            <a:r>
+              <a:rPr lang="hu-HU" dirty="0" err="1" smtClean="0"/>
+              <a:t>al</a:t>
+            </a:r>
+            <a:r>
+              <a:rPr lang="hu-HU" dirty="0" smtClean="0"/>
+              <a:t>.: </a:t>
+            </a:r>
+            <a:r>
+              <a:rPr lang="en-GB" i="1" dirty="0" smtClean="0"/>
+              <a:t>Language </a:t>
+            </a:r>
+            <a:r>
+              <a:rPr lang="en-GB" i="1" dirty="0"/>
+              <a:t>models are few-shot </a:t>
+            </a:r>
+            <a:r>
+              <a:rPr lang="en-GB" i="1" dirty="0" smtClean="0"/>
+              <a:t>learners</a:t>
+            </a:r>
+            <a:r>
+              <a:rPr lang="hu-HU" i="1" dirty="0" smtClean="0"/>
+              <a:t>. </a:t>
+            </a:r>
+            <a:r>
+              <a:rPr lang="hu-HU" dirty="0" smtClean="0"/>
+              <a:t>(</a:t>
             </a:r>
             <a:r>
               <a:rPr lang="hu-HU" dirty="0" err="1" smtClean="0"/>
@@ -7829,194 +7220,573 @@
             </a:r>
             <a:r>
               <a:rPr lang="hu-HU" dirty="0" smtClean="0"/>
+              <a:t>), </a:t>
+            </a:r>
+            <a:r>
+              <a:rPr lang="hu-HU" dirty="0" err="1" smtClean="0"/>
+              <a:t>NeurIPS</a:t>
+            </a:r>
+            <a:r>
+              <a:rPr lang="hu-HU" dirty="0" smtClean="0"/>
+              <a:t> 2020</a:t>
+            </a:r>
+          </a:p>
+          <a:p>
+            <a:pPr lvl="2"/>
+            <a:r>
+              <a:rPr lang="hu-HU" dirty="0" smtClean="0"/>
+              <a:t>a GPT-3-ról, az </a:t>
+            </a:r>
+            <a:r>
+              <a:rPr lang="hu-HU" b="1" dirty="0" smtClean="0"/>
+              <a:t>első valódi nagy nyelvmodellről (175 millió paraméter) </a:t>
+            </a:r>
+            <a:r>
+              <a:rPr lang="hu-HU" dirty="0" smtClean="0"/>
+              <a:t>szóló cikk; ha generatív nyelvmodellt felskálázunk 10 és 100 milliárd paraméteres tartományba, </a:t>
+            </a:r>
+            <a:r>
+              <a:rPr lang="hu-HU" b="1" dirty="0" smtClean="0"/>
+              <a:t>jelentősen javul a teljesítménye </a:t>
+            </a:r>
+            <a:r>
+              <a:rPr lang="hu-HU" dirty="0" smtClean="0"/>
+              <a:t>olyan </a:t>
+            </a:r>
+            <a:r>
+              <a:rPr lang="hu-HU" dirty="0" err="1" smtClean="0"/>
+              <a:t>NLP-feladatokon</a:t>
+            </a:r>
+            <a:r>
+              <a:rPr lang="hu-HU" dirty="0" smtClean="0"/>
+              <a:t>, amelyekre nem lett kifejezetten tanítva</a:t>
+            </a:r>
+          </a:p>
+          <a:p>
+            <a:pPr lvl="1"/>
+            <a:r>
+              <a:rPr lang="hu-HU" dirty="0" smtClean="0"/>
+              <a:t>Kaplan et </a:t>
+            </a:r>
+            <a:r>
+              <a:rPr lang="hu-HU" dirty="0" err="1" smtClean="0"/>
+              <a:t>al</a:t>
+            </a:r>
+            <a:r>
+              <a:rPr lang="hu-HU" dirty="0" smtClean="0"/>
+              <a:t>.: </a:t>
+            </a:r>
+            <a:r>
+              <a:rPr lang="en-GB" i="1" dirty="0"/>
+              <a:t>Scaling laws for neural language </a:t>
+            </a:r>
+            <a:r>
+              <a:rPr lang="en-GB" i="1" dirty="0" smtClean="0"/>
+              <a:t>models</a:t>
+            </a:r>
+            <a:r>
+              <a:rPr lang="hu-HU" i="1" dirty="0" smtClean="0"/>
+              <a:t>. </a:t>
+            </a:r>
+            <a:r>
+              <a:rPr lang="hu-HU" dirty="0" smtClean="0"/>
+              <a:t>(</a:t>
+            </a:r>
+            <a:r>
+              <a:rPr lang="hu-HU" dirty="0" err="1" smtClean="0"/>
+              <a:t>OpenAI</a:t>
+            </a:r>
+            <a:r>
+              <a:rPr lang="hu-HU" dirty="0" smtClean="0"/>
+              <a:t>), 2020</a:t>
+            </a:r>
+          </a:p>
+          <a:p>
+            <a:pPr lvl="2"/>
+            <a:r>
+              <a:rPr lang="hu-HU" b="1" dirty="0" err="1" smtClean="0"/>
+              <a:t>exactly</a:t>
+            </a:r>
+            <a:r>
+              <a:rPr lang="hu-HU" b="1" dirty="0" smtClean="0"/>
               <a:t> </a:t>
             </a:r>
             <a:r>
-              <a:rPr lang="hu-HU" dirty="0" err="1" smtClean="0"/>
-              <a:t>whisper</a:t>
-            </a:r>
-            <a:r>
-              <a:rPr lang="hu-HU" dirty="0" smtClean="0"/>
-              <a:t> modellje</a:t>
-            </a:r>
-          </a:p>
-          <a:p>
-            <a:pPr marL="1257300" lvl="4" indent="-342900">
-              <a:buFont typeface="Arial" panose="020B0604020202020204" pitchFamily="34" charset="0"/>
-              <a:buChar char="•"/>
-            </a:pPr>
-            <a:r>
-              <a:rPr lang="hu-HU" dirty="0" smtClean="0"/>
-              <a:t>beszédszintetizálás (</a:t>
-            </a:r>
-            <a:r>
-              <a:rPr lang="hu-HU" dirty="0" err="1" smtClean="0"/>
-              <a:t>TTS</a:t>
-            </a:r>
-            <a:r>
-              <a:rPr lang="hu-HU" dirty="0" smtClean="0"/>
-              <a:t>): természetes beszédhang generálása, szövegfelolvasás</a:t>
-            </a:r>
-          </a:p>
-          <a:p>
-            <a:pPr marL="1257300" lvl="4" indent="-342900">
-              <a:buFont typeface="Arial" panose="020B0604020202020204" pitchFamily="34" charset="0"/>
-              <a:buChar char="•"/>
-            </a:pPr>
-            <a:r>
-              <a:rPr lang="hu-HU" dirty="0" smtClean="0"/>
-              <a:t>beszélő azonosítása</a:t>
-            </a:r>
-          </a:p>
-          <a:p>
-            <a:pPr marL="1257300" lvl="4" indent="-342900">
-              <a:buFont typeface="Arial" panose="020B0604020202020204" pitchFamily="34" charset="0"/>
-              <a:buChar char="•"/>
-            </a:pPr>
-            <a:r>
-              <a:rPr lang="hu-HU" dirty="0" smtClean="0"/>
-              <a:t>zene osztályba sorolása: műfajfelismerés stb.</a:t>
-            </a:r>
-          </a:p>
-          <a:p>
-            <a:pPr marL="1257300" lvl="4" indent="-342900">
-              <a:buFont typeface="Arial" panose="020B0604020202020204" pitchFamily="34" charset="0"/>
-              <a:buChar char="•"/>
-            </a:pPr>
+              <a:rPr lang="hu-HU" b="1" dirty="0" err="1" smtClean="0"/>
+              <a:t>how</a:t>
+            </a:r>
+            <a:r>
+              <a:rPr lang="hu-HU" b="1" dirty="0"/>
+              <a:t> </a:t>
+            </a:r>
+            <a:r>
+              <a:rPr lang="hu-HU" dirty="0" err="1" smtClean="0"/>
+              <a:t>does</a:t>
+            </a:r>
+            <a:r>
+              <a:rPr lang="hu-HU" dirty="0" smtClean="0"/>
+              <a:t> </a:t>
+            </a:r>
+            <a:r>
+              <a:rPr lang="hu-HU" dirty="0" err="1" smtClean="0"/>
+              <a:t>the</a:t>
+            </a:r>
+            <a:r>
+              <a:rPr lang="hu-HU" dirty="0" smtClean="0"/>
+              <a:t> </a:t>
+            </a:r>
+            <a:r>
+              <a:rPr lang="hu-HU" b="1" dirty="0" err="1" smtClean="0"/>
+              <a:t>loss</a:t>
+            </a:r>
             <a:r>
               <a:rPr lang="hu-HU" b="1" dirty="0" smtClean="0"/>
-              <a:t>zenegenerálás</a:t>
-            </a:r>
-            <a:r>
-              <a:rPr lang="hu-HU" dirty="0" smtClean="0"/>
-              <a:t>: </a:t>
-            </a:r>
-            <a:r>
-              <a:rPr lang="hu-HU" dirty="0" err="1" smtClean="0"/>
-              <a:t>MI-zeneszerző</a:t>
-            </a:r>
-            <a:endParaRPr lang="hu-HU" dirty="0" smtClean="0"/>
-          </a:p>
-          <a:p>
-            <a:pPr marL="342900" lvl="2" indent="-342900"/>
-            <a:r>
-              <a:rPr lang="hu-HU" dirty="0" smtClean="0"/>
-              <a:t>Konkrétabb alkalmazási területek:</a:t>
-            </a:r>
-          </a:p>
-          <a:p>
-            <a:pPr marL="800100" lvl="3" indent="-342900"/>
+              <a:t> </a:t>
+            </a:r>
+            <a:r>
+              <a:rPr lang="hu-HU" dirty="0" smtClean="0"/>
+              <a:t>of a </a:t>
+            </a:r>
+            <a:r>
+              <a:rPr lang="hu-HU" dirty="0" err="1" smtClean="0"/>
+              <a:t>language</a:t>
+            </a:r>
+            <a:r>
+              <a:rPr lang="hu-HU" dirty="0" smtClean="0"/>
+              <a:t> </a:t>
+            </a:r>
+            <a:r>
+              <a:rPr lang="hu-HU" dirty="0" err="1" smtClean="0"/>
+              <a:t>model</a:t>
+            </a:r>
+            <a:r>
+              <a:rPr lang="hu-HU" dirty="0" smtClean="0"/>
+              <a:t> </a:t>
+            </a:r>
+            <a:r>
+              <a:rPr lang="hu-HU" dirty="0" err="1" smtClean="0"/>
+              <a:t>scale</a:t>
+            </a:r>
+            <a:r>
+              <a:rPr lang="hu-HU" dirty="0" smtClean="0"/>
+              <a:t> </a:t>
+            </a:r>
+            <a:r>
+              <a:rPr lang="hu-HU" dirty="0" err="1" smtClean="0"/>
+              <a:t>with</a:t>
+            </a:r>
+            <a:r>
+              <a:rPr lang="hu-HU" dirty="0" smtClean="0"/>
+              <a:t> </a:t>
+            </a:r>
+            <a:r>
+              <a:rPr lang="hu-HU" b="1" dirty="0" err="1" smtClean="0"/>
+              <a:t>model</a:t>
+            </a:r>
+            <a:r>
+              <a:rPr lang="hu-HU" b="1" dirty="0" smtClean="0"/>
+              <a:t> </a:t>
+            </a:r>
+            <a:r>
+              <a:rPr lang="hu-HU" b="1" dirty="0" err="1" smtClean="0"/>
+              <a:t>size</a:t>
+            </a:r>
+            <a:r>
+              <a:rPr lang="hu-HU" b="1" dirty="0" smtClean="0"/>
+              <a:t>, </a:t>
+            </a:r>
+            <a:r>
+              <a:rPr lang="hu-HU" b="1" dirty="0" err="1" smtClean="0"/>
+              <a:t>dataset</a:t>
+            </a:r>
+            <a:r>
+              <a:rPr lang="hu-HU" b="1" dirty="0" smtClean="0"/>
+              <a:t> </a:t>
+            </a:r>
+            <a:r>
+              <a:rPr lang="hu-HU" b="1" dirty="0" err="1" smtClean="0"/>
+              <a:t>size</a:t>
+            </a:r>
+            <a:r>
+              <a:rPr lang="hu-HU" b="1" dirty="0" smtClean="0"/>
+              <a:t> </a:t>
+            </a:r>
+            <a:r>
+              <a:rPr lang="hu-HU" dirty="0" smtClean="0"/>
+              <a:t>and </a:t>
+            </a:r>
+            <a:r>
+              <a:rPr lang="hu-HU" dirty="0" err="1" smtClean="0"/>
+              <a:t>the</a:t>
+            </a:r>
+            <a:r>
+              <a:rPr lang="hu-HU" dirty="0" smtClean="0"/>
+              <a:t> </a:t>
+            </a:r>
+            <a:r>
+              <a:rPr lang="hu-HU" dirty="0" err="1" smtClean="0"/>
+              <a:t>amount</a:t>
+            </a:r>
+            <a:r>
+              <a:rPr lang="hu-HU" dirty="0" smtClean="0"/>
+              <a:t> of </a:t>
+            </a:r>
+            <a:r>
+              <a:rPr lang="hu-HU" dirty="0" err="1" smtClean="0"/>
+              <a:t>compute</a:t>
+            </a:r>
+            <a:r>
+              <a:rPr lang="hu-HU" dirty="0" smtClean="0"/>
+              <a:t> </a:t>
+            </a:r>
+            <a:r>
+              <a:rPr lang="hu-HU" dirty="0" err="1" smtClean="0"/>
+              <a:t>used</a:t>
+            </a:r>
+            <a:r>
+              <a:rPr lang="hu-HU" dirty="0" smtClean="0"/>
+              <a:t> </a:t>
+            </a:r>
+            <a:r>
+              <a:rPr lang="hu-HU" dirty="0" err="1" smtClean="0"/>
+              <a:t>for</a:t>
+            </a:r>
+            <a:r>
+              <a:rPr lang="hu-HU" dirty="0" smtClean="0"/>
+              <a:t> </a:t>
+            </a:r>
+            <a:r>
+              <a:rPr lang="hu-HU" dirty="0" err="1" smtClean="0"/>
+              <a:t>training</a:t>
+            </a:r>
+            <a:r>
+              <a:rPr lang="hu-HU" dirty="0" smtClean="0"/>
+              <a:t>?</a:t>
+            </a:r>
+          </a:p>
+          <a:p>
+            <a:pPr lvl="1"/>
+            <a:r>
+              <a:rPr lang="hu-HU" dirty="0" err="1" smtClean="0"/>
+              <a:t>Radford</a:t>
+            </a:r>
+            <a:r>
+              <a:rPr lang="hu-HU" dirty="0" smtClean="0"/>
+              <a:t> et </a:t>
+            </a:r>
+            <a:r>
+              <a:rPr lang="hu-HU" dirty="0" err="1" smtClean="0"/>
+              <a:t>al</a:t>
+            </a:r>
+            <a:r>
+              <a:rPr lang="hu-HU" dirty="0" smtClean="0"/>
+              <a:t>.: </a:t>
+            </a:r>
+            <a:r>
+              <a:rPr lang="en-GB" dirty="0"/>
+              <a:t>Learning Transferable Visual Models From Natural Language </a:t>
+            </a:r>
+            <a:r>
+              <a:rPr lang="en-GB" dirty="0" smtClean="0"/>
+              <a:t>Supervision</a:t>
+            </a:r>
             <a:r>
               <a:rPr lang="hu-HU" dirty="0"/>
-              <a:t>1</a:t>
-            </a:r>
-            <a:r>
-              <a:rPr lang="hu-HU" dirty="0" smtClean="0"/>
-              <a:t>. Egészségügy, </a:t>
-            </a:r>
-            <a:r>
-              <a:rPr lang="hu-HU" dirty="0" err="1" smtClean="0"/>
-              <a:t>bioinformatika</a:t>
-            </a:r>
-            <a:endParaRPr lang="hu-HU" dirty="0" smtClean="0"/>
-          </a:p>
-          <a:p>
-            <a:pPr marL="1257300" lvl="4" indent="-342900">
-              <a:buFont typeface="Arial" panose="020B0604020202020204" pitchFamily="34" charset="0"/>
-              <a:buChar char="•"/>
-            </a:pPr>
-            <a:r>
-              <a:rPr lang="hu-HU" dirty="0" smtClean="0"/>
-              <a:t>orvosi képelemzés: anomáliák észlelése röntgen-, </a:t>
-            </a:r>
-            <a:r>
-              <a:rPr lang="hu-HU" dirty="0" err="1" smtClean="0"/>
-              <a:t>MRI-</a:t>
-            </a:r>
-            <a:r>
-              <a:rPr lang="hu-HU" dirty="0" smtClean="0"/>
-              <a:t>, CT-felvételeken</a:t>
-            </a:r>
-          </a:p>
-          <a:p>
-            <a:pPr marL="1257300" lvl="4" indent="-342900">
-              <a:buFont typeface="Arial" panose="020B0604020202020204" pitchFamily="34" charset="0"/>
-              <a:buChar char="•"/>
-            </a:pPr>
-            <a:r>
-              <a:rPr lang="hu-HU" dirty="0" smtClean="0"/>
-              <a:t>prediktív diagnosztika: betegség előrejelzése páciensadatokból</a:t>
-            </a:r>
-          </a:p>
-          <a:p>
-            <a:pPr marL="1257300" lvl="4" indent="-342900">
-              <a:buFont typeface="Arial" panose="020B0604020202020204" pitchFamily="34" charset="0"/>
-              <a:buChar char="•"/>
-            </a:pPr>
-            <a:r>
-              <a:rPr lang="hu-HU" dirty="0" err="1" smtClean="0"/>
-              <a:t>genomika</a:t>
-            </a:r>
-            <a:r>
-              <a:rPr lang="hu-HU" dirty="0" smtClean="0"/>
-              <a:t>: nagy áteresztőképességű </a:t>
-            </a:r>
-            <a:r>
-              <a:rPr lang="hu-HU" dirty="0" err="1" smtClean="0"/>
-              <a:t>DNS-szekvenálás</a:t>
-            </a:r>
-            <a:r>
-              <a:rPr lang="hu-HU" dirty="0" smtClean="0"/>
-              <a:t> és </a:t>
-            </a:r>
-            <a:r>
-              <a:rPr lang="hu-HU" dirty="0" err="1" smtClean="0"/>
-              <a:t>-elemzés</a:t>
-            </a:r>
-            <a:endParaRPr lang="hu-HU" dirty="0" smtClean="0"/>
-          </a:p>
-          <a:p>
-            <a:pPr marL="1257300" lvl="4" indent="-342900">
-              <a:buFont typeface="Arial" panose="020B0604020202020204" pitchFamily="34" charset="0"/>
-              <a:buChar char="•"/>
-            </a:pPr>
-            <a:r>
-              <a:rPr lang="hu-HU" dirty="0" smtClean="0"/>
-              <a:t>új gyógyszerek felfedezése: molekuláris struktúrák, pl. fehérjeszerkezetek </a:t>
-            </a:r>
-            <a:r>
-              <a:rPr lang="hu-HU" dirty="0" err="1" smtClean="0"/>
-              <a:t>predikciója</a:t>
-            </a:r>
-            <a:r>
-              <a:rPr lang="hu-HU" dirty="0" smtClean="0"/>
-              <a:t> (</a:t>
-            </a:r>
-            <a:r>
-              <a:rPr lang="hu-HU" dirty="0" err="1" smtClean="0"/>
-              <a:t>AlphaFold</a:t>
-            </a:r>
-            <a:r>
-              <a:rPr lang="hu-HU" dirty="0" smtClean="0"/>
-              <a:t>)</a:t>
-            </a:r>
-          </a:p>
-          <a:p>
-            <a:pPr marL="1257300" lvl="4" indent="-342900">
-              <a:buFont typeface="Arial" panose="020B0604020202020204" pitchFamily="34" charset="0"/>
-              <a:buChar char="•"/>
-            </a:pPr>
-            <a:r>
-              <a:rPr lang="hu-HU" dirty="0" smtClean="0"/>
-              <a:t>személyre szabott orvoslás: nem azonos protokoll minden páciensnek, hanem olyan kezelés és adagolás, amely a páciens genetikai profiljához illik</a:t>
-            </a:r>
+              <a:t> </a:t>
+            </a:r>
+            <a:r>
+              <a:rPr lang="hu-HU" dirty="0" smtClean="0"/>
+              <a:t>(</a:t>
+            </a:r>
+            <a:r>
+              <a:rPr lang="hu-HU" dirty="0" err="1" smtClean="0"/>
+              <a:t>OpenAI</a:t>
+            </a:r>
+            <a:r>
+              <a:rPr lang="hu-HU" dirty="0" smtClean="0"/>
+              <a:t>), </a:t>
+            </a:r>
+            <a:r>
+              <a:rPr lang="hu-HU" dirty="0" err="1" smtClean="0"/>
+              <a:t>PMLR</a:t>
+            </a:r>
+            <a:r>
+              <a:rPr lang="hu-HU" dirty="0" smtClean="0"/>
+              <a:t> 139, 2021</a:t>
+            </a:r>
+          </a:p>
+          <a:p>
+            <a:pPr lvl="2"/>
+            <a:r>
+              <a:rPr lang="hu-HU" dirty="0" err="1" smtClean="0"/>
+              <a:t>instead</a:t>
+            </a:r>
+            <a:r>
+              <a:rPr lang="hu-HU" dirty="0" smtClean="0"/>
+              <a:t> of </a:t>
+            </a:r>
+            <a:r>
+              <a:rPr lang="hu-HU" dirty="0" err="1" smtClean="0"/>
+              <a:t>training</a:t>
+            </a:r>
+            <a:r>
+              <a:rPr lang="hu-HU" dirty="0" smtClean="0"/>
+              <a:t> </a:t>
+            </a:r>
+            <a:r>
+              <a:rPr lang="hu-HU" dirty="0" err="1" smtClean="0"/>
+              <a:t>vision</a:t>
+            </a:r>
+            <a:r>
+              <a:rPr lang="hu-HU" dirty="0" smtClean="0"/>
+              <a:t> </a:t>
+            </a:r>
+            <a:r>
+              <a:rPr lang="hu-HU" dirty="0" err="1" smtClean="0"/>
+              <a:t>models</a:t>
+            </a:r>
+            <a:r>
+              <a:rPr lang="hu-HU" dirty="0" smtClean="0"/>
+              <a:t> </a:t>
+            </a:r>
+            <a:r>
+              <a:rPr lang="hu-HU" dirty="0" err="1" smtClean="0"/>
+              <a:t>to</a:t>
+            </a:r>
+            <a:r>
+              <a:rPr lang="hu-HU" dirty="0" smtClean="0"/>
+              <a:t> </a:t>
+            </a:r>
+            <a:r>
+              <a:rPr lang="hu-HU" dirty="0" err="1" smtClean="0"/>
+              <a:t>classify</a:t>
+            </a:r>
+            <a:r>
+              <a:rPr lang="hu-HU" dirty="0" smtClean="0"/>
+              <a:t> </a:t>
+            </a:r>
+            <a:r>
+              <a:rPr lang="hu-HU" dirty="0" err="1" smtClean="0"/>
+              <a:t>images</a:t>
+            </a:r>
+            <a:r>
+              <a:rPr lang="hu-HU" dirty="0" smtClean="0"/>
+              <a:t> </a:t>
+            </a:r>
+            <a:r>
+              <a:rPr lang="hu-HU" dirty="0" err="1" smtClean="0"/>
+              <a:t>into</a:t>
+            </a:r>
+            <a:r>
+              <a:rPr lang="hu-HU" dirty="0" smtClean="0"/>
+              <a:t> </a:t>
+            </a:r>
+            <a:r>
+              <a:rPr lang="hu-HU" dirty="0" err="1" smtClean="0"/>
+              <a:t>predetermined</a:t>
+            </a:r>
+            <a:r>
+              <a:rPr lang="hu-HU" dirty="0" smtClean="0"/>
+              <a:t> </a:t>
+            </a:r>
+            <a:r>
+              <a:rPr lang="hu-HU" dirty="0" err="1" smtClean="0"/>
+              <a:t>categories</a:t>
+            </a:r>
+            <a:r>
+              <a:rPr lang="hu-HU" dirty="0" smtClean="0"/>
+              <a:t>, </a:t>
+            </a:r>
+            <a:r>
+              <a:rPr lang="hu-HU" dirty="0" err="1" smtClean="0"/>
+              <a:t>they</a:t>
+            </a:r>
+            <a:r>
+              <a:rPr lang="hu-HU" dirty="0" smtClean="0"/>
+              <a:t> </a:t>
+            </a:r>
+            <a:r>
+              <a:rPr lang="hu-HU" dirty="0" err="1" smtClean="0"/>
+              <a:t>can</a:t>
+            </a:r>
+            <a:r>
+              <a:rPr lang="hu-HU" dirty="0" smtClean="0"/>
+              <a:t> be </a:t>
+            </a:r>
+            <a:r>
+              <a:rPr lang="hu-HU" dirty="0" err="1" smtClean="0"/>
+              <a:t>trained</a:t>
+            </a:r>
+            <a:r>
+              <a:rPr lang="hu-HU" dirty="0" smtClean="0"/>
+              <a:t> </a:t>
+            </a:r>
+            <a:r>
+              <a:rPr lang="hu-HU" dirty="0" err="1" smtClean="0"/>
+              <a:t>to</a:t>
+            </a:r>
+            <a:r>
+              <a:rPr lang="hu-HU" dirty="0" smtClean="0"/>
+              <a:t> </a:t>
+            </a:r>
+            <a:r>
+              <a:rPr lang="hu-HU" b="1" dirty="0" err="1" smtClean="0"/>
+              <a:t>associate</a:t>
+            </a:r>
+            <a:r>
+              <a:rPr lang="hu-HU" b="1" dirty="0" smtClean="0"/>
+              <a:t> </a:t>
+            </a:r>
+            <a:r>
+              <a:rPr lang="hu-HU" b="1" dirty="0" err="1" smtClean="0"/>
+              <a:t>images</a:t>
+            </a:r>
+            <a:r>
+              <a:rPr lang="hu-HU" b="1" dirty="0" smtClean="0"/>
+              <a:t> </a:t>
+            </a:r>
+            <a:r>
+              <a:rPr lang="hu-HU" b="1" dirty="0" err="1" smtClean="0"/>
+              <a:t>with</a:t>
+            </a:r>
+            <a:r>
+              <a:rPr lang="hu-HU" b="1" dirty="0" smtClean="0"/>
+              <a:t> </a:t>
+            </a:r>
+            <a:r>
+              <a:rPr lang="hu-HU" b="1" dirty="0" err="1" smtClean="0"/>
+              <a:t>raw</a:t>
+            </a:r>
+            <a:r>
+              <a:rPr lang="hu-HU" b="1" dirty="0" smtClean="0"/>
+              <a:t> text </a:t>
+            </a:r>
+            <a:r>
+              <a:rPr lang="hu-HU" b="1" dirty="0" err="1" smtClean="0"/>
+              <a:t>captions</a:t>
+            </a:r>
+            <a:r>
+              <a:rPr lang="hu-HU" dirty="0" smtClean="0"/>
+              <a:t>; </a:t>
+            </a:r>
+            <a:r>
+              <a:rPr lang="hu-HU" dirty="0" err="1" smtClean="0"/>
+              <a:t>this</a:t>
+            </a:r>
+            <a:r>
+              <a:rPr lang="hu-HU" dirty="0" smtClean="0"/>
+              <a:t> </a:t>
+            </a:r>
+            <a:r>
+              <a:rPr lang="hu-HU" dirty="0" err="1" smtClean="0"/>
+              <a:t>was</a:t>
+            </a:r>
+            <a:r>
+              <a:rPr lang="hu-HU" dirty="0" smtClean="0"/>
+              <a:t> </a:t>
+            </a:r>
+            <a:r>
+              <a:rPr lang="hu-HU" dirty="0" err="1" smtClean="0"/>
+              <a:t>crucial</a:t>
+            </a:r>
+            <a:r>
+              <a:rPr lang="hu-HU" dirty="0" smtClean="0"/>
+              <a:t> </a:t>
+            </a:r>
+            <a:r>
+              <a:rPr lang="hu-HU" dirty="0" err="1" smtClean="0"/>
+              <a:t>for</a:t>
+            </a:r>
+            <a:r>
+              <a:rPr lang="hu-HU" dirty="0" smtClean="0"/>
+              <a:t> </a:t>
+            </a:r>
+            <a:r>
+              <a:rPr lang="hu-HU" dirty="0" err="1" smtClean="0"/>
+              <a:t>the</a:t>
+            </a:r>
+            <a:r>
+              <a:rPr lang="hu-HU" dirty="0" smtClean="0"/>
+              <a:t> </a:t>
+            </a:r>
+            <a:r>
+              <a:rPr lang="hu-HU" dirty="0" err="1" smtClean="0"/>
+              <a:t>development</a:t>
+            </a:r>
+            <a:r>
+              <a:rPr lang="hu-HU" dirty="0" smtClean="0"/>
+              <a:t> of </a:t>
+            </a:r>
+            <a:r>
+              <a:rPr lang="hu-HU" b="1" dirty="0" smtClean="0"/>
+              <a:t>image </a:t>
+            </a:r>
+            <a:r>
+              <a:rPr lang="hu-HU" b="1" dirty="0" err="1" smtClean="0"/>
+              <a:t>generation</a:t>
+            </a:r>
+            <a:r>
+              <a:rPr lang="hu-HU" b="1" dirty="0" smtClean="0"/>
+              <a:t> </a:t>
+            </a:r>
+            <a:r>
+              <a:rPr lang="hu-HU" b="1" dirty="0" err="1" smtClean="0"/>
+              <a:t>based</a:t>
+            </a:r>
+            <a:r>
+              <a:rPr lang="hu-HU" b="1" dirty="0" smtClean="0"/>
+              <a:t> </a:t>
+            </a:r>
+            <a:r>
+              <a:rPr lang="hu-HU" b="1" dirty="0" err="1" smtClean="0"/>
+              <a:t>on</a:t>
+            </a:r>
+            <a:r>
+              <a:rPr lang="hu-HU" b="1" dirty="0" smtClean="0"/>
+              <a:t> text </a:t>
+            </a:r>
+            <a:r>
+              <a:rPr lang="hu-HU" b="1" dirty="0" err="1" smtClean="0"/>
+              <a:t>prompts</a:t>
+            </a:r>
+            <a:endParaRPr lang="hu-HU" b="1" dirty="0" smtClean="0"/>
+          </a:p>
+        </p:txBody>
+      </p:sp>
+      <p:sp>
+        <p:nvSpPr>
+          <p:cNvPr id="7" name="Cím 1"/>
+          <p:cNvSpPr>
+            <a:spLocks noGrp="1"/>
+          </p:cNvSpPr>
+          <p:nvPr>
+            <p:ph type="title"/>
+          </p:nvPr>
+        </p:nvSpPr>
+        <p:spPr>
+          <a:xfrm>
+            <a:off x="457200" y="274638"/>
+            <a:ext cx="8229600" cy="1143000"/>
+          </a:xfrm>
+        </p:spPr>
+        <p:txBody>
+          <a:bodyPr>
+            <a:normAutofit/>
+          </a:bodyPr>
+          <a:lstStyle/>
+          <a:p>
+            <a:r>
+              <a:rPr lang="hu-HU" sz="4000" dirty="0"/>
+              <a:t>A generatív modellek felemelkedése</a:t>
+            </a:r>
+            <a:endParaRPr lang="en-GB" sz="4000" dirty="0"/>
           </a:p>
         </p:txBody>
       </p:sp>
     </p:spTree>
     <p:extLst>
       <p:ext uri="{BB962C8B-B14F-4D97-AF65-F5344CB8AC3E}">
-        <p14:creationId xmlns:p14="http://schemas.microsoft.com/office/powerpoint/2010/main" val="2594341539"/>
+        <p14:creationId xmlns:p14="http://schemas.microsoft.com/office/powerpoint/2010/main" val="412625451"/>
       </p:ext>
     </p:extLst>
   </p:cSld>
@@ -8059,7 +7829,7 @@
           <a:lstStyle/>
           <a:p>
             <a:r>
-              <a:rPr lang="hu-HU" dirty="0"/>
+              <a:rPr lang="hu-HU" dirty="0" smtClean="0"/>
               <a:t>Az MI helyzete napjainkban</a:t>
             </a:r>
             <a:endParaRPr lang="en-GB" dirty="0"/>
@@ -8079,173 +7849,83 @@
         <p:spPr/>
         <p:txBody>
           <a:bodyPr>
-            <a:normAutofit fontScale="70000" lnSpcReduction="20000"/>
+            <a:normAutofit fontScale="77500" lnSpcReduction="20000"/>
           </a:bodyPr>
           <a:lstStyle/>
           <a:p>
             <a:r>
+              <a:rPr lang="hu-HU" b="1" dirty="0" smtClean="0"/>
+              <a:t>Szimbolikus </a:t>
+            </a:r>
+            <a:r>
+              <a:rPr lang="hu-HU" b="1" dirty="0" err="1" smtClean="0"/>
+              <a:t>MI-n</a:t>
+            </a:r>
+            <a:r>
+              <a:rPr lang="hu-HU" b="1" dirty="0" smtClean="0"/>
+              <a:t> </a:t>
+            </a:r>
+            <a:r>
+              <a:rPr lang="hu-HU" dirty="0" smtClean="0"/>
+              <a:t>alapuló eszközöket (</a:t>
+            </a:r>
+            <a:r>
+              <a:rPr lang="hu-HU" dirty="0" err="1" smtClean="0"/>
+              <a:t>nemklasszikus</a:t>
+            </a:r>
+            <a:r>
+              <a:rPr lang="hu-HU" dirty="0" smtClean="0"/>
+              <a:t> logikák, tudásreprezentáció, logikai következtető rendszerek, kereső algoritmusok) továbbra is kutatják az informatikában, sok területen alkalmazzák</a:t>
+            </a:r>
+          </a:p>
+          <a:p>
+            <a:r>
+              <a:rPr lang="hu-HU" b="1" dirty="0" err="1" smtClean="0"/>
+              <a:t>Feladatspecifikus</a:t>
+            </a:r>
+            <a:r>
+              <a:rPr lang="hu-HU" b="1" dirty="0" smtClean="0"/>
+              <a:t> gépi tanulási modellek, </a:t>
+            </a:r>
+            <a:r>
+              <a:rPr lang="hu-HU" dirty="0" smtClean="0"/>
+              <a:t>többek között mély neurális hálók kulcsfontosságúak számos alkalmazási területen</a:t>
+            </a:r>
+          </a:p>
+          <a:p>
+            <a:r>
+              <a:rPr lang="hu-HU" dirty="0" smtClean="0"/>
+              <a:t>A </a:t>
+            </a:r>
+            <a:r>
               <a:rPr lang="hu-HU" b="1" dirty="0"/>
-              <a:t>Mélytanulási modelleket számos területen </a:t>
-            </a:r>
-            <a:r>
-              <a:rPr lang="hu-HU" dirty="0"/>
-              <a:t>használnak, ezeknek csak kis hányada generatív:</a:t>
-            </a:r>
-          </a:p>
-          <a:p>
-            <a:pPr lvl="1"/>
-            <a:r>
-              <a:rPr lang="hu-HU" dirty="0"/>
-              <a:t>2</a:t>
-            </a:r>
-            <a:r>
-              <a:rPr lang="hu-HU" dirty="0" smtClean="0"/>
-              <a:t>. Autonóm rendszerek</a:t>
-            </a:r>
-          </a:p>
-          <a:p>
-            <a:pPr lvl="2"/>
-            <a:r>
-              <a:rPr lang="hu-HU" dirty="0" smtClean="0"/>
-              <a:t>önvezető gépkocsik</a:t>
-            </a:r>
-            <a:r>
-              <a:rPr lang="en-GB" dirty="0" smtClean="0"/>
-              <a:t>, </a:t>
-            </a:r>
-            <a:r>
-              <a:rPr lang="hu-HU" dirty="0" err="1" smtClean="0"/>
-              <a:t>drónok</a:t>
-            </a:r>
-            <a:r>
-              <a:rPr lang="en-GB" dirty="0" smtClean="0"/>
-              <a:t>: </a:t>
-            </a:r>
-            <a:r>
-              <a:rPr lang="hu-HU" dirty="0" smtClean="0"/>
-              <a:t>látás</a:t>
-            </a:r>
-            <a:r>
-              <a:rPr lang="en-GB" dirty="0" smtClean="0"/>
-              <a:t>, </a:t>
-            </a:r>
-            <a:r>
-              <a:rPr lang="hu-HU" dirty="0" smtClean="0"/>
-              <a:t>navigáció, döntéshozatal kombinációja</a:t>
-            </a:r>
-            <a:endParaRPr lang="en-GB" dirty="0"/>
-          </a:p>
-          <a:p>
-            <a:pPr lvl="2"/>
-            <a:r>
-              <a:rPr lang="hu-HU" dirty="0" smtClean="0"/>
-              <a:t>robotika</a:t>
-            </a:r>
-            <a:r>
-              <a:rPr lang="en-GB" dirty="0" smtClean="0"/>
-              <a:t>: </a:t>
-            </a:r>
-            <a:r>
-              <a:rPr lang="hu-HU" dirty="0" smtClean="0"/>
-              <a:t>tárgyfelismerés</a:t>
-            </a:r>
-            <a:r>
-              <a:rPr lang="en-GB" dirty="0" smtClean="0"/>
-              <a:t>, </a:t>
-            </a:r>
-            <a:r>
-              <a:rPr lang="hu-HU" dirty="0" smtClean="0"/>
-              <a:t>mozgás tervezése</a:t>
-            </a:r>
-            <a:endParaRPr lang="en-GB" dirty="0"/>
-          </a:p>
-          <a:p>
-            <a:pPr lvl="1"/>
-            <a:r>
-              <a:rPr lang="hu-HU" dirty="0"/>
-              <a:t>3</a:t>
-            </a:r>
-            <a:r>
-              <a:rPr lang="hu-HU" dirty="0" smtClean="0"/>
-              <a:t>. Pénzügy, üzleti intelligencia</a:t>
-            </a:r>
-          </a:p>
-          <a:p>
-            <a:pPr lvl="2"/>
-            <a:r>
-              <a:rPr lang="hu-HU" dirty="0" smtClean="0"/>
-              <a:t>„algoritmikus kereskedés”: piaci mozgások előrejelzése</a:t>
-            </a:r>
-          </a:p>
-          <a:p>
-            <a:pPr lvl="2"/>
-            <a:r>
-              <a:rPr lang="hu-HU" dirty="0" smtClean="0"/>
-              <a:t>csalások észlelése:</a:t>
-            </a:r>
-            <a:r>
-              <a:rPr lang="en-GB" dirty="0" smtClean="0"/>
-              <a:t> </a:t>
-            </a:r>
-            <a:r>
-              <a:rPr lang="hu-HU" dirty="0" smtClean="0"/>
-              <a:t>anomáliák észlelése üzleti vagy banki tranzakciókban</a:t>
-            </a:r>
-          </a:p>
-          <a:p>
-            <a:pPr lvl="2"/>
-            <a:r>
-              <a:rPr lang="hu-HU" dirty="0" smtClean="0"/>
-              <a:t>hitelminősítés:</a:t>
-            </a:r>
-            <a:r>
-              <a:rPr lang="en-GB" dirty="0" smtClean="0"/>
-              <a:t> </a:t>
-            </a:r>
-            <a:r>
-              <a:rPr lang="hu-HU" dirty="0" smtClean="0"/>
-              <a:t>kockázatbecslés korábbi adatok és profil alapján</a:t>
-            </a:r>
-          </a:p>
-          <a:p>
-            <a:pPr lvl="2"/>
-            <a:r>
-              <a:rPr lang="hu-HU" dirty="0" smtClean="0"/>
-              <a:t>vásárlói magatartás elemzése: lemorzsolódás előrejelzése (ki nem használja tovább a terméket?), személyre szabás (akciók, termékek ajánlása)</a:t>
-            </a:r>
-            <a:endParaRPr lang="hu-HU" dirty="0"/>
-          </a:p>
-          <a:p>
-            <a:pPr lvl="1"/>
-            <a:r>
-              <a:rPr lang="hu-HU" dirty="0" smtClean="0"/>
-              <a:t>4. Ipar, gyártás</a:t>
-            </a:r>
-          </a:p>
-          <a:p>
-            <a:pPr lvl="2"/>
-            <a:r>
-              <a:rPr lang="hu-HU" dirty="0" smtClean="0"/>
-              <a:t>m</a:t>
-            </a:r>
-            <a:r>
-              <a:rPr lang="hu-HU" dirty="0" smtClean="0"/>
-              <a:t>inőségellenőrzés: gyártási hibás termékek vizuális azonosítása</a:t>
-            </a:r>
-            <a:endParaRPr lang="hu-HU" dirty="0" smtClean="0"/>
-          </a:p>
-          <a:p>
-            <a:pPr lvl="2"/>
-            <a:r>
-              <a:rPr lang="hu-HU" dirty="0" smtClean="0"/>
-              <a:t>prediktív karbantartás: meghibásodások korai azonosítása</a:t>
-            </a:r>
-          </a:p>
-          <a:p>
-            <a:pPr lvl="2"/>
-            <a:r>
-              <a:rPr lang="hu-HU" dirty="0" smtClean="0"/>
-              <a:t>folyamatok optimalizálása: szűk keresztmetszetek azonosítása</a:t>
+              <a:t>g</a:t>
+            </a:r>
+            <a:r>
+              <a:rPr lang="hu-HU" b="1" dirty="0" smtClean="0"/>
+              <a:t>eneratív nyelvmodelleket természetesnyelv-feldolgozási </a:t>
+            </a:r>
+            <a:r>
+              <a:rPr lang="hu-HU" dirty="0" smtClean="0"/>
+              <a:t>(</a:t>
+            </a:r>
+            <a:r>
+              <a:rPr lang="hu-HU" dirty="0" err="1" smtClean="0"/>
+              <a:t>NLP</a:t>
+            </a:r>
+            <a:r>
+              <a:rPr lang="hu-HU" dirty="0" smtClean="0"/>
+              <a:t>) feladatokra használják, pl. gépi fordítás, chat, programozók támogatása programozási asszisztensként – sok egyébre nem jók</a:t>
+            </a:r>
+          </a:p>
+          <a:p>
+            <a:r>
+              <a:rPr lang="hu-HU" b="1" dirty="0" smtClean="0"/>
+              <a:t>Generatív képfeldolgozó modellek </a:t>
+            </a:r>
+            <a:r>
+              <a:rPr lang="hu-HU" dirty="0" smtClean="0"/>
+              <a:t>népszerűek álló- és mozgóképek generálására</a:t>
             </a:r>
           </a:p>
         </p:txBody>
@@ -8253,7 +7933,7 @@
     </p:spTree>
     <p:extLst>
       <p:ext uri="{BB962C8B-B14F-4D97-AF65-F5344CB8AC3E}">
-        <p14:creationId xmlns:p14="http://schemas.microsoft.com/office/powerpoint/2010/main" val="3058348580"/>
+        <p14:creationId xmlns:p14="http://schemas.microsoft.com/office/powerpoint/2010/main" val="4261464058"/>
       </p:ext>
     </p:extLst>
   </p:cSld>
@@ -8316,151 +7996,167 @@
         <p:spPr/>
         <p:txBody>
           <a:bodyPr>
-            <a:normAutofit fontScale="70000" lnSpcReduction="20000"/>
+            <a:normAutofit fontScale="62500" lnSpcReduction="20000"/>
           </a:bodyPr>
           <a:lstStyle/>
           <a:p>
             <a:r>
-              <a:rPr lang="hu-HU" b="1" dirty="0"/>
+              <a:rPr lang="hu-HU" b="1" dirty="0" smtClean="0"/>
               <a:t>Mélytanulási modelleket számos területen </a:t>
             </a:r>
             <a:r>
-              <a:rPr lang="hu-HU" dirty="0"/>
-              <a:t>használnak, ezeknek csak kis hányada generatív:</a:t>
+              <a:rPr lang="hu-HU" dirty="0" smtClean="0"/>
+              <a:t>használnak, ezeknek csak kis hányada generatív. Általános célkitűzések:</a:t>
             </a:r>
           </a:p>
           <a:p>
             <a:pPr lvl="1"/>
             <a:r>
-              <a:rPr lang="hu-HU" dirty="0"/>
-              <a:t>5</a:t>
-            </a:r>
-            <a:r>
-              <a:rPr lang="hu-HU" dirty="0" smtClean="0"/>
-              <a:t>. Szórakozás</a:t>
+              <a:rPr lang="hu-HU" dirty="0" smtClean="0"/>
+              <a:t>1. Gépi látás (~ képfeldolgozás)</a:t>
+            </a:r>
+          </a:p>
+          <a:p>
+            <a:pPr lvl="2"/>
+            <a:r>
+              <a:rPr lang="hu-HU" dirty="0" smtClean="0"/>
+              <a:t>képosztályozás: tárgyak felismerése, képfelirat generálása</a:t>
+            </a:r>
+          </a:p>
+          <a:p>
+            <a:pPr lvl="2"/>
+            <a:r>
+              <a:rPr lang="hu-HU" dirty="0" smtClean="0"/>
+              <a:t>tárgyészlelés: hol vannak tárgyak a képen, hányan vannak, pl. </a:t>
+            </a:r>
+            <a:r>
+              <a:rPr lang="hu-HU" dirty="0" err="1" smtClean="0"/>
+              <a:t>okostelefonok</a:t>
+            </a:r>
+            <a:r>
+              <a:rPr lang="hu-HU" dirty="0" smtClean="0"/>
+              <a:t> kameráját működtető szoftver, biztonsági rendszerek</a:t>
+            </a:r>
+          </a:p>
+          <a:p>
+            <a:pPr lvl="2"/>
+            <a:r>
+              <a:rPr lang="hu-HU" dirty="0" smtClean="0"/>
+              <a:t>képszegmentálás: az előbbihez hasonló, hol vannak érdekes területek a képen, pl. orvosi képalkotás (daganatok felismerése)</a:t>
+            </a:r>
+          </a:p>
+          <a:p>
+            <a:pPr lvl="2"/>
+            <a:r>
+              <a:rPr lang="hu-HU" dirty="0" smtClean="0"/>
+              <a:t>arcfelismerés: azonosítás, beléptetés, érzelmek észlelése</a:t>
+            </a:r>
+          </a:p>
+          <a:p>
+            <a:pPr lvl="2"/>
+            <a:r>
+              <a:rPr lang="hu-HU" dirty="0" smtClean="0"/>
+              <a:t>OCR: szöveg kinyerése képekből vagy </a:t>
+            </a:r>
+            <a:r>
+              <a:rPr lang="hu-HU" dirty="0" err="1" smtClean="0"/>
+              <a:t>szkennelt</a:t>
+            </a:r>
+            <a:r>
+              <a:rPr lang="hu-HU" dirty="0" smtClean="0"/>
+              <a:t> dokumentumokból</a:t>
+            </a:r>
+          </a:p>
+          <a:p>
+            <a:pPr lvl="2"/>
+            <a:r>
+              <a:rPr lang="hu-HU" b="1" dirty="0" smtClean="0"/>
+              <a:t>képgenerálás: </a:t>
+            </a:r>
+            <a:r>
+              <a:rPr lang="hu-HU" dirty="0" smtClean="0"/>
+              <a:t>szöveges </a:t>
+            </a:r>
+            <a:r>
+              <a:rPr lang="hu-HU" dirty="0" err="1" smtClean="0"/>
+              <a:t>promtból</a:t>
+            </a:r>
+            <a:r>
+              <a:rPr lang="hu-HU" dirty="0" smtClean="0"/>
+              <a:t> vagy anélkül, stílusátvitel, </a:t>
+            </a:r>
+            <a:r>
+              <a:rPr lang="hu-HU" dirty="0" err="1" smtClean="0"/>
+              <a:t>deepfake</a:t>
+            </a:r>
+            <a:r>
+              <a:rPr lang="hu-HU" dirty="0" smtClean="0"/>
+              <a:t>, </a:t>
+            </a:r>
+            <a:r>
+              <a:rPr lang="hu-HU" dirty="0" err="1" smtClean="0"/>
+              <a:t>MI-művészet</a:t>
             </a:r>
             <a:endParaRPr lang="hu-HU" dirty="0" smtClean="0"/>
           </a:p>
           <a:p>
+            <a:pPr lvl="1"/>
+            <a:r>
+              <a:rPr lang="hu-HU" dirty="0" smtClean="0"/>
+              <a:t>2. Természetes nyelveken írt szövegek feldolgozása (</a:t>
+            </a:r>
+            <a:r>
+              <a:rPr lang="hu-HU" dirty="0" err="1" smtClean="0"/>
+              <a:t>NLP</a:t>
+            </a:r>
+            <a:r>
+              <a:rPr lang="hu-HU" dirty="0" smtClean="0"/>
+              <a:t>)</a:t>
+            </a:r>
+          </a:p>
+          <a:p>
             <a:pPr lvl="2"/>
             <a:r>
               <a:rPr lang="hu-HU" dirty="0" smtClean="0"/>
-              <a:t>játék MI</a:t>
-            </a:r>
-            <a:r>
-              <a:rPr lang="hu-HU" dirty="0" smtClean="0"/>
-              <a:t>: alkalmazkodó, intelligens ellenfelek, </a:t>
-            </a:r>
-            <a:r>
-              <a:rPr lang="hu-HU" dirty="0" err="1" smtClean="0"/>
-              <a:t>NPC-k</a:t>
-            </a:r>
-            <a:endParaRPr lang="hu-HU" dirty="0" smtClean="0"/>
+              <a:t>információ-visszakeresés: egy kérdéshez kapcsolódó dokumentumok megtalálása egy szöveges adatbázisban</a:t>
+            </a:r>
+            <a:endParaRPr lang="hu-HU" b="1" dirty="0" smtClean="0"/>
           </a:p>
           <a:p>
             <a:pPr lvl="2"/>
             <a:r>
-              <a:rPr lang="hu-HU" dirty="0" smtClean="0"/>
-              <a:t>játékot játszó MI: videojátékot önállóan játszó szoftverrendszer</a:t>
+              <a:rPr lang="hu-HU" b="1" dirty="0" smtClean="0"/>
+              <a:t>összefoglalás: </a:t>
+            </a:r>
+            <a:r>
+              <a:rPr lang="hu-HU" dirty="0" smtClean="0"/>
+              <a:t>dokumentum tartalmának rövid összegzése</a:t>
             </a:r>
           </a:p>
           <a:p>
             <a:pPr lvl="2"/>
             <a:r>
               <a:rPr lang="hu-HU" b="1" dirty="0" smtClean="0"/>
-              <a:t>tartalomgenerálás</a:t>
-            </a:r>
-            <a:r>
-              <a:rPr lang="hu-HU" dirty="0" smtClean="0"/>
-              <a:t>: zene, műalkotás, videó</a:t>
-            </a:r>
-            <a:endParaRPr lang="en-GB" dirty="0"/>
-          </a:p>
-          <a:p>
-            <a:pPr lvl="1"/>
-            <a:r>
-              <a:rPr lang="hu-HU" dirty="0"/>
-              <a:t>6</a:t>
-            </a:r>
-            <a:r>
-              <a:rPr lang="hu-HU" dirty="0" smtClean="0"/>
-              <a:t>. </a:t>
-            </a:r>
-            <a:r>
-              <a:rPr lang="hu-HU" dirty="0" err="1" smtClean="0"/>
-              <a:t>Kiberbiztonság</a:t>
-            </a:r>
-            <a:endParaRPr lang="hu-HU" dirty="0" smtClean="0"/>
+              <a:t>szöveggenerálás</a:t>
+            </a:r>
+            <a:r>
+              <a:rPr lang="hu-HU" dirty="0" smtClean="0"/>
+              <a:t>: chatbotok (pl. </a:t>
+            </a:r>
+            <a:r>
+              <a:rPr lang="hu-HU" dirty="0" err="1" smtClean="0"/>
+              <a:t>ChatGPT</a:t>
+            </a:r>
+            <a:r>
+              <a:rPr lang="hu-HU" dirty="0" smtClean="0"/>
+              <a:t>), tartalmak generálása</a:t>
+            </a:r>
           </a:p>
           <a:p>
             <a:pPr lvl="2"/>
             <a:r>
-              <a:rPr lang="hu-HU" dirty="0" err="1" smtClean="0"/>
-              <a:t>behatolásészlelés</a:t>
-            </a:r>
-            <a:r>
-              <a:rPr lang="hu-HU" dirty="0" smtClean="0"/>
-              <a:t>: rendhagy</a:t>
-            </a:r>
-            <a:r>
-              <a:rPr lang="hu-HU" dirty="0" smtClean="0"/>
-              <a:t>ó hálózati tevékenység felismerése</a:t>
-            </a:r>
-            <a:endParaRPr lang="hu-HU" dirty="0" smtClean="0"/>
-          </a:p>
-          <a:p>
-            <a:pPr lvl="2"/>
-            <a:r>
-              <a:rPr lang="hu-HU" dirty="0" smtClean="0"/>
-              <a:t>rosszindulatú szoftver észlelése: vírusok, ártalmas programkód felismerése</a:t>
-            </a:r>
-          </a:p>
-          <a:p>
-            <a:pPr lvl="2"/>
-            <a:r>
-              <a:rPr lang="hu-HU" dirty="0" smtClean="0"/>
-              <a:t>felhasználói viselkedés elemzése: belső veszélyforrások észlelése</a:t>
-            </a:r>
-            <a:endParaRPr lang="hu-HU" dirty="0" smtClean="0"/>
-          </a:p>
-          <a:p>
-            <a:pPr lvl="1"/>
-            <a:r>
-              <a:rPr lang="hu-HU" dirty="0"/>
-              <a:t>7</a:t>
-            </a:r>
-            <a:r>
-              <a:rPr lang="hu-HU" dirty="0" smtClean="0"/>
-              <a:t>. Tudomány</a:t>
-            </a:r>
-            <a:endParaRPr lang="hu-HU" dirty="0" smtClean="0"/>
-          </a:p>
-          <a:p>
-            <a:pPr lvl="2"/>
-            <a:r>
-              <a:rPr lang="hu-HU" dirty="0" smtClean="0"/>
-              <a:t>időjárás, éghajlat modellezése: időjárás, éghajlati változások előrejelzése</a:t>
-            </a:r>
-          </a:p>
-          <a:p>
-            <a:pPr lvl="2"/>
-            <a:r>
-              <a:rPr lang="hu-HU" dirty="0" smtClean="0"/>
-              <a:t>csillagászat: égbolt objektumainak azonosítása teleszkópadatok alapján</a:t>
-            </a:r>
-          </a:p>
-          <a:p>
-            <a:pPr lvl="2"/>
-            <a:r>
-              <a:rPr lang="hu-HU" dirty="0" smtClean="0"/>
-              <a:t>fizika: szenzoradatok értelmezése</a:t>
-            </a:r>
-          </a:p>
-          <a:p>
-            <a:pPr lvl="2"/>
-            <a:r>
-              <a:rPr lang="hu-HU" dirty="0" smtClean="0"/>
-              <a:t>mezőgazdaság: kártevők észlelése, terményhozam előrejelzése</a:t>
+              <a:rPr lang="hu-HU" b="1" dirty="0" smtClean="0"/>
+              <a:t>gépi fordítás</a:t>
             </a:r>
           </a:p>
         </p:txBody>
@@ -8468,7 +8164,7 @@
     </p:spTree>
     <p:extLst>
       <p:ext uri="{BB962C8B-B14F-4D97-AF65-F5344CB8AC3E}">
-        <p14:creationId xmlns:p14="http://schemas.microsoft.com/office/powerpoint/2010/main" val="448587761"/>
+        <p14:creationId xmlns:p14="http://schemas.microsoft.com/office/powerpoint/2010/main" val="486831476"/>
       </p:ext>
     </p:extLst>
   </p:cSld>
@@ -8528,12 +8224,7 @@
             <p:ph idx="1"/>
           </p:nvPr>
         </p:nvSpPr>
-        <p:spPr>
-          <a:xfrm>
-            <a:off x="467544" y="1600200"/>
-            <a:ext cx="8229600" cy="4525963"/>
-          </a:xfrm>
-        </p:spPr>
+        <p:spPr/>
         <p:txBody>
           <a:bodyPr>
             <a:normAutofit fontScale="77500" lnSpcReduction="20000"/>
@@ -8541,181 +8232,249 @@
           <a:lstStyle/>
           <a:p>
             <a:r>
-              <a:rPr lang="hu-HU" dirty="0" smtClean="0"/>
-              <a:t>Erőteljesen j</a:t>
-            </a:r>
-            <a:r>
-              <a:rPr lang="hu-HU" dirty="0" smtClean="0"/>
-              <a:t>ellemző a </a:t>
-            </a:r>
+              <a:rPr lang="hu-HU" sz="2400" b="1" dirty="0"/>
+              <a:t>Mélytanulási modelleket számos területen </a:t>
+            </a:r>
+            <a:r>
+              <a:rPr lang="hu-HU" sz="2400" dirty="0"/>
+              <a:t>használnak, ezeknek csak kis hányada </a:t>
+            </a:r>
+            <a:r>
+              <a:rPr lang="hu-HU" sz="2400" dirty="0" smtClean="0"/>
+              <a:t>generatív. </a:t>
+            </a:r>
+            <a:r>
+              <a:rPr lang="hu-HU" sz="2000" dirty="0"/>
+              <a:t>Általános célkitűzések</a:t>
+            </a:r>
+            <a:r>
+              <a:rPr lang="hu-HU" sz="2000" dirty="0" smtClean="0"/>
+              <a:t>:</a:t>
+            </a:r>
+            <a:endParaRPr lang="hu-HU" sz="2400" dirty="0"/>
+          </a:p>
+          <a:p>
+            <a:pPr marL="800100" lvl="3" indent="-342900"/>
+            <a:r>
+              <a:rPr lang="hu-HU" dirty="0" smtClean="0"/>
+              <a:t>3. Beszéd- és hangfeldolgozás</a:t>
+            </a:r>
+          </a:p>
+          <a:p>
+            <a:pPr marL="1257300" lvl="4" indent="-342900">
+              <a:buFont typeface="Arial" panose="020B0604020202020204" pitchFamily="34" charset="0"/>
+              <a:buChar char="•"/>
+            </a:pPr>
+            <a:r>
+              <a:rPr lang="hu-HU" dirty="0"/>
+              <a:t>b</a:t>
+            </a:r>
+            <a:r>
+              <a:rPr lang="hu-HU" dirty="0" smtClean="0"/>
+              <a:t>eszédfelismerés (</a:t>
+            </a:r>
+            <a:r>
+              <a:rPr lang="hu-HU" dirty="0" err="1" smtClean="0"/>
+              <a:t>ASR</a:t>
+            </a:r>
+            <a:r>
+              <a:rPr lang="hu-HU" dirty="0" smtClean="0"/>
+              <a:t>): digitális asszisztensek vagy leirat készítése hangfelvételről, pl. az </a:t>
+            </a:r>
+            <a:r>
+              <a:rPr lang="hu-HU" dirty="0" err="1" smtClean="0"/>
+              <a:t>OpenAI</a:t>
+            </a:r>
+            <a:r>
+              <a:rPr lang="hu-HU" dirty="0" smtClean="0"/>
+              <a:t> </a:t>
+            </a:r>
+            <a:r>
+              <a:rPr lang="hu-HU" dirty="0" err="1" smtClean="0"/>
+              <a:t>whisper</a:t>
+            </a:r>
+            <a:r>
+              <a:rPr lang="hu-HU" dirty="0" smtClean="0"/>
+              <a:t> modellje</a:t>
+            </a:r>
+          </a:p>
+          <a:p>
+            <a:pPr marL="1257300" lvl="4" indent="-342900">
+              <a:buFont typeface="Arial" panose="020B0604020202020204" pitchFamily="34" charset="0"/>
+              <a:buChar char="•"/>
+            </a:pPr>
+            <a:r>
+              <a:rPr lang="hu-HU" dirty="0" smtClean="0"/>
+              <a:t>beszédszintetizálás (</a:t>
+            </a:r>
+            <a:r>
+              <a:rPr lang="hu-HU" dirty="0" err="1" smtClean="0"/>
+              <a:t>TTS</a:t>
+            </a:r>
+            <a:r>
+              <a:rPr lang="hu-HU" dirty="0" smtClean="0"/>
+              <a:t>): természetes beszédhang generálása, szövegfelolvasás</a:t>
+            </a:r>
+          </a:p>
+          <a:p>
+            <a:pPr marL="1257300" lvl="4" indent="-342900">
+              <a:buFont typeface="Arial" panose="020B0604020202020204" pitchFamily="34" charset="0"/>
+              <a:buChar char="•"/>
+            </a:pPr>
+            <a:r>
+              <a:rPr lang="hu-HU" dirty="0" smtClean="0"/>
+              <a:t>beszélő azonosítása</a:t>
+            </a:r>
+          </a:p>
+          <a:p>
+            <a:pPr marL="1257300" lvl="4" indent="-342900">
+              <a:buFont typeface="Arial" panose="020B0604020202020204" pitchFamily="34" charset="0"/>
+              <a:buChar char="•"/>
+            </a:pPr>
+            <a:r>
+              <a:rPr lang="hu-HU" dirty="0" smtClean="0"/>
+              <a:t>zene osztályba sorolása: műfajfelismerés stb.</a:t>
+            </a:r>
+          </a:p>
+          <a:p>
+            <a:pPr marL="1257300" lvl="4" indent="-342900">
+              <a:buFont typeface="Arial" panose="020B0604020202020204" pitchFamily="34" charset="0"/>
+              <a:buChar char="•"/>
+            </a:pPr>
             <a:r>
               <a:rPr lang="hu-HU" b="1" dirty="0" smtClean="0"/>
-              <a:t>tudás nyílt megosztásának kultúrája</a:t>
-            </a:r>
-          </a:p>
-          <a:p>
-            <a:pPr lvl="1"/>
-            <a:r>
-              <a:rPr lang="hu-HU" dirty="0" smtClean="0"/>
-              <a:t>hagyományosan a cégeknek üzleti titkai voltak, a tudósok nyilvánosan közzétették eredményeiket</a:t>
-            </a:r>
-          </a:p>
-          <a:p>
-            <a:pPr lvl="1"/>
-            <a:r>
-              <a:rPr lang="hu-HU" dirty="0" smtClean="0"/>
-              <a:t>ma az </a:t>
-            </a:r>
-            <a:r>
-              <a:rPr lang="hu-HU" dirty="0" err="1" smtClean="0"/>
-              <a:t>MI-ben</a:t>
-            </a:r>
-            <a:r>
-              <a:rPr lang="hu-HU" dirty="0" smtClean="0"/>
-              <a:t> a K+F-fel foglalkozó csapatok is többnyire </a:t>
-            </a:r>
-            <a:r>
-              <a:rPr lang="hu-HU" b="1" dirty="0" smtClean="0"/>
-              <a:t>azonnal nyilvánosságra hozzák </a:t>
-            </a:r>
-            <a:r>
-              <a:rPr lang="hu-HU" dirty="0" smtClean="0"/>
-              <a:t>az eredményeiket</a:t>
-            </a:r>
-          </a:p>
-          <a:p>
-            <a:pPr lvl="2"/>
-            <a:r>
-              <a:rPr lang="hu-HU" dirty="0" smtClean="0"/>
-              <a:t>leírják a módszerüket, közzéteszik a benchmarkeredményeket </a:t>
-            </a:r>
-            <a:r>
-              <a:rPr lang="hu-HU" b="1" dirty="0" smtClean="0"/>
-              <a:t>tudományos publikációban </a:t>
-            </a:r>
-            <a:r>
-              <a:rPr lang="hu-HU" dirty="0" smtClean="0"/>
-              <a:t>konferencián vagy az </a:t>
-            </a:r>
-            <a:r>
-              <a:rPr lang="hu-HU" dirty="0" err="1" smtClean="0"/>
-              <a:t>arXiv</a:t>
-            </a:r>
-            <a:r>
-              <a:rPr lang="hu-HU" dirty="0" smtClean="0"/>
-              <a:t> </a:t>
-            </a:r>
-            <a:r>
-              <a:rPr lang="hu-HU" dirty="0" err="1" smtClean="0"/>
-              <a:t>preprintoldalon</a:t>
-            </a:r>
-            <a:r>
-              <a:rPr lang="hu-HU" dirty="0" smtClean="0"/>
-              <a:t>, szakmai lektorálás nélkül</a:t>
-            </a:r>
-          </a:p>
-          <a:p>
-            <a:pPr lvl="2"/>
-            <a:r>
-              <a:rPr lang="hu-HU" dirty="0" smtClean="0"/>
-              <a:t>nyilvánosan megosztják a </a:t>
-            </a:r>
-            <a:r>
-              <a:rPr lang="hu-HU" b="1" dirty="0" smtClean="0"/>
-              <a:t>programkódot </a:t>
-            </a:r>
-            <a:r>
-              <a:rPr lang="hu-HU" dirty="0" smtClean="0"/>
-              <a:t>a </a:t>
-            </a:r>
-            <a:r>
-              <a:rPr lang="hu-HU" dirty="0" err="1" smtClean="0"/>
-              <a:t>GitHubon</a:t>
+              <a:t>zenegenerálás</a:t>
+            </a:r>
+            <a:r>
+              <a:rPr lang="hu-HU" dirty="0" smtClean="0"/>
+              <a:t>: </a:t>
+            </a:r>
+            <a:r>
+              <a:rPr lang="hu-HU" dirty="0" err="1" smtClean="0"/>
+              <a:t>MI-zeneszerző</a:t>
             </a:r>
             <a:endParaRPr lang="hu-HU" dirty="0" smtClean="0"/>
           </a:p>
           <a:p>
-            <a:pPr lvl="2"/>
-            <a:r>
-              <a:rPr lang="hu-HU" dirty="0" smtClean="0"/>
-              <a:t>megosztják a </a:t>
-            </a:r>
-            <a:r>
-              <a:rPr lang="hu-HU" b="1" dirty="0" smtClean="0"/>
-              <a:t>betanított modelleket </a:t>
-            </a:r>
-            <a:r>
-              <a:rPr lang="hu-HU" dirty="0" smtClean="0"/>
-              <a:t>a </a:t>
-            </a:r>
-            <a:r>
-              <a:rPr lang="hu-HU" dirty="0" err="1" smtClean="0"/>
-              <a:t>Hugging</a:t>
-            </a:r>
+            <a:pPr marL="342900" lvl="2" indent="-342900"/>
+            <a:r>
+              <a:rPr lang="hu-HU" dirty="0" smtClean="0"/>
+              <a:t>Konkrétabb alkalmazási területek:</a:t>
+            </a:r>
+          </a:p>
+          <a:p>
+            <a:pPr marL="800100" lvl="3" indent="-342900"/>
             <a:r>
               <a:rPr lang="hu-HU" dirty="0"/>
-              <a:t> </a:t>
-            </a:r>
-            <a:r>
-              <a:rPr lang="hu-HU" dirty="0" err="1" smtClean="0"/>
-              <a:t>Face-en</a:t>
+              <a:t>1</a:t>
+            </a:r>
+            <a:r>
+              <a:rPr lang="hu-HU" dirty="0" smtClean="0"/>
+              <a:t>. Egészségügy, </a:t>
+            </a:r>
+            <a:r>
+              <a:rPr lang="hu-HU" dirty="0" err="1" smtClean="0"/>
+              <a:t>bioinformatika</a:t>
             </a:r>
             <a:endParaRPr lang="hu-HU" dirty="0" smtClean="0"/>
           </a:p>
           <a:p>
-            <a:pPr lvl="2"/>
-            <a:r>
-              <a:rPr lang="hu-HU" dirty="0" smtClean="0"/>
-              <a:t>közzétesznek megoldandó problémákat a </a:t>
-            </a:r>
-            <a:r>
-              <a:rPr lang="hu-HU" dirty="0" err="1" smtClean="0"/>
-              <a:t>Kaggle-ön</a:t>
-            </a:r>
-            <a:r>
-              <a:rPr lang="hu-HU" dirty="0" smtClean="0"/>
-              <a:t> verseny formájában, megoldásokat kérnek rájuk, és a győztesnek jelképes összeget fizetnek</a:t>
+            <a:pPr marL="1257300" lvl="4" indent="-342900">
+              <a:buFont typeface="Arial" panose="020B0604020202020204" pitchFamily="34" charset="0"/>
+              <a:buChar char="•"/>
+            </a:pPr>
+            <a:r>
+              <a:rPr lang="hu-HU" dirty="0" smtClean="0"/>
+              <a:t>orvosi képelemzés: anomáliák észlelése röntgen-, </a:t>
+            </a:r>
+            <a:r>
+              <a:rPr lang="hu-HU" dirty="0" err="1" smtClean="0"/>
+              <a:t>MRI-</a:t>
+            </a:r>
+            <a:r>
+              <a:rPr lang="hu-HU" dirty="0" smtClean="0"/>
+              <a:t>, CT-felvételeken</a:t>
+            </a:r>
+          </a:p>
+          <a:p>
+            <a:pPr marL="1257300" lvl="4" indent="-342900">
+              <a:buFont typeface="Arial" panose="020B0604020202020204" pitchFamily="34" charset="0"/>
+              <a:buChar char="•"/>
+            </a:pPr>
+            <a:r>
+              <a:rPr lang="hu-HU" dirty="0" smtClean="0"/>
+              <a:t>prediktív diagnosztika: betegség előrejelzése páciensadatokból</a:t>
+            </a:r>
+          </a:p>
+          <a:p>
+            <a:pPr marL="1257300" lvl="4" indent="-342900">
+              <a:buFont typeface="Arial" panose="020B0604020202020204" pitchFamily="34" charset="0"/>
+              <a:buChar char="•"/>
+            </a:pPr>
+            <a:r>
+              <a:rPr lang="hu-HU" dirty="0" err="1" smtClean="0"/>
+              <a:t>genomika</a:t>
+            </a:r>
+            <a:r>
+              <a:rPr lang="hu-HU" dirty="0" smtClean="0"/>
+              <a:t>: nagy áteresztőképességű </a:t>
+            </a:r>
+            <a:r>
+              <a:rPr lang="hu-HU" dirty="0" err="1" smtClean="0"/>
+              <a:t>DNS-szekvenálás</a:t>
+            </a:r>
+            <a:r>
+              <a:rPr lang="hu-HU" dirty="0" smtClean="0"/>
+              <a:t> és </a:t>
+            </a:r>
+            <a:r>
+              <a:rPr lang="hu-HU" dirty="0" err="1" smtClean="0"/>
+              <a:t>-elemzés</a:t>
             </a:r>
             <a:endParaRPr lang="hu-HU" dirty="0" smtClean="0"/>
           </a:p>
           <a:p>
-            <a:pPr lvl="1"/>
-            <a:r>
-              <a:rPr lang="hu-HU" dirty="0" smtClean="0"/>
-              <a:t>ez </a:t>
-            </a:r>
-            <a:r>
-              <a:rPr lang="hu-HU" b="1" dirty="0" smtClean="0"/>
-              <a:t>ingyenes nyilvánosságot és reklámot </a:t>
-            </a:r>
-            <a:r>
-              <a:rPr lang="hu-HU" dirty="0" smtClean="0"/>
-              <a:t>jelent a </a:t>
-            </a:r>
-            <a:r>
-              <a:rPr lang="hu-HU" b="1" dirty="0" smtClean="0"/>
-              <a:t>termék</a:t>
-            </a:r>
-            <a:r>
-              <a:rPr lang="hu-HU" dirty="0" smtClean="0"/>
-              <a:t> és </a:t>
-            </a:r>
-            <a:r>
-              <a:rPr lang="hu-HU" b="1" dirty="0" smtClean="0"/>
-              <a:t>maguk </a:t>
-            </a:r>
-            <a:r>
-              <a:rPr lang="hu-HU" dirty="0" smtClean="0"/>
-              <a:t>a fejlesztők számára</a:t>
-            </a:r>
-            <a:endParaRPr lang="hu-HU" dirty="0" smtClean="0"/>
+            <a:pPr marL="1257300" lvl="4" indent="-342900">
+              <a:buFont typeface="Arial" panose="020B0604020202020204" pitchFamily="34" charset="0"/>
+              <a:buChar char="•"/>
+            </a:pPr>
+            <a:r>
+              <a:rPr lang="hu-HU" dirty="0" smtClean="0"/>
+              <a:t>új gyógyszerek felfedezése: molekuláris struktúrák, pl. fehérjeszerkezetek </a:t>
+            </a:r>
+            <a:r>
+              <a:rPr lang="hu-HU" dirty="0" err="1" smtClean="0"/>
+              <a:t>predikciója</a:t>
+            </a:r>
+            <a:r>
+              <a:rPr lang="hu-HU" dirty="0" smtClean="0"/>
+              <a:t> (</a:t>
+            </a:r>
+            <a:r>
+              <a:rPr lang="hu-HU" dirty="0" err="1" smtClean="0"/>
+              <a:t>AlphaFold</a:t>
+            </a:r>
+            <a:r>
+              <a:rPr lang="hu-HU" dirty="0" smtClean="0"/>
+              <a:t>)</a:t>
+            </a:r>
+          </a:p>
+          <a:p>
+            <a:pPr marL="1257300" lvl="4" indent="-342900">
+              <a:buFont typeface="Arial" panose="020B0604020202020204" pitchFamily="34" charset="0"/>
+              <a:buChar char="•"/>
+            </a:pPr>
+            <a:r>
+              <a:rPr lang="hu-HU" dirty="0" smtClean="0"/>
+              <a:t>személyre szabott orvoslás: nem azonos protokoll minden páciensnek, hanem olyan kezelés és adagolás, amely a páciens genetikai profiljához illik</a:t>
+            </a:r>
           </a:p>
         </p:txBody>
       </p:sp>
     </p:spTree>
     <p:extLst>
       <p:ext uri="{BB962C8B-B14F-4D97-AF65-F5344CB8AC3E}">
-        <p14:creationId xmlns:p14="http://schemas.microsoft.com/office/powerpoint/2010/main" val="2945929358"/>
+        <p14:creationId xmlns:p14="http://schemas.microsoft.com/office/powerpoint/2010/main" val="2594341539"/>
       </p:ext>
     </p:extLst>
   </p:cSld>
@@ -8778,6 +8537,682 @@
         <p:spPr/>
         <p:txBody>
           <a:bodyPr>
+            <a:normAutofit fontScale="70000" lnSpcReduction="20000"/>
+          </a:bodyPr>
+          <a:lstStyle/>
+          <a:p>
+            <a:r>
+              <a:rPr lang="hu-HU" b="1" dirty="0"/>
+              <a:t>Mélytanulási modelleket számos területen </a:t>
+            </a:r>
+            <a:r>
+              <a:rPr lang="hu-HU" dirty="0"/>
+              <a:t>használnak, ezeknek csak kis hányada generatív:</a:t>
+            </a:r>
+          </a:p>
+          <a:p>
+            <a:pPr lvl="1"/>
+            <a:r>
+              <a:rPr lang="hu-HU" dirty="0"/>
+              <a:t>2</a:t>
+            </a:r>
+            <a:r>
+              <a:rPr lang="hu-HU" dirty="0" smtClean="0"/>
+              <a:t>. Autonóm rendszerek</a:t>
+            </a:r>
+          </a:p>
+          <a:p>
+            <a:pPr lvl="2"/>
+            <a:r>
+              <a:rPr lang="hu-HU" dirty="0" smtClean="0"/>
+              <a:t>önvezető gépkocsik</a:t>
+            </a:r>
+            <a:r>
+              <a:rPr lang="en-GB" dirty="0" smtClean="0"/>
+              <a:t>, </a:t>
+            </a:r>
+            <a:r>
+              <a:rPr lang="hu-HU" dirty="0" err="1" smtClean="0"/>
+              <a:t>drónok</a:t>
+            </a:r>
+            <a:r>
+              <a:rPr lang="en-GB" dirty="0" smtClean="0"/>
+              <a:t>: </a:t>
+            </a:r>
+            <a:r>
+              <a:rPr lang="hu-HU" dirty="0" smtClean="0"/>
+              <a:t>látás</a:t>
+            </a:r>
+            <a:r>
+              <a:rPr lang="en-GB" dirty="0" smtClean="0"/>
+              <a:t>, </a:t>
+            </a:r>
+            <a:r>
+              <a:rPr lang="hu-HU" dirty="0" smtClean="0"/>
+              <a:t>navigáció, döntéshozatal kombinációja</a:t>
+            </a:r>
+            <a:endParaRPr lang="en-GB" dirty="0"/>
+          </a:p>
+          <a:p>
+            <a:pPr lvl="2"/>
+            <a:r>
+              <a:rPr lang="hu-HU" dirty="0" smtClean="0"/>
+              <a:t>robotika</a:t>
+            </a:r>
+            <a:r>
+              <a:rPr lang="en-GB" dirty="0" smtClean="0"/>
+              <a:t>: </a:t>
+            </a:r>
+            <a:r>
+              <a:rPr lang="hu-HU" dirty="0" smtClean="0"/>
+              <a:t>tárgyfelismerés</a:t>
+            </a:r>
+            <a:r>
+              <a:rPr lang="en-GB" dirty="0" smtClean="0"/>
+              <a:t>, </a:t>
+            </a:r>
+            <a:r>
+              <a:rPr lang="hu-HU" dirty="0" smtClean="0"/>
+              <a:t>mozgás tervezése</a:t>
+            </a:r>
+            <a:endParaRPr lang="en-GB" dirty="0"/>
+          </a:p>
+          <a:p>
+            <a:pPr lvl="1"/>
+            <a:r>
+              <a:rPr lang="hu-HU" dirty="0"/>
+              <a:t>3</a:t>
+            </a:r>
+            <a:r>
+              <a:rPr lang="hu-HU" dirty="0" smtClean="0"/>
+              <a:t>. Pénzügy, üzleti intelligencia</a:t>
+            </a:r>
+          </a:p>
+          <a:p>
+            <a:pPr lvl="2"/>
+            <a:r>
+              <a:rPr lang="hu-HU" dirty="0" smtClean="0"/>
+              <a:t>„algoritmikus kereskedés”: piaci mozgások előrejelzése</a:t>
+            </a:r>
+          </a:p>
+          <a:p>
+            <a:pPr lvl="2"/>
+            <a:r>
+              <a:rPr lang="hu-HU" dirty="0" smtClean="0"/>
+              <a:t>csalások észlelése:</a:t>
+            </a:r>
+            <a:r>
+              <a:rPr lang="en-GB" dirty="0" smtClean="0"/>
+              <a:t> </a:t>
+            </a:r>
+            <a:r>
+              <a:rPr lang="hu-HU" dirty="0" smtClean="0"/>
+              <a:t>anomáliák észlelése üzleti vagy banki tranzakciókban</a:t>
+            </a:r>
+          </a:p>
+          <a:p>
+            <a:pPr lvl="2"/>
+            <a:r>
+              <a:rPr lang="hu-HU" dirty="0" smtClean="0"/>
+              <a:t>hitelminősítés:</a:t>
+            </a:r>
+            <a:r>
+              <a:rPr lang="en-GB" dirty="0" smtClean="0"/>
+              <a:t> </a:t>
+            </a:r>
+            <a:r>
+              <a:rPr lang="hu-HU" dirty="0" smtClean="0"/>
+              <a:t>kockázatbecslés korábbi adatok és profil alapján</a:t>
+            </a:r>
+          </a:p>
+          <a:p>
+            <a:pPr lvl="2"/>
+            <a:r>
+              <a:rPr lang="hu-HU" dirty="0" smtClean="0"/>
+              <a:t>vásárlói magatartás elemzése: lemorzsolódás előrejelzése (ki nem használja tovább a terméket?), személyre szabás (akciók, termékek ajánlása)</a:t>
+            </a:r>
+            <a:endParaRPr lang="hu-HU" dirty="0"/>
+          </a:p>
+          <a:p>
+            <a:pPr lvl="1"/>
+            <a:r>
+              <a:rPr lang="hu-HU" dirty="0" smtClean="0"/>
+              <a:t>4. Ipar, gyártás</a:t>
+            </a:r>
+          </a:p>
+          <a:p>
+            <a:pPr lvl="2"/>
+            <a:r>
+              <a:rPr lang="hu-HU" dirty="0" smtClean="0"/>
+              <a:t>minőségellenőrzés: gyártási hibás termékek vizuális azonosítása</a:t>
+            </a:r>
+          </a:p>
+          <a:p>
+            <a:pPr lvl="2"/>
+            <a:r>
+              <a:rPr lang="hu-HU" dirty="0" smtClean="0"/>
+              <a:t>prediktív karbantartás: meghibásodások korai azonosítása</a:t>
+            </a:r>
+          </a:p>
+          <a:p>
+            <a:pPr lvl="2"/>
+            <a:r>
+              <a:rPr lang="hu-HU" dirty="0" smtClean="0"/>
+              <a:t>folyamatok optimalizálása: szűk keresztmetszetek azonosítása</a:t>
+            </a:r>
+          </a:p>
+        </p:txBody>
+      </p:sp>
+    </p:spTree>
+    <p:extLst>
+      <p:ext uri="{BB962C8B-B14F-4D97-AF65-F5344CB8AC3E}">
+        <p14:creationId xmlns:p14="http://schemas.microsoft.com/office/powerpoint/2010/main" val="3058348580"/>
+      </p:ext>
+    </p:extLst>
+  </p:cSld>
+  <p:clrMapOvr>
+    <a:masterClrMapping/>
+  </p:clrMapOvr>
+</p:sld>
+</file>
+
+<file path=ppt/slides/slide25.xml><?xml version="1.0" encoding="utf-8"?>
+<p:sld xmlns:a="http://schemas.openxmlformats.org/drawingml/2006/main" xmlns:r="http://schemas.openxmlformats.org/officeDocument/2006/relationships" xmlns:p="http://schemas.openxmlformats.org/presentationml/2006/main">
+  <p:cSld>
+    <p:spTree>
+      <p:nvGrpSpPr>
+        <p:cNvPr id="1" name=""/>
+        <p:cNvGrpSpPr/>
+        <p:nvPr/>
+      </p:nvGrpSpPr>
+      <p:grpSpPr>
+        <a:xfrm>
+          <a:off x="0" y="0"/>
+          <a:ext cx="0" cy="0"/>
+          <a:chOff x="0" y="0"/>
+          <a:chExt cx="0" cy="0"/>
+        </a:xfrm>
+      </p:grpSpPr>
+      <p:sp>
+        <p:nvSpPr>
+          <p:cNvPr id="2" name="Cím 1"/>
+          <p:cNvSpPr>
+            <a:spLocks noGrp="1"/>
+          </p:cNvSpPr>
+          <p:nvPr>
+            <p:ph type="title"/>
+          </p:nvPr>
+        </p:nvSpPr>
+        <p:spPr/>
+        <p:txBody>
+          <a:bodyPr/>
+          <a:lstStyle/>
+          <a:p>
+            <a:r>
+              <a:rPr lang="hu-HU" dirty="0"/>
+              <a:t>Az MI helyzete napjainkban</a:t>
+            </a:r>
+            <a:endParaRPr lang="en-GB" dirty="0"/>
+          </a:p>
+        </p:txBody>
+      </p:sp>
+      <p:sp>
+        <p:nvSpPr>
+          <p:cNvPr id="3" name="Tartalom helye 2"/>
+          <p:cNvSpPr>
+            <a:spLocks noGrp="1"/>
+          </p:cNvSpPr>
+          <p:nvPr>
+            <p:ph idx="1"/>
+          </p:nvPr>
+        </p:nvSpPr>
+        <p:spPr/>
+        <p:txBody>
+          <a:bodyPr>
+            <a:normAutofit fontScale="70000" lnSpcReduction="20000"/>
+          </a:bodyPr>
+          <a:lstStyle/>
+          <a:p>
+            <a:r>
+              <a:rPr lang="hu-HU" b="1" dirty="0"/>
+              <a:t>Mélytanulási modelleket számos területen </a:t>
+            </a:r>
+            <a:r>
+              <a:rPr lang="hu-HU" dirty="0"/>
+              <a:t>használnak, ezeknek csak kis hányada generatív:</a:t>
+            </a:r>
+          </a:p>
+          <a:p>
+            <a:pPr lvl="1"/>
+            <a:r>
+              <a:rPr lang="hu-HU" dirty="0"/>
+              <a:t>5</a:t>
+            </a:r>
+            <a:r>
+              <a:rPr lang="hu-HU" dirty="0" smtClean="0"/>
+              <a:t>. Szórakozás</a:t>
+            </a:r>
+          </a:p>
+          <a:p>
+            <a:pPr lvl="2"/>
+            <a:r>
+              <a:rPr lang="hu-HU" dirty="0" smtClean="0"/>
+              <a:t>játék MI: alkalmazkodó, intelligens ellenfelek, </a:t>
+            </a:r>
+            <a:r>
+              <a:rPr lang="hu-HU" dirty="0" err="1" smtClean="0"/>
+              <a:t>NPC-k</a:t>
+            </a:r>
+            <a:endParaRPr lang="hu-HU" dirty="0" smtClean="0"/>
+          </a:p>
+          <a:p>
+            <a:pPr lvl="2"/>
+            <a:r>
+              <a:rPr lang="hu-HU" dirty="0" smtClean="0"/>
+              <a:t>játékot játszó MI: videojátékot önállóan játszó szoftverrendszer</a:t>
+            </a:r>
+          </a:p>
+          <a:p>
+            <a:pPr lvl="2"/>
+            <a:r>
+              <a:rPr lang="hu-HU" b="1" dirty="0" smtClean="0"/>
+              <a:t>tartalomgenerálás</a:t>
+            </a:r>
+            <a:r>
+              <a:rPr lang="hu-HU" dirty="0" smtClean="0"/>
+              <a:t>: zene, műalkotás, videó</a:t>
+            </a:r>
+            <a:endParaRPr lang="en-GB" dirty="0"/>
+          </a:p>
+          <a:p>
+            <a:pPr lvl="1"/>
+            <a:r>
+              <a:rPr lang="hu-HU" dirty="0"/>
+              <a:t>6</a:t>
+            </a:r>
+            <a:r>
+              <a:rPr lang="hu-HU" dirty="0" smtClean="0"/>
+              <a:t>. </a:t>
+            </a:r>
+            <a:r>
+              <a:rPr lang="hu-HU" dirty="0" err="1" smtClean="0"/>
+              <a:t>Kiberbiztonság</a:t>
+            </a:r>
+            <a:endParaRPr lang="hu-HU" dirty="0" smtClean="0"/>
+          </a:p>
+          <a:p>
+            <a:pPr lvl="2"/>
+            <a:r>
+              <a:rPr lang="hu-HU" dirty="0" err="1" smtClean="0"/>
+              <a:t>behatolásészlelés</a:t>
+            </a:r>
+            <a:r>
+              <a:rPr lang="hu-HU" dirty="0" smtClean="0"/>
+              <a:t>: rendhagyó hálózati tevékenység felismerése</a:t>
+            </a:r>
+          </a:p>
+          <a:p>
+            <a:pPr lvl="2"/>
+            <a:r>
+              <a:rPr lang="hu-HU" dirty="0" smtClean="0"/>
+              <a:t>rosszindulatú szoftver észlelése: vírusok, ártalmas programkód felismerése</a:t>
+            </a:r>
+          </a:p>
+          <a:p>
+            <a:pPr lvl="2"/>
+            <a:r>
+              <a:rPr lang="hu-HU" dirty="0" smtClean="0"/>
+              <a:t>felhasználói viselkedés elemzése: belső veszélyforrások észlelése</a:t>
+            </a:r>
+          </a:p>
+          <a:p>
+            <a:pPr lvl="1"/>
+            <a:r>
+              <a:rPr lang="hu-HU" dirty="0"/>
+              <a:t>7</a:t>
+            </a:r>
+            <a:r>
+              <a:rPr lang="hu-HU" dirty="0" smtClean="0"/>
+              <a:t>. Tudomány</a:t>
+            </a:r>
+          </a:p>
+          <a:p>
+            <a:pPr lvl="2"/>
+            <a:r>
+              <a:rPr lang="hu-HU" dirty="0" smtClean="0"/>
+              <a:t>időjárás, éghajlat modellezése: időjárás, éghajlati változások előrejelzése</a:t>
+            </a:r>
+          </a:p>
+          <a:p>
+            <a:pPr lvl="2"/>
+            <a:r>
+              <a:rPr lang="hu-HU" dirty="0" smtClean="0"/>
+              <a:t>csillagászat: égbolt objektumainak azonosítása teleszkópadatok alapján</a:t>
+            </a:r>
+          </a:p>
+          <a:p>
+            <a:pPr lvl="2"/>
+            <a:r>
+              <a:rPr lang="hu-HU" dirty="0" smtClean="0"/>
+              <a:t>fizika: szenzoradatok értelmezése</a:t>
+            </a:r>
+          </a:p>
+          <a:p>
+            <a:pPr lvl="2"/>
+            <a:r>
+              <a:rPr lang="hu-HU" dirty="0" smtClean="0"/>
+              <a:t>mezőgazdaság: kártevők észlelése, terményhozam előrejelzése</a:t>
+            </a:r>
+          </a:p>
+        </p:txBody>
+      </p:sp>
+    </p:spTree>
+    <p:extLst>
+      <p:ext uri="{BB962C8B-B14F-4D97-AF65-F5344CB8AC3E}">
+        <p14:creationId xmlns:p14="http://schemas.microsoft.com/office/powerpoint/2010/main" val="448587761"/>
+      </p:ext>
+    </p:extLst>
+  </p:cSld>
+  <p:clrMapOvr>
+    <a:masterClrMapping/>
+  </p:clrMapOvr>
+</p:sld>
+</file>
+
+<file path=ppt/slides/slide26.xml><?xml version="1.0" encoding="utf-8"?>
+<p:sld xmlns:a="http://schemas.openxmlformats.org/drawingml/2006/main" xmlns:r="http://schemas.openxmlformats.org/officeDocument/2006/relationships" xmlns:p="http://schemas.openxmlformats.org/presentationml/2006/main">
+  <p:cSld>
+    <p:spTree>
+      <p:nvGrpSpPr>
+        <p:cNvPr id="1" name=""/>
+        <p:cNvGrpSpPr/>
+        <p:nvPr/>
+      </p:nvGrpSpPr>
+      <p:grpSpPr>
+        <a:xfrm>
+          <a:off x="0" y="0"/>
+          <a:ext cx="0" cy="0"/>
+          <a:chOff x="0" y="0"/>
+          <a:chExt cx="0" cy="0"/>
+        </a:xfrm>
+      </p:grpSpPr>
+      <p:sp>
+        <p:nvSpPr>
+          <p:cNvPr id="2" name="Cím 1"/>
+          <p:cNvSpPr>
+            <a:spLocks noGrp="1"/>
+          </p:cNvSpPr>
+          <p:nvPr>
+            <p:ph type="title"/>
+          </p:nvPr>
+        </p:nvSpPr>
+        <p:spPr/>
+        <p:txBody>
+          <a:bodyPr/>
+          <a:lstStyle/>
+          <a:p>
+            <a:r>
+              <a:rPr lang="hu-HU" dirty="0"/>
+              <a:t>Az MI helyzete napjainkban</a:t>
+            </a:r>
+            <a:endParaRPr lang="en-GB" dirty="0"/>
+          </a:p>
+        </p:txBody>
+      </p:sp>
+      <p:sp>
+        <p:nvSpPr>
+          <p:cNvPr id="3" name="Tartalom helye 2"/>
+          <p:cNvSpPr>
+            <a:spLocks noGrp="1"/>
+          </p:cNvSpPr>
+          <p:nvPr>
+            <p:ph idx="1"/>
+          </p:nvPr>
+        </p:nvSpPr>
+        <p:spPr>
+          <a:xfrm>
+            <a:off x="467544" y="1600200"/>
+            <a:ext cx="8229600" cy="4525963"/>
+          </a:xfrm>
+        </p:spPr>
+        <p:txBody>
+          <a:bodyPr>
+            <a:normAutofit fontScale="77500" lnSpcReduction="20000"/>
+          </a:bodyPr>
+          <a:lstStyle/>
+          <a:p>
+            <a:r>
+              <a:rPr lang="hu-HU" dirty="0" smtClean="0"/>
+              <a:t>Erőteljesen jellemző a </a:t>
+            </a:r>
+            <a:r>
+              <a:rPr lang="hu-HU" b="1" dirty="0" smtClean="0"/>
+              <a:t>tudás nyílt megosztásának kultúrája</a:t>
+            </a:r>
+          </a:p>
+          <a:p>
+            <a:pPr lvl="1"/>
+            <a:r>
+              <a:rPr lang="hu-HU" dirty="0" smtClean="0"/>
+              <a:t>hagyományosan a cégeknek üzleti titkai voltak, a tudósok nyilvánosan közzétették eredményeiket</a:t>
+            </a:r>
+          </a:p>
+          <a:p>
+            <a:pPr lvl="1"/>
+            <a:r>
+              <a:rPr lang="hu-HU" dirty="0" smtClean="0"/>
+              <a:t>ma az </a:t>
+            </a:r>
+            <a:r>
+              <a:rPr lang="hu-HU" dirty="0" err="1" smtClean="0"/>
+              <a:t>MI-ben</a:t>
+            </a:r>
+            <a:r>
+              <a:rPr lang="hu-HU" dirty="0" smtClean="0"/>
+              <a:t> a K+F-fel foglalkozó csapatok is többnyire </a:t>
+            </a:r>
+            <a:r>
+              <a:rPr lang="hu-HU" b="1" dirty="0" smtClean="0"/>
+              <a:t>azonnal nyilvánosságra hozzák </a:t>
+            </a:r>
+            <a:r>
+              <a:rPr lang="hu-HU" dirty="0" smtClean="0"/>
+              <a:t>az eredményeiket</a:t>
+            </a:r>
+          </a:p>
+          <a:p>
+            <a:pPr lvl="2"/>
+            <a:r>
+              <a:rPr lang="hu-HU" dirty="0" smtClean="0"/>
+              <a:t>leírják a módszerüket, közzéteszik a benchmarkeredményeket </a:t>
+            </a:r>
+            <a:r>
+              <a:rPr lang="hu-HU" b="1" dirty="0" smtClean="0"/>
+              <a:t>tudományos publikációban </a:t>
+            </a:r>
+            <a:r>
+              <a:rPr lang="hu-HU" dirty="0" smtClean="0"/>
+              <a:t>konferencián vagy az </a:t>
+            </a:r>
+            <a:r>
+              <a:rPr lang="hu-HU" dirty="0" err="1" smtClean="0"/>
+              <a:t>arXiv</a:t>
+            </a:r>
+            <a:r>
+              <a:rPr lang="hu-HU" dirty="0" smtClean="0"/>
+              <a:t> </a:t>
+            </a:r>
+            <a:r>
+              <a:rPr lang="hu-HU" dirty="0" err="1" smtClean="0"/>
+              <a:t>preprintoldalon</a:t>
+            </a:r>
+            <a:r>
+              <a:rPr lang="hu-HU" dirty="0" smtClean="0"/>
+              <a:t>, szakmai lektorálás nélkül</a:t>
+            </a:r>
+          </a:p>
+          <a:p>
+            <a:pPr lvl="2"/>
+            <a:r>
+              <a:rPr lang="hu-HU" dirty="0" smtClean="0"/>
+              <a:t>nyilvánosan megosztják a </a:t>
+            </a:r>
+            <a:r>
+              <a:rPr lang="hu-HU" b="1" dirty="0" smtClean="0"/>
+              <a:t>programkódot </a:t>
+            </a:r>
+            <a:r>
+              <a:rPr lang="hu-HU" dirty="0" smtClean="0"/>
+              <a:t>a </a:t>
+            </a:r>
+            <a:r>
+              <a:rPr lang="hu-HU" dirty="0" err="1" smtClean="0"/>
+              <a:t>GitHubon</a:t>
+            </a:r>
+            <a:endParaRPr lang="hu-HU" dirty="0" smtClean="0"/>
+          </a:p>
+          <a:p>
+            <a:pPr lvl="2"/>
+            <a:r>
+              <a:rPr lang="hu-HU" dirty="0" smtClean="0"/>
+              <a:t>megosztják a </a:t>
+            </a:r>
+            <a:r>
+              <a:rPr lang="hu-HU" b="1" dirty="0" smtClean="0"/>
+              <a:t>betanított modelleket </a:t>
+            </a:r>
+            <a:r>
+              <a:rPr lang="hu-HU" dirty="0" smtClean="0"/>
+              <a:t>a </a:t>
+            </a:r>
+            <a:r>
+              <a:rPr lang="hu-HU" dirty="0" err="1" smtClean="0"/>
+              <a:t>Hugging</a:t>
+            </a:r>
+            <a:r>
+              <a:rPr lang="hu-HU" dirty="0"/>
+              <a:t> </a:t>
+            </a:r>
+            <a:r>
+              <a:rPr lang="hu-HU" dirty="0" err="1" smtClean="0"/>
+              <a:t>Face-en</a:t>
+            </a:r>
+            <a:endParaRPr lang="hu-HU" dirty="0" smtClean="0"/>
+          </a:p>
+          <a:p>
+            <a:pPr lvl="2"/>
+            <a:r>
+              <a:rPr lang="hu-HU" dirty="0" smtClean="0"/>
+              <a:t>közzétesznek megoldandó problémákat a </a:t>
+            </a:r>
+            <a:r>
+              <a:rPr lang="hu-HU" dirty="0" err="1" smtClean="0"/>
+              <a:t>Kaggle-ön</a:t>
+            </a:r>
+            <a:r>
+              <a:rPr lang="hu-HU" dirty="0" smtClean="0"/>
+              <a:t> verseny formájában, megoldásokat kérnek rájuk, és a győztesnek jelképes összeget fizetnek</a:t>
+            </a:r>
+          </a:p>
+          <a:p>
+            <a:pPr lvl="1"/>
+            <a:r>
+              <a:rPr lang="hu-HU" dirty="0" smtClean="0"/>
+              <a:t>ez </a:t>
+            </a:r>
+            <a:r>
+              <a:rPr lang="hu-HU" b="1" dirty="0" smtClean="0"/>
+              <a:t>ingyenes nyilvánosságot és reklámot </a:t>
+            </a:r>
+            <a:r>
+              <a:rPr lang="hu-HU" dirty="0" smtClean="0"/>
+              <a:t>jelent a </a:t>
+            </a:r>
+            <a:r>
+              <a:rPr lang="hu-HU" b="1" dirty="0" smtClean="0"/>
+              <a:t>termék</a:t>
+            </a:r>
+            <a:r>
+              <a:rPr lang="hu-HU" dirty="0" smtClean="0"/>
+              <a:t> és </a:t>
+            </a:r>
+            <a:r>
+              <a:rPr lang="hu-HU" b="1" dirty="0" smtClean="0"/>
+              <a:t>maguk </a:t>
+            </a:r>
+            <a:r>
+              <a:rPr lang="hu-HU" dirty="0" smtClean="0"/>
+              <a:t>a fejlesztők számára</a:t>
+            </a:r>
+          </a:p>
+        </p:txBody>
+      </p:sp>
+    </p:spTree>
+    <p:extLst>
+      <p:ext uri="{BB962C8B-B14F-4D97-AF65-F5344CB8AC3E}">
+        <p14:creationId xmlns:p14="http://schemas.microsoft.com/office/powerpoint/2010/main" val="2945929358"/>
+      </p:ext>
+    </p:extLst>
+  </p:cSld>
+  <p:clrMapOvr>
+    <a:masterClrMapping/>
+  </p:clrMapOvr>
+</p:sld>
+</file>
+
+<file path=ppt/slides/slide27.xml><?xml version="1.0" encoding="utf-8"?>
+<p:sld xmlns:a="http://schemas.openxmlformats.org/drawingml/2006/main" xmlns:r="http://schemas.openxmlformats.org/officeDocument/2006/relationships" xmlns:p="http://schemas.openxmlformats.org/presentationml/2006/main">
+  <p:cSld>
+    <p:spTree>
+      <p:nvGrpSpPr>
+        <p:cNvPr id="1" name=""/>
+        <p:cNvGrpSpPr/>
+        <p:nvPr/>
+      </p:nvGrpSpPr>
+      <p:grpSpPr>
+        <a:xfrm>
+          <a:off x="0" y="0"/>
+          <a:ext cx="0" cy="0"/>
+          <a:chOff x="0" y="0"/>
+          <a:chExt cx="0" cy="0"/>
+        </a:xfrm>
+      </p:grpSpPr>
+      <p:sp>
+        <p:nvSpPr>
+          <p:cNvPr id="2" name="Cím 1"/>
+          <p:cNvSpPr>
+            <a:spLocks noGrp="1"/>
+          </p:cNvSpPr>
+          <p:nvPr>
+            <p:ph type="title"/>
+          </p:nvPr>
+        </p:nvSpPr>
+        <p:spPr/>
+        <p:txBody>
+          <a:bodyPr/>
+          <a:lstStyle/>
+          <a:p>
+            <a:r>
+              <a:rPr lang="hu-HU" dirty="0"/>
+              <a:t>Az MI helyzete napjainkban</a:t>
+            </a:r>
+            <a:endParaRPr lang="en-GB" dirty="0"/>
+          </a:p>
+        </p:txBody>
+      </p:sp>
+      <p:sp>
+        <p:nvSpPr>
+          <p:cNvPr id="3" name="Tartalom helye 2"/>
+          <p:cNvSpPr>
+            <a:spLocks noGrp="1"/>
+          </p:cNvSpPr>
+          <p:nvPr>
+            <p:ph idx="1"/>
+          </p:nvPr>
+        </p:nvSpPr>
+        <p:spPr/>
+        <p:txBody>
+          <a:bodyPr>
             <a:normAutofit fontScale="55000" lnSpcReduction="20000"/>
           </a:bodyPr>
           <a:lstStyle/>
@@ -9017,7 +9452,6 @@
               <a:rPr lang="hu-HU" dirty="0" smtClean="0"/>
               <a:t>.</a:t>
             </a:r>
-            <a:endParaRPr lang="hu-HU" dirty="0" smtClean="0"/>
           </a:p>
         </p:txBody>
       </p:sp>

</xml_diff>